<commit_message>
First version of slides
</commit_message>
<xml_diff>
--- a/Visualization/GlobalCO2Emission.pptx
+++ b/Visualization/GlobalCO2Emission.pptx
@@ -7,6 +7,10 @@
   <p:sldIdLst>
     <p:sldId id="256" r:id="rId2"/>
     <p:sldId id="257" r:id="rId3"/>
+    <p:sldId id="258" r:id="rId4"/>
+    <p:sldId id="259" r:id="rId5"/>
+    <p:sldId id="260" r:id="rId6"/>
+    <p:sldId id="261" r:id="rId7"/>
   </p:sldIdLst>
   <p:sldSz cx="12192000" cy="6858000"/>
   <p:notesSz cx="6858000" cy="9144000"/>
@@ -3332,7 +3336,7 @@
           <p:cNvPr id="2" name="slide1">
             <a:extLst>
               <a:ext uri="{FF2B5EF4-FFF2-40B4-BE49-F238E27FC236}">
-                <a16:creationId xmlns:a16="http://schemas.microsoft.com/office/drawing/2014/main" id="{56434F63-04D7-4ABE-9989-ADE8CD597280}"/>
+                <a16:creationId xmlns:a16="http://schemas.microsoft.com/office/drawing/2014/main" id="{B086A1BD-FC89-4C38-8E32-3E530B76C490}"/>
               </a:ext>
             </a:extLst>
           </p:cNvPr>
@@ -3359,7 +3363,7 @@
           <p:cNvPr id="3" name="slide1">
             <a:extLst>
               <a:ext uri="{FF2B5EF4-FFF2-40B4-BE49-F238E27FC236}">
-                <a16:creationId xmlns:a16="http://schemas.microsoft.com/office/drawing/2014/main" id="{4D069344-7D41-4390-B798-2A3936C5A05A}"/>
+                <a16:creationId xmlns:a16="http://schemas.microsoft.com/office/drawing/2014/main" id="{2693AAED-9718-48B5-B6E2-0450251AB226}"/>
               </a:ext>
             </a:extLst>
           </p:cNvPr>
@@ -3376,7 +3380,7 @@
           <a:lstStyle/>
           <a:p>
             <a:r>
-              <a:t>File created on: 06/03/23 10:04:33 CET</a:t>
+              <a:t>File created on: 06/03/23 11:40:15 CET</a:t>
             </a:r>
           </a:p>
         </p:txBody>
@@ -3413,10 +3417,10 @@
       </p:grpSpPr>
       <p:pic>
         <p:nvPicPr>
-          <p:cNvPr id="2" name="slide2" descr="Total emission/Germany">
-            <a:extLst>
-              <a:ext uri="{FF2B5EF4-FFF2-40B4-BE49-F238E27FC236}">
-                <a16:creationId xmlns:a16="http://schemas.microsoft.com/office/drawing/2014/main" id="{3B2DC403-C95A-4DFE-A96C-4E696838D50D}"/>
+          <p:cNvPr id="2" name="slide2" descr="Sheet 8">
+            <a:extLst>
+              <a:ext uri="{FF2B5EF4-FFF2-40B4-BE49-F238E27FC236}">
+                <a16:creationId xmlns:a16="http://schemas.microsoft.com/office/drawing/2014/main" id="{3787ECEC-A862-4021-8FE8-71680E81BFC0}"/>
               </a:ext>
             </a:extLst>
           </p:cNvPr>
@@ -3439,8 +3443,272 @@
         </p:blipFill>
         <p:spPr>
           <a:xfrm>
-            <a:off x="800099" y="177849"/>
-            <a:ext cx="10378799" cy="6371541"/>
+            <a:off x="1543050" y="219075"/>
+            <a:ext cx="9105900" cy="6419850"/>
+          </a:xfrm>
+          <a:prstGeom prst="rect">
+            <a:avLst/>
+          </a:prstGeom>
+        </p:spPr>
+      </p:pic>
+    </p:spTree>
+    <p:extLst>
+      <p:ext uri="{BB962C8B-B14F-4D97-AF65-F5344CB8AC3E}">
+        <p14:creationId xmlns:p14="http://schemas.microsoft.com/office/powerpoint/2010/main" val="95992585"/>
+      </p:ext>
+    </p:extLst>
+  </p:cSld>
+  <p:clrMapOvr>
+    <a:masterClrMapping/>
+  </p:clrMapOvr>
+</p:sld>
+</file>
+
+<file path=ppt/slides/slide3.xml><?xml version="1.0" encoding="utf-8"?>
+<p:sld xmlns:a="http://schemas.openxmlformats.org/drawingml/2006/main" xmlns:r="http://schemas.openxmlformats.org/officeDocument/2006/relationships" xmlns:p="http://schemas.openxmlformats.org/presentationml/2006/main">
+  <p:cSld>
+    <p:spTree>
+      <p:nvGrpSpPr>
+        <p:cNvPr id="1" name=""/>
+        <p:cNvGrpSpPr/>
+        <p:nvPr/>
+      </p:nvGrpSpPr>
+      <p:grpSpPr>
+        <a:xfrm>
+          <a:off x="0" y="0"/>
+          <a:ext cx="0" cy="0"/>
+          <a:chOff x="0" y="0"/>
+          <a:chExt cx="0" cy="0"/>
+        </a:xfrm>
+      </p:grpSpPr>
+      <p:pic>
+        <p:nvPicPr>
+          <p:cNvPr id="3" name="slide3" descr="Map">
+            <a:extLst>
+              <a:ext uri="{FF2B5EF4-FFF2-40B4-BE49-F238E27FC236}">
+                <a16:creationId xmlns:a16="http://schemas.microsoft.com/office/drawing/2014/main" id="{5CA007DD-D066-40AA-8B79-B6CAA4107669}"/>
+              </a:ext>
+            </a:extLst>
+          </p:cNvPr>
+          <p:cNvPicPr>
+            <a:picLocks noChangeAspect="1"/>
+          </p:cNvPicPr>
+          <p:nvPr/>
+        </p:nvPicPr>
+        <p:blipFill>
+          <a:blip r:embed="rId2">
+            <a:extLst>
+              <a:ext uri="{28A0092B-C50C-407E-A947-70E740481C1C}">
+                <a14:useLocalDpi xmlns:a14="http://schemas.microsoft.com/office/drawing/2010/main" val="0"/>
+              </a:ext>
+            </a:extLst>
+          </a:blip>
+          <a:stretch>
+            <a:fillRect/>
+          </a:stretch>
+        </p:blipFill>
+        <p:spPr>
+          <a:xfrm>
+            <a:off x="1157287" y="138112"/>
+            <a:ext cx="9877425" cy="6581775"/>
+          </a:xfrm>
+          <a:prstGeom prst="rect">
+            <a:avLst/>
+          </a:prstGeom>
+        </p:spPr>
+      </p:pic>
+    </p:spTree>
+    <p:extLst>
+      <p:ext uri="{BB962C8B-B14F-4D97-AF65-F5344CB8AC3E}">
+        <p14:creationId xmlns:p14="http://schemas.microsoft.com/office/powerpoint/2010/main" val="95992585"/>
+      </p:ext>
+    </p:extLst>
+  </p:cSld>
+  <p:clrMapOvr>
+    <a:masterClrMapping/>
+  </p:clrMapOvr>
+</p:sld>
+</file>
+
+<file path=ppt/slides/slide4.xml><?xml version="1.0" encoding="utf-8"?>
+<p:sld xmlns:a="http://schemas.openxmlformats.org/drawingml/2006/main" xmlns:r="http://schemas.openxmlformats.org/officeDocument/2006/relationships" xmlns:p="http://schemas.openxmlformats.org/presentationml/2006/main">
+  <p:cSld>
+    <p:spTree>
+      <p:nvGrpSpPr>
+        <p:cNvPr id="1" name=""/>
+        <p:cNvGrpSpPr/>
+        <p:nvPr/>
+      </p:nvGrpSpPr>
+      <p:grpSpPr>
+        <a:xfrm>
+          <a:off x="0" y="0"/>
+          <a:ext cx="0" cy="0"/>
+          <a:chOff x="0" y="0"/>
+          <a:chExt cx="0" cy="0"/>
+        </a:xfrm>
+      </p:grpSpPr>
+      <p:pic>
+        <p:nvPicPr>
+          <p:cNvPr id="4" name="slide4" descr="Total emission/Germany">
+            <a:extLst>
+              <a:ext uri="{FF2B5EF4-FFF2-40B4-BE49-F238E27FC236}">
+                <a16:creationId xmlns:a16="http://schemas.microsoft.com/office/drawing/2014/main" id="{A950A2E8-3B00-45F4-B88D-1858545BE60E}"/>
+              </a:ext>
+            </a:extLst>
+          </p:cNvPr>
+          <p:cNvPicPr>
+            <a:picLocks noChangeAspect="1"/>
+          </p:cNvPicPr>
+          <p:nvPr/>
+        </p:nvPicPr>
+        <p:blipFill>
+          <a:blip r:embed="rId2">
+            <a:extLst>
+              <a:ext uri="{28A0092B-C50C-407E-A947-70E740481C1C}">
+                <a14:useLocalDpi xmlns:a14="http://schemas.microsoft.com/office/drawing/2010/main" val="0"/>
+              </a:ext>
+            </a:extLst>
+          </a:blip>
+          <a:stretch>
+            <a:fillRect/>
+          </a:stretch>
+        </p:blipFill>
+        <p:spPr>
+          <a:xfrm>
+            <a:off x="1162050" y="219075"/>
+            <a:ext cx="9867900" cy="6419850"/>
+          </a:xfrm>
+          <a:prstGeom prst="rect">
+            <a:avLst/>
+          </a:prstGeom>
+        </p:spPr>
+      </p:pic>
+    </p:spTree>
+    <p:extLst>
+      <p:ext uri="{BB962C8B-B14F-4D97-AF65-F5344CB8AC3E}">
+        <p14:creationId xmlns:p14="http://schemas.microsoft.com/office/powerpoint/2010/main" val="95992585"/>
+      </p:ext>
+    </p:extLst>
+  </p:cSld>
+  <p:clrMapOvr>
+    <a:masterClrMapping/>
+  </p:clrMapOvr>
+</p:sld>
+</file>
+
+<file path=ppt/slides/slide5.xml><?xml version="1.0" encoding="utf-8"?>
+<p:sld xmlns:a="http://schemas.openxmlformats.org/drawingml/2006/main" xmlns:r="http://schemas.openxmlformats.org/officeDocument/2006/relationships" xmlns:p="http://schemas.openxmlformats.org/presentationml/2006/main">
+  <p:cSld>
+    <p:spTree>
+      <p:nvGrpSpPr>
+        <p:cNvPr id="1" name=""/>
+        <p:cNvGrpSpPr/>
+        <p:nvPr/>
+      </p:nvGrpSpPr>
+      <p:grpSpPr>
+        <a:xfrm>
+          <a:off x="0" y="0"/>
+          <a:ext cx="0" cy="0"/>
+          <a:chOff x="0" y="0"/>
+          <a:chExt cx="0" cy="0"/>
+        </a:xfrm>
+      </p:grpSpPr>
+      <p:pic>
+        <p:nvPicPr>
+          <p:cNvPr id="5" name="slide5" descr="Total emission/China">
+            <a:extLst>
+              <a:ext uri="{FF2B5EF4-FFF2-40B4-BE49-F238E27FC236}">
+                <a16:creationId xmlns:a16="http://schemas.microsoft.com/office/drawing/2014/main" id="{71EE01FA-8BB4-45A0-A78C-85315452556A}"/>
+              </a:ext>
+            </a:extLst>
+          </p:cNvPr>
+          <p:cNvPicPr>
+            <a:picLocks noChangeAspect="1"/>
+          </p:cNvPicPr>
+          <p:nvPr/>
+        </p:nvPicPr>
+        <p:blipFill>
+          <a:blip r:embed="rId2">
+            <a:extLst>
+              <a:ext uri="{28A0092B-C50C-407E-A947-70E740481C1C}">
+                <a14:useLocalDpi xmlns:a14="http://schemas.microsoft.com/office/drawing/2010/main" val="0"/>
+              </a:ext>
+            </a:extLst>
+          </a:blip>
+          <a:stretch>
+            <a:fillRect/>
+          </a:stretch>
+        </p:blipFill>
+        <p:spPr>
+          <a:xfrm>
+            <a:off x="1162050" y="219075"/>
+            <a:ext cx="9867900" cy="6419850"/>
+          </a:xfrm>
+          <a:prstGeom prst="rect">
+            <a:avLst/>
+          </a:prstGeom>
+        </p:spPr>
+      </p:pic>
+    </p:spTree>
+    <p:extLst>
+      <p:ext uri="{BB962C8B-B14F-4D97-AF65-F5344CB8AC3E}">
+        <p14:creationId xmlns:p14="http://schemas.microsoft.com/office/powerpoint/2010/main" val="95992585"/>
+      </p:ext>
+    </p:extLst>
+  </p:cSld>
+  <p:clrMapOvr>
+    <a:masterClrMapping/>
+  </p:clrMapOvr>
+</p:sld>
+</file>
+
+<file path=ppt/slides/slide6.xml><?xml version="1.0" encoding="utf-8"?>
+<p:sld xmlns:a="http://schemas.openxmlformats.org/drawingml/2006/main" xmlns:r="http://schemas.openxmlformats.org/officeDocument/2006/relationships" xmlns:p="http://schemas.openxmlformats.org/presentationml/2006/main">
+  <p:cSld>
+    <p:spTree>
+      <p:nvGrpSpPr>
+        <p:cNvPr id="1" name=""/>
+        <p:cNvGrpSpPr/>
+        <p:nvPr/>
+      </p:nvGrpSpPr>
+      <p:grpSpPr>
+        <a:xfrm>
+          <a:off x="0" y="0"/>
+          <a:ext cx="0" cy="0"/>
+          <a:chOff x="0" y="0"/>
+          <a:chExt cx="0" cy="0"/>
+        </a:xfrm>
+      </p:grpSpPr>
+      <p:pic>
+        <p:nvPicPr>
+          <p:cNvPr id="6" name="slide6" descr="Total emission/Countries">
+            <a:extLst>
+              <a:ext uri="{FF2B5EF4-FFF2-40B4-BE49-F238E27FC236}">
+                <a16:creationId xmlns:a16="http://schemas.microsoft.com/office/drawing/2014/main" id="{6338F4D0-21F9-49C4-BB4F-C36F58C6EAD5}"/>
+              </a:ext>
+            </a:extLst>
+          </p:cNvPr>
+          <p:cNvPicPr>
+            <a:picLocks noChangeAspect="1"/>
+          </p:cNvPicPr>
+          <p:nvPr/>
+        </p:nvPicPr>
+        <p:blipFill>
+          <a:blip r:embed="rId2">
+            <a:extLst>
+              <a:ext uri="{28A0092B-C50C-407E-A947-70E740481C1C}">
+                <a14:useLocalDpi xmlns:a14="http://schemas.microsoft.com/office/drawing/2010/main" val="0"/>
+              </a:ext>
+            </a:extLst>
+          </a:blip>
+          <a:stretch>
+            <a:fillRect/>
+          </a:stretch>
+        </p:blipFill>
+        <p:spPr>
+          <a:xfrm>
+            <a:off x="1162050" y="219075"/>
+            <a:ext cx="9867900" cy="6419850"/>
           </a:xfrm>
           <a:prstGeom prst="rect">
             <a:avLst/>

</xml_diff>

<commit_message>
All slides added with forecasting
</commit_message>
<xml_diff>
--- a/Visualization/GlobalCO2Emission.pptx
+++ b/Visualization/GlobalCO2Emission.pptx
@@ -11,6 +11,10 @@
     <p:sldId id="259" r:id="rId5"/>
     <p:sldId id="260" r:id="rId6"/>
     <p:sldId id="261" r:id="rId7"/>
+    <p:sldId id="262" r:id="rId8"/>
+    <p:sldId id="263" r:id="rId9"/>
+    <p:sldId id="264" r:id="rId10"/>
+    <p:sldId id="265" r:id="rId11"/>
   </p:sldIdLst>
   <p:sldSz cx="12192000" cy="6858000"/>
   <p:notesSz cx="6858000" cy="9144000"/>
@@ -3398,6 +3402,72 @@
 </p:sld>
 </file>
 
+<file path=ppt/slides/slide10.xml><?xml version="1.0" encoding="utf-8"?>
+<p:sld xmlns:a="http://schemas.openxmlformats.org/drawingml/2006/main" xmlns:r="http://schemas.openxmlformats.org/officeDocument/2006/relationships" xmlns:p="http://schemas.openxmlformats.org/presentationml/2006/main">
+  <p:cSld>
+    <p:spTree>
+      <p:nvGrpSpPr>
+        <p:cNvPr id="1" name=""/>
+        <p:cNvGrpSpPr/>
+        <p:nvPr/>
+      </p:nvGrpSpPr>
+      <p:grpSpPr>
+        <a:xfrm>
+          <a:off x="0" y="0"/>
+          <a:ext cx="0" cy="0"/>
+          <a:chOff x="0" y="0"/>
+          <a:chExt cx="0" cy="0"/>
+        </a:xfrm>
+      </p:grpSpPr>
+      <p:pic>
+        <p:nvPicPr>
+          <p:cNvPr id="5" name="slide5" descr="Sheet 1 (4)">
+            <a:extLst>
+              <a:ext uri="{FF2B5EF4-FFF2-40B4-BE49-F238E27FC236}">
+                <a16:creationId xmlns:a16="http://schemas.microsoft.com/office/drawing/2014/main" id="{3F2D24FF-C17B-41B7-90B9-F42F4FFC08AE}"/>
+              </a:ext>
+            </a:extLst>
+          </p:cNvPr>
+          <p:cNvPicPr>
+            <a:picLocks noChangeAspect="1"/>
+          </p:cNvPicPr>
+          <p:nvPr/>
+        </p:nvPicPr>
+        <p:blipFill>
+          <a:blip r:embed="rId2">
+            <a:extLst>
+              <a:ext uri="{28A0092B-C50C-407E-A947-70E740481C1C}">
+                <a14:useLocalDpi xmlns:a14="http://schemas.microsoft.com/office/drawing/2010/main" val="0"/>
+              </a:ext>
+            </a:extLst>
+          </a:blip>
+          <a:stretch>
+            <a:fillRect/>
+          </a:stretch>
+        </p:blipFill>
+        <p:spPr>
+          <a:xfrm>
+            <a:off x="400050" y="400050"/>
+            <a:ext cx="11391900" cy="6057900"/>
+          </a:xfrm>
+          <a:prstGeom prst="rect">
+            <a:avLst/>
+          </a:prstGeom>
+        </p:spPr>
+      </p:pic>
+    </p:spTree>
+    <p:extLst>
+      <p:ext uri="{BB962C8B-B14F-4D97-AF65-F5344CB8AC3E}">
+        <p14:creationId xmlns:p14="http://schemas.microsoft.com/office/powerpoint/2010/main" val="1246908999"/>
+      </p:ext>
+    </p:extLst>
+  </p:cSld>
+  <p:clrMapOvr>
+    <a:masterClrMapping/>
+  </p:clrMapOvr>
+</p:sld>
+</file>
+
 <file path=ppt/slides/slide2.xml><?xml version="1.0" encoding="utf-8"?>
 <p:sld xmlns:a="http://schemas.openxmlformats.org/drawingml/2006/main" xmlns:r="http://schemas.openxmlformats.org/officeDocument/2006/relationships" xmlns:p="http://schemas.openxmlformats.org/presentationml/2006/main">
   <p:cSld>
@@ -3719,6 +3789,203 @@
     <p:extLst>
       <p:ext uri="{BB962C8B-B14F-4D97-AF65-F5344CB8AC3E}">
         <p14:creationId xmlns:p14="http://schemas.microsoft.com/office/powerpoint/2010/main" val="95992585"/>
+      </p:ext>
+    </p:extLst>
+  </p:cSld>
+  <p:clrMapOvr>
+    <a:masterClrMapping/>
+  </p:clrMapOvr>
+</p:sld>
+</file>
+
+<file path=ppt/slides/slide7.xml><?xml version="1.0" encoding="utf-8"?>
+<p:sld xmlns:a="http://schemas.openxmlformats.org/drawingml/2006/main" xmlns:r="http://schemas.openxmlformats.org/officeDocument/2006/relationships" xmlns:p="http://schemas.openxmlformats.org/presentationml/2006/main">
+  <p:cSld>
+    <p:spTree>
+      <p:nvGrpSpPr>
+        <p:cNvPr id="1" name=""/>
+        <p:cNvGrpSpPr/>
+        <p:nvPr/>
+      </p:nvGrpSpPr>
+      <p:grpSpPr>
+        <a:xfrm>
+          <a:off x="0" y="0"/>
+          <a:ext cx="0" cy="0"/>
+          <a:chOff x="0" y="0"/>
+          <a:chExt cx="0" cy="0"/>
+        </a:xfrm>
+      </p:grpSpPr>
+      <p:pic>
+        <p:nvPicPr>
+          <p:cNvPr id="2" name="slide2" descr="Sheet 1">
+            <a:extLst>
+              <a:ext uri="{FF2B5EF4-FFF2-40B4-BE49-F238E27FC236}">
+                <a16:creationId xmlns:a16="http://schemas.microsoft.com/office/drawing/2014/main" id="{FD97D938-71C2-4507-A9E6-CDA1E01BE6F0}"/>
+              </a:ext>
+            </a:extLst>
+          </p:cNvPr>
+          <p:cNvPicPr>
+            <a:picLocks noChangeAspect="1"/>
+          </p:cNvPicPr>
+          <p:nvPr/>
+        </p:nvPicPr>
+        <p:blipFill rotWithShape="1">
+          <a:blip r:embed="rId2">
+            <a:extLst>
+              <a:ext uri="{28A0092B-C50C-407E-A947-70E740481C1C}">
+                <a14:useLocalDpi xmlns:a14="http://schemas.microsoft.com/office/drawing/2010/main" val="0"/>
+              </a:ext>
+            </a:extLst>
+          </a:blip>
+          <a:srcRect r="11650" b="3243"/>
+          <a:stretch/>
+        </p:blipFill>
+        <p:spPr>
+          <a:xfrm>
+            <a:off x="400050" y="400050"/>
+            <a:ext cx="10064750" cy="5861413"/>
+          </a:xfrm>
+          <a:prstGeom prst="rect">
+            <a:avLst/>
+          </a:prstGeom>
+        </p:spPr>
+      </p:pic>
+    </p:spTree>
+    <p:extLst>
+      <p:ext uri="{BB962C8B-B14F-4D97-AF65-F5344CB8AC3E}">
+        <p14:creationId xmlns:p14="http://schemas.microsoft.com/office/powerpoint/2010/main" val="617971141"/>
+      </p:ext>
+    </p:extLst>
+  </p:cSld>
+  <p:clrMapOvr>
+    <a:masterClrMapping/>
+  </p:clrMapOvr>
+</p:sld>
+</file>
+
+<file path=ppt/slides/slide8.xml><?xml version="1.0" encoding="utf-8"?>
+<p:sld xmlns:a="http://schemas.openxmlformats.org/drawingml/2006/main" xmlns:r="http://schemas.openxmlformats.org/officeDocument/2006/relationships" xmlns:p="http://schemas.openxmlformats.org/presentationml/2006/main">
+  <p:cSld>
+    <p:spTree>
+      <p:nvGrpSpPr>
+        <p:cNvPr id="1" name=""/>
+        <p:cNvGrpSpPr/>
+        <p:nvPr/>
+      </p:nvGrpSpPr>
+      <p:grpSpPr>
+        <a:xfrm>
+          <a:off x="0" y="0"/>
+          <a:ext cx="0" cy="0"/>
+          <a:chOff x="0" y="0"/>
+          <a:chExt cx="0" cy="0"/>
+        </a:xfrm>
+      </p:grpSpPr>
+      <p:pic>
+        <p:nvPicPr>
+          <p:cNvPr id="3" name="slide3" descr="Sheet 1 (2)">
+            <a:extLst>
+              <a:ext uri="{FF2B5EF4-FFF2-40B4-BE49-F238E27FC236}">
+                <a16:creationId xmlns:a16="http://schemas.microsoft.com/office/drawing/2014/main" id="{4315D1F0-281C-495D-B8CF-2E6A42E39888}"/>
+              </a:ext>
+            </a:extLst>
+          </p:cNvPr>
+          <p:cNvPicPr>
+            <a:picLocks noChangeAspect="1"/>
+          </p:cNvPicPr>
+          <p:nvPr/>
+        </p:nvPicPr>
+        <p:blipFill>
+          <a:blip r:embed="rId2">
+            <a:extLst>
+              <a:ext uri="{28A0092B-C50C-407E-A947-70E740481C1C}">
+                <a14:useLocalDpi xmlns:a14="http://schemas.microsoft.com/office/drawing/2010/main" val="0"/>
+              </a:ext>
+            </a:extLst>
+          </a:blip>
+          <a:stretch>
+            <a:fillRect/>
+          </a:stretch>
+        </p:blipFill>
+        <p:spPr>
+          <a:xfrm>
+            <a:off x="400050" y="400050"/>
+            <a:ext cx="11391900" cy="6057900"/>
+          </a:xfrm>
+          <a:prstGeom prst="rect">
+            <a:avLst/>
+          </a:prstGeom>
+        </p:spPr>
+      </p:pic>
+    </p:spTree>
+    <p:extLst>
+      <p:ext uri="{BB962C8B-B14F-4D97-AF65-F5344CB8AC3E}">
+        <p14:creationId xmlns:p14="http://schemas.microsoft.com/office/powerpoint/2010/main" val="65803075"/>
+      </p:ext>
+    </p:extLst>
+  </p:cSld>
+  <p:clrMapOvr>
+    <a:masterClrMapping/>
+  </p:clrMapOvr>
+</p:sld>
+</file>
+
+<file path=ppt/slides/slide9.xml><?xml version="1.0" encoding="utf-8"?>
+<p:sld xmlns:a="http://schemas.openxmlformats.org/drawingml/2006/main" xmlns:r="http://schemas.openxmlformats.org/officeDocument/2006/relationships" xmlns:p="http://schemas.openxmlformats.org/presentationml/2006/main">
+  <p:cSld>
+    <p:spTree>
+      <p:nvGrpSpPr>
+        <p:cNvPr id="1" name=""/>
+        <p:cNvGrpSpPr/>
+        <p:nvPr/>
+      </p:nvGrpSpPr>
+      <p:grpSpPr>
+        <a:xfrm>
+          <a:off x="0" y="0"/>
+          <a:ext cx="0" cy="0"/>
+          <a:chOff x="0" y="0"/>
+          <a:chExt cx="0" cy="0"/>
+        </a:xfrm>
+      </p:grpSpPr>
+      <p:pic>
+        <p:nvPicPr>
+          <p:cNvPr id="4" name="slide4" descr="Sheet 1 (3)">
+            <a:extLst>
+              <a:ext uri="{FF2B5EF4-FFF2-40B4-BE49-F238E27FC236}">
+                <a16:creationId xmlns:a16="http://schemas.microsoft.com/office/drawing/2014/main" id="{AEF97A33-B01F-4383-BFB2-3455F50A0E54}"/>
+              </a:ext>
+            </a:extLst>
+          </p:cNvPr>
+          <p:cNvPicPr>
+            <a:picLocks noChangeAspect="1"/>
+          </p:cNvPicPr>
+          <p:nvPr/>
+        </p:nvPicPr>
+        <p:blipFill>
+          <a:blip r:embed="rId2">
+            <a:extLst>
+              <a:ext uri="{28A0092B-C50C-407E-A947-70E740481C1C}">
+                <a14:useLocalDpi xmlns:a14="http://schemas.microsoft.com/office/drawing/2010/main" val="0"/>
+              </a:ext>
+            </a:extLst>
+          </a:blip>
+          <a:stretch>
+            <a:fillRect/>
+          </a:stretch>
+        </p:blipFill>
+        <p:spPr>
+          <a:xfrm>
+            <a:off x="400050" y="400050"/>
+            <a:ext cx="11391900" cy="6057900"/>
+          </a:xfrm>
+          <a:prstGeom prst="rect">
+            <a:avLst/>
+          </a:prstGeom>
+        </p:spPr>
+      </p:pic>
+    </p:spTree>
+    <p:extLst>
+      <p:ext uri="{BB962C8B-B14F-4D97-AF65-F5344CB8AC3E}">
+        <p14:creationId xmlns:p14="http://schemas.microsoft.com/office/powerpoint/2010/main" val="3449172404"/>
       </p:ext>
     </p:extLst>
   </p:cSld>

</xml_diff>

<commit_message>
India & China added to presentation
</commit_message>
<xml_diff>
--- a/Visualization/GlobalCO2Emission.pptx
+++ b/Visualization/GlobalCO2Emission.pptx
@@ -5,7 +5,7 @@
     <p:sldMasterId id="2147483648" r:id="rId1"/>
   </p:sldMasterIdLst>
   <p:notesMasterIdLst>
-    <p:notesMasterId r:id="rId14"/>
+    <p:notesMasterId r:id="rId16"/>
   </p:notesMasterIdLst>
   <p:sldIdLst>
     <p:sldId id="256" r:id="rId2"/>
@@ -19,7 +19,9 @@
     <p:sldId id="263" r:id="rId10"/>
     <p:sldId id="264" r:id="rId11"/>
     <p:sldId id="265" r:id="rId12"/>
-    <p:sldId id="267" r:id="rId13"/>
+    <p:sldId id="268" r:id="rId13"/>
+    <p:sldId id="269" r:id="rId14"/>
+    <p:sldId id="267" r:id="rId15"/>
   </p:sldIdLst>
   <p:sldSz cx="12192000" cy="6858000"/>
   <p:notesSz cx="6858000" cy="9144000"/>
@@ -5492,6 +5494,1382 @@
 </file>
 
 <file path=ppt/slides/slide12.xml><?xml version="1.0" encoding="utf-8"?>
+<p:sld xmlns:a="http://schemas.openxmlformats.org/drawingml/2006/main" xmlns:r="http://schemas.openxmlformats.org/officeDocument/2006/relationships" xmlns:p="http://schemas.openxmlformats.org/presentationml/2006/main">
+  <p:cSld>
+    <p:bg>
+      <p:bgPr>
+        <a:solidFill>
+          <a:schemeClr val="bg1"/>
+        </a:solidFill>
+        <a:effectLst/>
+      </p:bgPr>
+    </p:bg>
+    <p:spTree>
+      <p:nvGrpSpPr>
+        <p:cNvPr id="1" name=""/>
+        <p:cNvGrpSpPr/>
+        <p:nvPr/>
+      </p:nvGrpSpPr>
+      <p:grpSpPr>
+        <a:xfrm>
+          <a:off x="0" y="0"/>
+          <a:ext cx="0" cy="0"/>
+          <a:chOff x="0" y="0"/>
+          <a:chExt cx="0" cy="0"/>
+        </a:xfrm>
+      </p:grpSpPr>
+      <p:sp>
+        <p:nvSpPr>
+          <p:cNvPr id="7" name="Rectangle 6">
+            <a:extLst>
+              <a:ext uri="{FF2B5EF4-FFF2-40B4-BE49-F238E27FC236}">
+                <a16:creationId xmlns:a16="http://schemas.microsoft.com/office/drawing/2014/main" id="{F3060C83-F051-4F0E-ABAD-AA0DFC48B218}"/>
+              </a:ext>
+              <a:ext uri="{C183D7F6-B498-43B3-948B-1728B52AA6E4}">
+                <adec:decorative xmlns:adec="http://schemas.microsoft.com/office/drawing/2017/decorative" val="1"/>
+              </a:ext>
+            </a:extLst>
+          </p:cNvPr>
+          <p:cNvSpPr>
+            <a:spLocks noGrp="1" noRot="1" noChangeAspect="1" noMove="1" noResize="1" noEditPoints="1" noAdjustHandles="1" noChangeArrowheads="1" noChangeShapeType="1" noTextEdit="1"/>
+          </p:cNvSpPr>
+          <p:nvPr>
+            <p:extLst>
+              <p:ext uri="{386F3935-93C4-4BCD-93E2-E3B085C9AB24}">
+                <p16:designElem xmlns:p16="http://schemas.microsoft.com/office/powerpoint/2015/main" val="1"/>
+              </p:ext>
+            </p:extLst>
+          </p:nvPr>
+        </p:nvSpPr>
+        <p:spPr>
+          <a:xfrm>
+            <a:off x="0" y="0"/>
+            <a:ext cx="12192000" cy="6858000"/>
+          </a:xfrm>
+          <a:prstGeom prst="rect">
+            <a:avLst/>
+          </a:prstGeom>
+          <a:solidFill>
+            <a:schemeClr val="bg1"/>
+          </a:solidFill>
+          <a:ln>
+            <a:noFill/>
+          </a:ln>
+        </p:spPr>
+        <p:style>
+          <a:lnRef idx="2">
+            <a:schemeClr val="accent1">
+              <a:shade val="50000"/>
+            </a:schemeClr>
+          </a:lnRef>
+          <a:fillRef idx="1">
+            <a:schemeClr val="accent1"/>
+          </a:fillRef>
+          <a:effectRef idx="0">
+            <a:schemeClr val="accent1"/>
+          </a:effectRef>
+          <a:fontRef idx="minor">
+            <a:schemeClr val="lt1"/>
+          </a:fontRef>
+        </p:style>
+        <p:txBody>
+          <a:bodyPr rtlCol="0" anchor="ctr"/>
+          <a:lstStyle/>
+          <a:p>
+            <a:pPr algn="ctr"/>
+            <a:endParaRPr lang="en-US" dirty="0"/>
+          </a:p>
+        </p:txBody>
+      </p:sp>
+      <p:sp>
+        <p:nvSpPr>
+          <p:cNvPr id="9" name="Freeform: Shape 8">
+            <a:extLst>
+              <a:ext uri="{FF2B5EF4-FFF2-40B4-BE49-F238E27FC236}">
+                <a16:creationId xmlns:a16="http://schemas.microsoft.com/office/drawing/2014/main" id="{83C98ABE-055B-441F-B07E-44F97F083C39}"/>
+              </a:ext>
+              <a:ext uri="{C183D7F6-B498-43B3-948B-1728B52AA6E4}">
+                <adec:decorative xmlns:adec="http://schemas.microsoft.com/office/drawing/2017/decorative" val="1"/>
+              </a:ext>
+            </a:extLst>
+          </p:cNvPr>
+          <p:cNvSpPr>
+            <a:spLocks noGrp="1" noRot="1" noChangeAspect="1" noMove="1" noResize="1" noEditPoints="1" noAdjustHandles="1" noChangeArrowheads="1" noChangeShapeType="1" noTextEdit="1"/>
+          </p:cNvSpPr>
+          <p:nvPr>
+            <p:extLst>
+              <p:ext uri="{386F3935-93C4-4BCD-93E2-E3B085C9AB24}">
+                <p16:designElem xmlns:p16="http://schemas.microsoft.com/office/powerpoint/2015/main" val="1"/>
+              </p:ext>
+            </p:extLst>
+          </p:nvPr>
+        </p:nvSpPr>
+        <p:spPr>
+          <a:xfrm rot="18900000" flipH="1">
+            <a:off x="-376156" y="-253670"/>
+            <a:ext cx="1827638" cy="1376989"/>
+          </a:xfrm>
+          <a:custGeom>
+            <a:avLst/>
+            <a:gdLst>
+              <a:gd name="connsiteX0" fmla="*/ 0 w 1827638"/>
+              <a:gd name="connsiteY0" fmla="*/ 987379 h 1376989"/>
+              <a:gd name="connsiteX1" fmla="*/ 987379 w 1827638"/>
+              <a:gd name="connsiteY1" fmla="*/ 0 h 1376989"/>
+              <a:gd name="connsiteX2" fmla="*/ 1827638 w 1827638"/>
+              <a:gd name="connsiteY2" fmla="*/ 840260 h 1376989"/>
+              <a:gd name="connsiteX3" fmla="*/ 1827638 w 1827638"/>
+              <a:gd name="connsiteY3" fmla="*/ 1376989 h 1376989"/>
+              <a:gd name="connsiteX4" fmla="*/ 0 w 1827638"/>
+              <a:gd name="connsiteY4" fmla="*/ 1376989 h 1376989"/>
+            </a:gdLst>
+            <a:ahLst/>
+            <a:cxnLst>
+              <a:cxn ang="0">
+                <a:pos x="connsiteX0" y="connsiteY0"/>
+              </a:cxn>
+              <a:cxn ang="0">
+                <a:pos x="connsiteX1" y="connsiteY1"/>
+              </a:cxn>
+              <a:cxn ang="0">
+                <a:pos x="connsiteX2" y="connsiteY2"/>
+              </a:cxn>
+              <a:cxn ang="0">
+                <a:pos x="connsiteX3" y="connsiteY3"/>
+              </a:cxn>
+              <a:cxn ang="0">
+                <a:pos x="connsiteX4" y="connsiteY4"/>
+              </a:cxn>
+            </a:cxnLst>
+            <a:rect l="l" t="t" r="r" b="b"/>
+            <a:pathLst>
+              <a:path w="1827638" h="1376989">
+                <a:moveTo>
+                  <a:pt x="0" y="987379"/>
+                </a:moveTo>
+                <a:lnTo>
+                  <a:pt x="987379" y="0"/>
+                </a:lnTo>
+                <a:lnTo>
+                  <a:pt x="1827638" y="840260"/>
+                </a:lnTo>
+                <a:lnTo>
+                  <a:pt x="1827638" y="1376989"/>
+                </a:lnTo>
+                <a:lnTo>
+                  <a:pt x="0" y="1376989"/>
+                </a:lnTo>
+                <a:close/>
+              </a:path>
+            </a:pathLst>
+          </a:custGeom>
+          <a:solidFill>
+            <a:schemeClr val="accent1">
+              <a:alpha val="30000"/>
+            </a:schemeClr>
+          </a:solidFill>
+          <a:ln>
+            <a:noFill/>
+          </a:ln>
+        </p:spPr>
+        <p:style>
+          <a:lnRef idx="2">
+            <a:schemeClr val="accent1">
+              <a:shade val="50000"/>
+            </a:schemeClr>
+          </a:lnRef>
+          <a:fillRef idx="1">
+            <a:schemeClr val="accent1"/>
+          </a:fillRef>
+          <a:effectRef idx="0">
+            <a:schemeClr val="accent1"/>
+          </a:effectRef>
+          <a:fontRef idx="minor">
+            <a:schemeClr val="lt1"/>
+          </a:fontRef>
+        </p:style>
+        <p:txBody>
+          <a:bodyPr rtlCol="0" anchor="ctr"/>
+          <a:lstStyle/>
+          <a:p>
+            <a:pPr algn="ctr"/>
+            <a:endParaRPr lang="en-US" dirty="0"/>
+          </a:p>
+        </p:txBody>
+      </p:sp>
+      <p:sp>
+        <p:nvSpPr>
+          <p:cNvPr id="11" name="Rectangle 10">
+            <a:extLst>
+              <a:ext uri="{FF2B5EF4-FFF2-40B4-BE49-F238E27FC236}">
+                <a16:creationId xmlns:a16="http://schemas.microsoft.com/office/drawing/2014/main" id="{29FDB030-9B49-4CED-8CCD-4D99382388AC}"/>
+              </a:ext>
+              <a:ext uri="{C183D7F6-B498-43B3-948B-1728B52AA6E4}">
+                <adec:decorative xmlns:adec="http://schemas.microsoft.com/office/drawing/2017/decorative" val="1"/>
+              </a:ext>
+            </a:extLst>
+          </p:cNvPr>
+          <p:cNvSpPr>
+            <a:spLocks noGrp="1" noRot="1" noChangeAspect="1" noMove="1" noResize="1" noEditPoints="1" noAdjustHandles="1" noChangeArrowheads="1" noChangeShapeType="1" noTextEdit="1"/>
+          </p:cNvSpPr>
+          <p:nvPr>
+            <p:extLst>
+              <p:ext uri="{386F3935-93C4-4BCD-93E2-E3B085C9AB24}">
+                <p16:designElem xmlns:p16="http://schemas.microsoft.com/office/powerpoint/2015/main" val="1"/>
+              </p:ext>
+            </p:extLst>
+          </p:nvPr>
+        </p:nvSpPr>
+        <p:spPr>
+          <a:xfrm rot="18900000" flipH="1">
+            <a:off x="891641" y="422146"/>
+            <a:ext cx="645368" cy="645368"/>
+          </a:xfrm>
+          <a:prstGeom prst="rect">
+            <a:avLst/>
+          </a:prstGeom>
+          <a:solidFill>
+            <a:schemeClr val="accent1">
+              <a:alpha val="30000"/>
+            </a:schemeClr>
+          </a:solidFill>
+          <a:ln>
+            <a:noFill/>
+          </a:ln>
+        </p:spPr>
+        <p:style>
+          <a:lnRef idx="2">
+            <a:schemeClr val="accent1">
+              <a:shade val="50000"/>
+            </a:schemeClr>
+          </a:lnRef>
+          <a:fillRef idx="1">
+            <a:schemeClr val="accent1"/>
+          </a:fillRef>
+          <a:effectRef idx="0">
+            <a:schemeClr val="accent1"/>
+          </a:effectRef>
+          <a:fontRef idx="minor">
+            <a:schemeClr val="lt1"/>
+          </a:fontRef>
+        </p:style>
+        <p:txBody>
+          <a:bodyPr rtlCol="0" anchor="ctr"/>
+          <a:lstStyle/>
+          <a:p>
+            <a:pPr algn="ctr"/>
+            <a:endParaRPr lang="en-US"/>
+          </a:p>
+        </p:txBody>
+      </p:sp>
+      <p:sp>
+        <p:nvSpPr>
+          <p:cNvPr id="13" name="Rectangle 12">
+            <a:extLst>
+              <a:ext uri="{FF2B5EF4-FFF2-40B4-BE49-F238E27FC236}">
+                <a16:creationId xmlns:a16="http://schemas.microsoft.com/office/drawing/2014/main" id="{3783CA14-24A1-485C-8B30-D6A5D87987AD}"/>
+              </a:ext>
+              <a:ext uri="{C183D7F6-B498-43B3-948B-1728B52AA6E4}">
+                <adec:decorative xmlns:adec="http://schemas.microsoft.com/office/drawing/2017/decorative" val="1"/>
+              </a:ext>
+            </a:extLst>
+          </p:cNvPr>
+          <p:cNvSpPr>
+            <a:spLocks noGrp="1" noRot="1" noChangeAspect="1" noMove="1" noResize="1" noEditPoints="1" noAdjustHandles="1" noChangeArrowheads="1" noChangeShapeType="1" noTextEdit="1"/>
+          </p:cNvSpPr>
+          <p:nvPr>
+            <p:extLst>
+              <p:ext uri="{386F3935-93C4-4BCD-93E2-E3B085C9AB24}">
+                <p16:designElem xmlns:p16="http://schemas.microsoft.com/office/powerpoint/2015/main" val="1"/>
+              </p:ext>
+            </p:extLst>
+          </p:nvPr>
+        </p:nvSpPr>
+        <p:spPr>
+          <a:xfrm rot="18900000" flipH="1">
+            <a:off x="10043482" y="655140"/>
+            <a:ext cx="687472" cy="687472"/>
+          </a:xfrm>
+          <a:prstGeom prst="rect">
+            <a:avLst/>
+          </a:prstGeom>
+          <a:solidFill>
+            <a:schemeClr val="accent4">
+              <a:alpha val="30000"/>
+            </a:schemeClr>
+          </a:solidFill>
+          <a:ln>
+            <a:noFill/>
+          </a:ln>
+        </p:spPr>
+        <p:style>
+          <a:lnRef idx="2">
+            <a:schemeClr val="accent1">
+              <a:shade val="50000"/>
+            </a:schemeClr>
+          </a:lnRef>
+          <a:fillRef idx="1">
+            <a:schemeClr val="accent1"/>
+          </a:fillRef>
+          <a:effectRef idx="0">
+            <a:schemeClr val="accent1"/>
+          </a:effectRef>
+          <a:fontRef idx="minor">
+            <a:schemeClr val="lt1"/>
+          </a:fontRef>
+        </p:style>
+        <p:txBody>
+          <a:bodyPr rtlCol="0" anchor="ctr"/>
+          <a:lstStyle/>
+          <a:p>
+            <a:pPr algn="ctr"/>
+            <a:endParaRPr lang="en-US"/>
+          </a:p>
+        </p:txBody>
+      </p:sp>
+      <p:sp>
+        <p:nvSpPr>
+          <p:cNvPr id="15" name="Freeform: Shape 14">
+            <a:extLst>
+              <a:ext uri="{FF2B5EF4-FFF2-40B4-BE49-F238E27FC236}">
+                <a16:creationId xmlns:a16="http://schemas.microsoft.com/office/drawing/2014/main" id="{9A97C86A-04D6-40F7-AE84-31AB43E6A846}"/>
+              </a:ext>
+              <a:ext uri="{C183D7F6-B498-43B3-948B-1728B52AA6E4}">
+                <adec:decorative xmlns:adec="http://schemas.microsoft.com/office/drawing/2017/decorative" val="1"/>
+              </a:ext>
+            </a:extLst>
+          </p:cNvPr>
+          <p:cNvSpPr>
+            <a:spLocks noGrp="1" noRot="1" noChangeAspect="1" noMove="1" noResize="1" noEditPoints="1" noAdjustHandles="1" noChangeArrowheads="1" noChangeShapeType="1" noTextEdit="1"/>
+          </p:cNvSpPr>
+          <p:nvPr>
+            <p:extLst>
+              <p:ext uri="{386F3935-93C4-4BCD-93E2-E3B085C9AB24}">
+                <p16:designElem xmlns:p16="http://schemas.microsoft.com/office/powerpoint/2015/main" val="1"/>
+              </p:ext>
+            </p:extLst>
+          </p:nvPr>
+        </p:nvSpPr>
+        <p:spPr>
+          <a:xfrm rot="10800000" flipH="1">
+            <a:off x="9356643" y="0"/>
+            <a:ext cx="2835357" cy="1480837"/>
+          </a:xfrm>
+          <a:custGeom>
+            <a:avLst/>
+            <a:gdLst>
+              <a:gd name="connsiteX0" fmla="*/ 2835357 w 2835357"/>
+              <a:gd name="connsiteY0" fmla="*/ 1480837 h 1480837"/>
+              <a:gd name="connsiteX1" fmla="*/ 0 w 2835357"/>
+              <a:gd name="connsiteY1" fmla="*/ 1480837 h 1480837"/>
+              <a:gd name="connsiteX2" fmla="*/ 1552727 w 2835357"/>
+              <a:gd name="connsiteY2" fmla="*/ 0 h 1480837"/>
+              <a:gd name="connsiteX3" fmla="*/ 2835357 w 2835357"/>
+              <a:gd name="connsiteY3" fmla="*/ 1223245 h 1480837"/>
+            </a:gdLst>
+            <a:ahLst/>
+            <a:cxnLst>
+              <a:cxn ang="0">
+                <a:pos x="connsiteX0" y="connsiteY0"/>
+              </a:cxn>
+              <a:cxn ang="0">
+                <a:pos x="connsiteX1" y="connsiteY1"/>
+              </a:cxn>
+              <a:cxn ang="0">
+                <a:pos x="connsiteX2" y="connsiteY2"/>
+              </a:cxn>
+              <a:cxn ang="0">
+                <a:pos x="connsiteX3" y="connsiteY3"/>
+              </a:cxn>
+            </a:cxnLst>
+            <a:rect l="l" t="t" r="r" b="b"/>
+            <a:pathLst>
+              <a:path w="2835357" h="1480837">
+                <a:moveTo>
+                  <a:pt x="2835357" y="1480837"/>
+                </a:moveTo>
+                <a:lnTo>
+                  <a:pt x="0" y="1480837"/>
+                </a:lnTo>
+                <a:lnTo>
+                  <a:pt x="1552727" y="0"/>
+                </a:lnTo>
+                <a:lnTo>
+                  <a:pt x="2835357" y="1223245"/>
+                </a:lnTo>
+                <a:close/>
+              </a:path>
+            </a:pathLst>
+          </a:custGeom>
+          <a:solidFill>
+            <a:schemeClr val="accent4">
+              <a:alpha val="30000"/>
+            </a:schemeClr>
+          </a:solidFill>
+          <a:ln>
+            <a:noFill/>
+          </a:ln>
+        </p:spPr>
+        <p:style>
+          <a:lnRef idx="2">
+            <a:schemeClr val="accent1">
+              <a:shade val="50000"/>
+            </a:schemeClr>
+          </a:lnRef>
+          <a:fillRef idx="1">
+            <a:schemeClr val="accent1"/>
+          </a:fillRef>
+          <a:effectRef idx="0">
+            <a:schemeClr val="accent1"/>
+          </a:effectRef>
+          <a:fontRef idx="minor">
+            <a:schemeClr val="lt1"/>
+          </a:fontRef>
+        </p:style>
+        <p:txBody>
+          <a:bodyPr wrap="square" rtlCol="0" anchor="ctr">
+            <a:noAutofit/>
+          </a:bodyPr>
+          <a:lstStyle/>
+          <a:p>
+            <a:pPr algn="ctr"/>
+            <a:endParaRPr lang="en-US" dirty="0"/>
+          </a:p>
+        </p:txBody>
+      </p:sp>
+      <p:sp>
+        <p:nvSpPr>
+          <p:cNvPr id="17" name="Isosceles Triangle 16">
+            <a:extLst>
+              <a:ext uri="{FF2B5EF4-FFF2-40B4-BE49-F238E27FC236}">
+                <a16:creationId xmlns:a16="http://schemas.microsoft.com/office/drawing/2014/main" id="{FF9F2414-84E8-453E-B1F3-389FDE8192D9}"/>
+              </a:ext>
+              <a:ext uri="{C183D7F6-B498-43B3-948B-1728B52AA6E4}">
+                <adec:decorative xmlns:adec="http://schemas.microsoft.com/office/drawing/2017/decorative" val="1"/>
+              </a:ext>
+            </a:extLst>
+          </p:cNvPr>
+          <p:cNvSpPr>
+            <a:spLocks noGrp="1" noRot="1" noChangeAspect="1" noMove="1" noResize="1" noEditPoints="1" noAdjustHandles="1" noChangeArrowheads="1" noChangeShapeType="1" noTextEdit="1"/>
+          </p:cNvSpPr>
+          <p:nvPr>
+            <p:extLst>
+              <p:ext uri="{386F3935-93C4-4BCD-93E2-E3B085C9AB24}">
+                <p16:designElem xmlns:p16="http://schemas.microsoft.com/office/powerpoint/2015/main" val="1"/>
+              </p:ext>
+            </p:extLst>
+          </p:nvPr>
+        </p:nvSpPr>
+        <p:spPr>
+          <a:xfrm flipH="1">
+            <a:off x="7976344" y="6115501"/>
+            <a:ext cx="1494513" cy="742499"/>
+          </a:xfrm>
+          <a:prstGeom prst="triangle">
+            <a:avLst/>
+          </a:prstGeom>
+          <a:solidFill>
+            <a:schemeClr val="accent1">
+              <a:alpha val="30000"/>
+            </a:schemeClr>
+          </a:solidFill>
+          <a:ln>
+            <a:noFill/>
+          </a:ln>
+        </p:spPr>
+        <p:style>
+          <a:lnRef idx="2">
+            <a:schemeClr val="accent1">
+              <a:shade val="50000"/>
+            </a:schemeClr>
+          </a:lnRef>
+          <a:fillRef idx="1">
+            <a:schemeClr val="accent1"/>
+          </a:fillRef>
+          <a:effectRef idx="0">
+            <a:schemeClr val="accent1"/>
+          </a:effectRef>
+          <a:fontRef idx="minor">
+            <a:schemeClr val="lt1"/>
+          </a:fontRef>
+        </p:style>
+        <p:txBody>
+          <a:bodyPr rtlCol="0" anchor="ctr"/>
+          <a:lstStyle/>
+          <a:p>
+            <a:pPr algn="ctr"/>
+            <a:endParaRPr lang="en-US"/>
+          </a:p>
+        </p:txBody>
+      </p:sp>
+      <p:pic>
+        <p:nvPicPr>
+          <p:cNvPr id="2" name="slide2" descr="China">
+            <a:extLst>
+              <a:ext uri="{FF2B5EF4-FFF2-40B4-BE49-F238E27FC236}">
+                <a16:creationId xmlns:a16="http://schemas.microsoft.com/office/drawing/2014/main" id="{C0ADA12E-AAF4-4E14-BC68-0C55EFDB79A5}"/>
+              </a:ext>
+            </a:extLst>
+          </p:cNvPr>
+          <p:cNvPicPr>
+            <a:picLocks noChangeAspect="1"/>
+          </p:cNvPicPr>
+          <p:nvPr/>
+        </p:nvPicPr>
+        <p:blipFill rotWithShape="1">
+          <a:blip r:embed="rId2">
+            <a:extLst>
+              <a:ext uri="{28A0092B-C50C-407E-A947-70E740481C1C}">
+                <a14:useLocalDpi xmlns:a14="http://schemas.microsoft.com/office/drawing/2010/main" val="0"/>
+              </a:ext>
+            </a:extLst>
+          </a:blip>
+          <a:srcRect t="5644" r="12126" b="3691"/>
+          <a:stretch/>
+        </p:blipFill>
+        <p:spPr>
+          <a:xfrm>
+            <a:off x="864952" y="957943"/>
+            <a:ext cx="9193448" cy="5050971"/>
+          </a:xfrm>
+          <a:prstGeom prst="rect">
+            <a:avLst/>
+          </a:prstGeom>
+          <a:ln>
+            <a:noFill/>
+          </a:ln>
+        </p:spPr>
+      </p:pic>
+      <p:sp>
+        <p:nvSpPr>
+          <p:cNvPr id="19" name="Isosceles Triangle 18">
+            <a:extLst>
+              <a:ext uri="{FF2B5EF4-FFF2-40B4-BE49-F238E27FC236}">
+                <a16:creationId xmlns:a16="http://schemas.microsoft.com/office/drawing/2014/main" id="{3ECA69A1-7536-43AC-85EF-C7106179F5ED}"/>
+              </a:ext>
+              <a:ext uri="{C183D7F6-B498-43B3-948B-1728B52AA6E4}">
+                <adec:decorative xmlns:adec="http://schemas.microsoft.com/office/drawing/2017/decorative" val="1"/>
+              </a:ext>
+            </a:extLst>
+          </p:cNvPr>
+          <p:cNvSpPr>
+            <a:spLocks noGrp="1" noRot="1" noChangeAspect="1" noMove="1" noResize="1" noEditPoints="1" noAdjustHandles="1" noChangeArrowheads="1" noChangeShapeType="1" noTextEdit="1"/>
+          </p:cNvSpPr>
+          <p:nvPr>
+            <p:extLst>
+              <p:ext uri="{386F3935-93C4-4BCD-93E2-E3B085C9AB24}">
+                <p16:designElem xmlns:p16="http://schemas.microsoft.com/office/powerpoint/2015/main" val="1"/>
+              </p:ext>
+            </p:extLst>
+          </p:nvPr>
+        </p:nvSpPr>
+        <p:spPr>
+          <a:xfrm flipH="1">
+            <a:off x="7604080" y="6453143"/>
+            <a:ext cx="814903" cy="404857"/>
+          </a:xfrm>
+          <a:prstGeom prst="triangle">
+            <a:avLst/>
+          </a:prstGeom>
+          <a:solidFill>
+            <a:schemeClr val="accent1">
+              <a:alpha val="30000"/>
+            </a:schemeClr>
+          </a:solidFill>
+          <a:ln>
+            <a:noFill/>
+          </a:ln>
+        </p:spPr>
+        <p:style>
+          <a:lnRef idx="2">
+            <a:schemeClr val="accent1">
+              <a:shade val="50000"/>
+            </a:schemeClr>
+          </a:lnRef>
+          <a:fillRef idx="1">
+            <a:schemeClr val="accent1"/>
+          </a:fillRef>
+          <a:effectRef idx="0">
+            <a:schemeClr val="accent1"/>
+          </a:effectRef>
+          <a:fontRef idx="minor">
+            <a:schemeClr val="lt1"/>
+          </a:fontRef>
+        </p:style>
+        <p:txBody>
+          <a:bodyPr rtlCol="0" anchor="ctr"/>
+          <a:lstStyle/>
+          <a:p>
+            <a:pPr algn="ctr"/>
+            <a:endParaRPr lang="en-US"/>
+          </a:p>
+        </p:txBody>
+      </p:sp>
+      <p:sp>
+        <p:nvSpPr>
+          <p:cNvPr id="3" name="CasellaDiTesto 2">
+            <a:extLst>
+              <a:ext uri="{FF2B5EF4-FFF2-40B4-BE49-F238E27FC236}">
+                <a16:creationId xmlns:a16="http://schemas.microsoft.com/office/drawing/2014/main" id="{C8108EDC-7A6E-63C6-1C5C-124273E314F8}"/>
+              </a:ext>
+            </a:extLst>
+          </p:cNvPr>
+          <p:cNvSpPr txBox="1"/>
+          <p:nvPr/>
+        </p:nvSpPr>
+        <p:spPr>
+          <a:xfrm>
+            <a:off x="1943100" y="736600"/>
+            <a:ext cx="2971800" cy="1415723"/>
+          </a:xfrm>
+          <a:prstGeom prst="rect">
+            <a:avLst/>
+          </a:prstGeom>
+          <a:noFill/>
+        </p:spPr>
+        <p:txBody>
+          <a:bodyPr vert="horz" lIns="91440" tIns="45720" rIns="91440" bIns="45720" rtlCol="0" anchor="ctr">
+            <a:normAutofit/>
+          </a:bodyPr>
+          <a:lstStyle/>
+          <a:p>
+            <a:pPr algn="ctr">
+              <a:lnSpc>
+                <a:spcPct val="90000"/>
+              </a:lnSpc>
+              <a:spcBef>
+                <a:spcPct val="0"/>
+              </a:spcBef>
+              <a:spcAft>
+                <a:spcPts val="600"/>
+              </a:spcAft>
+            </a:pPr>
+            <a:r>
+              <a:rPr lang="en-US" sz="2400" kern="1200" dirty="0">
+                <a:latin typeface="+mj-lt"/>
+                <a:ea typeface="+mj-ea"/>
+                <a:cs typeface="+mj-cs"/>
+              </a:rPr>
+              <a:t>Carbon emissions prediction for </a:t>
+            </a:r>
+            <a:r>
+              <a:rPr lang="en-US" sz="2400" dirty="0">
+                <a:latin typeface="+mj-lt"/>
+                <a:ea typeface="+mj-ea"/>
+                <a:cs typeface="+mj-cs"/>
+              </a:rPr>
+              <a:t>China</a:t>
+            </a:r>
+            <a:endParaRPr lang="en-US" sz="2400" kern="1200" dirty="0">
+              <a:latin typeface="+mj-lt"/>
+              <a:ea typeface="+mj-ea"/>
+              <a:cs typeface="+mj-cs"/>
+            </a:endParaRPr>
+          </a:p>
+        </p:txBody>
+      </p:sp>
+    </p:spTree>
+    <p:extLst>
+      <p:ext uri="{BB962C8B-B14F-4D97-AF65-F5344CB8AC3E}">
+        <p14:creationId xmlns:p14="http://schemas.microsoft.com/office/powerpoint/2010/main" val="4252301792"/>
+      </p:ext>
+    </p:extLst>
+  </p:cSld>
+  <p:clrMapOvr>
+    <a:masterClrMapping/>
+  </p:clrMapOvr>
+</p:sld>
+</file>
+
+<file path=ppt/slides/slide13.xml><?xml version="1.0" encoding="utf-8"?>
+<p:sld xmlns:a="http://schemas.openxmlformats.org/drawingml/2006/main" xmlns:r="http://schemas.openxmlformats.org/officeDocument/2006/relationships" xmlns:p="http://schemas.openxmlformats.org/presentationml/2006/main">
+  <p:cSld>
+    <p:bg>
+      <p:bgPr>
+        <a:solidFill>
+          <a:schemeClr val="bg1"/>
+        </a:solidFill>
+        <a:effectLst/>
+      </p:bgPr>
+    </p:bg>
+    <p:spTree>
+      <p:nvGrpSpPr>
+        <p:cNvPr id="1" name=""/>
+        <p:cNvGrpSpPr/>
+        <p:nvPr/>
+      </p:nvGrpSpPr>
+      <p:grpSpPr>
+        <a:xfrm>
+          <a:off x="0" y="0"/>
+          <a:ext cx="0" cy="0"/>
+          <a:chOff x="0" y="0"/>
+          <a:chExt cx="0" cy="0"/>
+        </a:xfrm>
+      </p:grpSpPr>
+      <p:sp>
+        <p:nvSpPr>
+          <p:cNvPr id="8" name="Rectangle 7">
+            <a:extLst>
+              <a:ext uri="{FF2B5EF4-FFF2-40B4-BE49-F238E27FC236}">
+                <a16:creationId xmlns:a16="http://schemas.microsoft.com/office/drawing/2014/main" id="{F3060C83-F051-4F0E-ABAD-AA0DFC48B218}"/>
+              </a:ext>
+              <a:ext uri="{C183D7F6-B498-43B3-948B-1728B52AA6E4}">
+                <adec:decorative xmlns:adec="http://schemas.microsoft.com/office/drawing/2017/decorative" val="1"/>
+              </a:ext>
+            </a:extLst>
+          </p:cNvPr>
+          <p:cNvSpPr>
+            <a:spLocks noGrp="1" noRot="1" noChangeAspect="1" noMove="1" noResize="1" noEditPoints="1" noAdjustHandles="1" noChangeArrowheads="1" noChangeShapeType="1" noTextEdit="1"/>
+          </p:cNvSpPr>
+          <p:nvPr>
+            <p:extLst>
+              <p:ext uri="{386F3935-93C4-4BCD-93E2-E3B085C9AB24}">
+                <p16:designElem xmlns:p16="http://schemas.microsoft.com/office/powerpoint/2015/main" val="1"/>
+              </p:ext>
+            </p:extLst>
+          </p:nvPr>
+        </p:nvSpPr>
+        <p:spPr>
+          <a:xfrm>
+            <a:off x="0" y="0"/>
+            <a:ext cx="12192000" cy="6858000"/>
+          </a:xfrm>
+          <a:prstGeom prst="rect">
+            <a:avLst/>
+          </a:prstGeom>
+          <a:solidFill>
+            <a:schemeClr val="bg1"/>
+          </a:solidFill>
+          <a:ln>
+            <a:noFill/>
+          </a:ln>
+        </p:spPr>
+        <p:style>
+          <a:lnRef idx="2">
+            <a:schemeClr val="accent1">
+              <a:shade val="50000"/>
+            </a:schemeClr>
+          </a:lnRef>
+          <a:fillRef idx="1">
+            <a:schemeClr val="accent1"/>
+          </a:fillRef>
+          <a:effectRef idx="0">
+            <a:schemeClr val="accent1"/>
+          </a:effectRef>
+          <a:fontRef idx="minor">
+            <a:schemeClr val="lt1"/>
+          </a:fontRef>
+        </p:style>
+        <p:txBody>
+          <a:bodyPr rtlCol="0" anchor="ctr"/>
+          <a:lstStyle/>
+          <a:p>
+            <a:pPr algn="ctr"/>
+            <a:endParaRPr lang="en-US" dirty="0"/>
+          </a:p>
+        </p:txBody>
+      </p:sp>
+      <p:sp>
+        <p:nvSpPr>
+          <p:cNvPr id="10" name="Freeform: Shape 9">
+            <a:extLst>
+              <a:ext uri="{FF2B5EF4-FFF2-40B4-BE49-F238E27FC236}">
+                <a16:creationId xmlns:a16="http://schemas.microsoft.com/office/drawing/2014/main" id="{83C98ABE-055B-441F-B07E-44F97F083C39}"/>
+              </a:ext>
+              <a:ext uri="{C183D7F6-B498-43B3-948B-1728B52AA6E4}">
+                <adec:decorative xmlns:adec="http://schemas.microsoft.com/office/drawing/2017/decorative" val="1"/>
+              </a:ext>
+            </a:extLst>
+          </p:cNvPr>
+          <p:cNvSpPr>
+            <a:spLocks noGrp="1" noRot="1" noChangeAspect="1" noMove="1" noResize="1" noEditPoints="1" noAdjustHandles="1" noChangeArrowheads="1" noChangeShapeType="1" noTextEdit="1"/>
+          </p:cNvSpPr>
+          <p:nvPr>
+            <p:extLst>
+              <p:ext uri="{386F3935-93C4-4BCD-93E2-E3B085C9AB24}">
+                <p16:designElem xmlns:p16="http://schemas.microsoft.com/office/powerpoint/2015/main" val="1"/>
+              </p:ext>
+            </p:extLst>
+          </p:nvPr>
+        </p:nvSpPr>
+        <p:spPr>
+          <a:xfrm rot="18900000" flipH="1">
+            <a:off x="-376156" y="-253670"/>
+            <a:ext cx="1827638" cy="1376989"/>
+          </a:xfrm>
+          <a:custGeom>
+            <a:avLst/>
+            <a:gdLst>
+              <a:gd name="connsiteX0" fmla="*/ 0 w 1827638"/>
+              <a:gd name="connsiteY0" fmla="*/ 987379 h 1376989"/>
+              <a:gd name="connsiteX1" fmla="*/ 987379 w 1827638"/>
+              <a:gd name="connsiteY1" fmla="*/ 0 h 1376989"/>
+              <a:gd name="connsiteX2" fmla="*/ 1827638 w 1827638"/>
+              <a:gd name="connsiteY2" fmla="*/ 840260 h 1376989"/>
+              <a:gd name="connsiteX3" fmla="*/ 1827638 w 1827638"/>
+              <a:gd name="connsiteY3" fmla="*/ 1376989 h 1376989"/>
+              <a:gd name="connsiteX4" fmla="*/ 0 w 1827638"/>
+              <a:gd name="connsiteY4" fmla="*/ 1376989 h 1376989"/>
+            </a:gdLst>
+            <a:ahLst/>
+            <a:cxnLst>
+              <a:cxn ang="0">
+                <a:pos x="connsiteX0" y="connsiteY0"/>
+              </a:cxn>
+              <a:cxn ang="0">
+                <a:pos x="connsiteX1" y="connsiteY1"/>
+              </a:cxn>
+              <a:cxn ang="0">
+                <a:pos x="connsiteX2" y="connsiteY2"/>
+              </a:cxn>
+              <a:cxn ang="0">
+                <a:pos x="connsiteX3" y="connsiteY3"/>
+              </a:cxn>
+              <a:cxn ang="0">
+                <a:pos x="connsiteX4" y="connsiteY4"/>
+              </a:cxn>
+            </a:cxnLst>
+            <a:rect l="l" t="t" r="r" b="b"/>
+            <a:pathLst>
+              <a:path w="1827638" h="1376989">
+                <a:moveTo>
+                  <a:pt x="0" y="987379"/>
+                </a:moveTo>
+                <a:lnTo>
+                  <a:pt x="987379" y="0"/>
+                </a:lnTo>
+                <a:lnTo>
+                  <a:pt x="1827638" y="840260"/>
+                </a:lnTo>
+                <a:lnTo>
+                  <a:pt x="1827638" y="1376989"/>
+                </a:lnTo>
+                <a:lnTo>
+                  <a:pt x="0" y="1376989"/>
+                </a:lnTo>
+                <a:close/>
+              </a:path>
+            </a:pathLst>
+          </a:custGeom>
+          <a:solidFill>
+            <a:schemeClr val="accent1">
+              <a:alpha val="30000"/>
+            </a:schemeClr>
+          </a:solidFill>
+          <a:ln>
+            <a:noFill/>
+          </a:ln>
+        </p:spPr>
+        <p:style>
+          <a:lnRef idx="2">
+            <a:schemeClr val="accent1">
+              <a:shade val="50000"/>
+            </a:schemeClr>
+          </a:lnRef>
+          <a:fillRef idx="1">
+            <a:schemeClr val="accent1"/>
+          </a:fillRef>
+          <a:effectRef idx="0">
+            <a:schemeClr val="accent1"/>
+          </a:effectRef>
+          <a:fontRef idx="minor">
+            <a:schemeClr val="lt1"/>
+          </a:fontRef>
+        </p:style>
+        <p:txBody>
+          <a:bodyPr rtlCol="0" anchor="ctr"/>
+          <a:lstStyle/>
+          <a:p>
+            <a:pPr algn="ctr"/>
+            <a:endParaRPr lang="en-US" dirty="0"/>
+          </a:p>
+        </p:txBody>
+      </p:sp>
+      <p:sp>
+        <p:nvSpPr>
+          <p:cNvPr id="12" name="Rectangle 11">
+            <a:extLst>
+              <a:ext uri="{FF2B5EF4-FFF2-40B4-BE49-F238E27FC236}">
+                <a16:creationId xmlns:a16="http://schemas.microsoft.com/office/drawing/2014/main" id="{29FDB030-9B49-4CED-8CCD-4D99382388AC}"/>
+              </a:ext>
+              <a:ext uri="{C183D7F6-B498-43B3-948B-1728B52AA6E4}">
+                <adec:decorative xmlns:adec="http://schemas.microsoft.com/office/drawing/2017/decorative" val="1"/>
+              </a:ext>
+            </a:extLst>
+          </p:cNvPr>
+          <p:cNvSpPr>
+            <a:spLocks noGrp="1" noRot="1" noChangeAspect="1" noMove="1" noResize="1" noEditPoints="1" noAdjustHandles="1" noChangeArrowheads="1" noChangeShapeType="1" noTextEdit="1"/>
+          </p:cNvSpPr>
+          <p:nvPr>
+            <p:extLst>
+              <p:ext uri="{386F3935-93C4-4BCD-93E2-E3B085C9AB24}">
+                <p16:designElem xmlns:p16="http://schemas.microsoft.com/office/powerpoint/2015/main" val="1"/>
+              </p:ext>
+            </p:extLst>
+          </p:nvPr>
+        </p:nvSpPr>
+        <p:spPr>
+          <a:xfrm rot="18900000" flipH="1">
+            <a:off x="891641" y="422146"/>
+            <a:ext cx="645368" cy="645368"/>
+          </a:xfrm>
+          <a:prstGeom prst="rect">
+            <a:avLst/>
+          </a:prstGeom>
+          <a:solidFill>
+            <a:schemeClr val="accent1">
+              <a:alpha val="30000"/>
+            </a:schemeClr>
+          </a:solidFill>
+          <a:ln>
+            <a:noFill/>
+          </a:ln>
+        </p:spPr>
+        <p:style>
+          <a:lnRef idx="2">
+            <a:schemeClr val="accent1">
+              <a:shade val="50000"/>
+            </a:schemeClr>
+          </a:lnRef>
+          <a:fillRef idx="1">
+            <a:schemeClr val="accent1"/>
+          </a:fillRef>
+          <a:effectRef idx="0">
+            <a:schemeClr val="accent1"/>
+          </a:effectRef>
+          <a:fontRef idx="minor">
+            <a:schemeClr val="lt1"/>
+          </a:fontRef>
+        </p:style>
+        <p:txBody>
+          <a:bodyPr rtlCol="0" anchor="ctr"/>
+          <a:lstStyle/>
+          <a:p>
+            <a:pPr algn="ctr"/>
+            <a:endParaRPr lang="en-US"/>
+          </a:p>
+        </p:txBody>
+      </p:sp>
+      <p:sp>
+        <p:nvSpPr>
+          <p:cNvPr id="14" name="Rectangle 13">
+            <a:extLst>
+              <a:ext uri="{FF2B5EF4-FFF2-40B4-BE49-F238E27FC236}">
+                <a16:creationId xmlns:a16="http://schemas.microsoft.com/office/drawing/2014/main" id="{3783CA14-24A1-485C-8B30-D6A5D87987AD}"/>
+              </a:ext>
+              <a:ext uri="{C183D7F6-B498-43B3-948B-1728B52AA6E4}">
+                <adec:decorative xmlns:adec="http://schemas.microsoft.com/office/drawing/2017/decorative" val="1"/>
+              </a:ext>
+            </a:extLst>
+          </p:cNvPr>
+          <p:cNvSpPr>
+            <a:spLocks noGrp="1" noRot="1" noChangeAspect="1" noMove="1" noResize="1" noEditPoints="1" noAdjustHandles="1" noChangeArrowheads="1" noChangeShapeType="1" noTextEdit="1"/>
+          </p:cNvSpPr>
+          <p:nvPr>
+            <p:extLst>
+              <p:ext uri="{386F3935-93C4-4BCD-93E2-E3B085C9AB24}">
+                <p16:designElem xmlns:p16="http://schemas.microsoft.com/office/powerpoint/2015/main" val="1"/>
+              </p:ext>
+            </p:extLst>
+          </p:nvPr>
+        </p:nvSpPr>
+        <p:spPr>
+          <a:xfrm rot="18900000" flipH="1">
+            <a:off x="10043482" y="655140"/>
+            <a:ext cx="687472" cy="687472"/>
+          </a:xfrm>
+          <a:prstGeom prst="rect">
+            <a:avLst/>
+          </a:prstGeom>
+          <a:solidFill>
+            <a:schemeClr val="accent4">
+              <a:alpha val="30000"/>
+            </a:schemeClr>
+          </a:solidFill>
+          <a:ln>
+            <a:noFill/>
+          </a:ln>
+        </p:spPr>
+        <p:style>
+          <a:lnRef idx="2">
+            <a:schemeClr val="accent1">
+              <a:shade val="50000"/>
+            </a:schemeClr>
+          </a:lnRef>
+          <a:fillRef idx="1">
+            <a:schemeClr val="accent1"/>
+          </a:fillRef>
+          <a:effectRef idx="0">
+            <a:schemeClr val="accent1"/>
+          </a:effectRef>
+          <a:fontRef idx="minor">
+            <a:schemeClr val="lt1"/>
+          </a:fontRef>
+        </p:style>
+        <p:txBody>
+          <a:bodyPr rtlCol="0" anchor="ctr"/>
+          <a:lstStyle/>
+          <a:p>
+            <a:pPr algn="ctr"/>
+            <a:endParaRPr lang="en-US"/>
+          </a:p>
+        </p:txBody>
+      </p:sp>
+      <p:sp>
+        <p:nvSpPr>
+          <p:cNvPr id="16" name="Freeform: Shape 15">
+            <a:extLst>
+              <a:ext uri="{FF2B5EF4-FFF2-40B4-BE49-F238E27FC236}">
+                <a16:creationId xmlns:a16="http://schemas.microsoft.com/office/drawing/2014/main" id="{9A97C86A-04D6-40F7-AE84-31AB43E6A846}"/>
+              </a:ext>
+              <a:ext uri="{C183D7F6-B498-43B3-948B-1728B52AA6E4}">
+                <adec:decorative xmlns:adec="http://schemas.microsoft.com/office/drawing/2017/decorative" val="1"/>
+              </a:ext>
+            </a:extLst>
+          </p:cNvPr>
+          <p:cNvSpPr>
+            <a:spLocks noGrp="1" noRot="1" noChangeAspect="1" noMove="1" noResize="1" noEditPoints="1" noAdjustHandles="1" noChangeArrowheads="1" noChangeShapeType="1" noTextEdit="1"/>
+          </p:cNvSpPr>
+          <p:nvPr>
+            <p:extLst>
+              <p:ext uri="{386F3935-93C4-4BCD-93E2-E3B085C9AB24}">
+                <p16:designElem xmlns:p16="http://schemas.microsoft.com/office/powerpoint/2015/main" val="1"/>
+              </p:ext>
+            </p:extLst>
+          </p:nvPr>
+        </p:nvSpPr>
+        <p:spPr>
+          <a:xfrm rot="10800000" flipH="1">
+            <a:off x="9356643" y="0"/>
+            <a:ext cx="2835357" cy="1480837"/>
+          </a:xfrm>
+          <a:custGeom>
+            <a:avLst/>
+            <a:gdLst>
+              <a:gd name="connsiteX0" fmla="*/ 2835357 w 2835357"/>
+              <a:gd name="connsiteY0" fmla="*/ 1480837 h 1480837"/>
+              <a:gd name="connsiteX1" fmla="*/ 0 w 2835357"/>
+              <a:gd name="connsiteY1" fmla="*/ 1480837 h 1480837"/>
+              <a:gd name="connsiteX2" fmla="*/ 1552727 w 2835357"/>
+              <a:gd name="connsiteY2" fmla="*/ 0 h 1480837"/>
+              <a:gd name="connsiteX3" fmla="*/ 2835357 w 2835357"/>
+              <a:gd name="connsiteY3" fmla="*/ 1223245 h 1480837"/>
+            </a:gdLst>
+            <a:ahLst/>
+            <a:cxnLst>
+              <a:cxn ang="0">
+                <a:pos x="connsiteX0" y="connsiteY0"/>
+              </a:cxn>
+              <a:cxn ang="0">
+                <a:pos x="connsiteX1" y="connsiteY1"/>
+              </a:cxn>
+              <a:cxn ang="0">
+                <a:pos x="connsiteX2" y="connsiteY2"/>
+              </a:cxn>
+              <a:cxn ang="0">
+                <a:pos x="connsiteX3" y="connsiteY3"/>
+              </a:cxn>
+            </a:cxnLst>
+            <a:rect l="l" t="t" r="r" b="b"/>
+            <a:pathLst>
+              <a:path w="2835357" h="1480837">
+                <a:moveTo>
+                  <a:pt x="2835357" y="1480837"/>
+                </a:moveTo>
+                <a:lnTo>
+                  <a:pt x="0" y="1480837"/>
+                </a:lnTo>
+                <a:lnTo>
+                  <a:pt x="1552727" y="0"/>
+                </a:lnTo>
+                <a:lnTo>
+                  <a:pt x="2835357" y="1223245"/>
+                </a:lnTo>
+                <a:close/>
+              </a:path>
+            </a:pathLst>
+          </a:custGeom>
+          <a:solidFill>
+            <a:schemeClr val="accent4">
+              <a:alpha val="30000"/>
+            </a:schemeClr>
+          </a:solidFill>
+          <a:ln>
+            <a:noFill/>
+          </a:ln>
+        </p:spPr>
+        <p:style>
+          <a:lnRef idx="2">
+            <a:schemeClr val="accent1">
+              <a:shade val="50000"/>
+            </a:schemeClr>
+          </a:lnRef>
+          <a:fillRef idx="1">
+            <a:schemeClr val="accent1"/>
+          </a:fillRef>
+          <a:effectRef idx="0">
+            <a:schemeClr val="accent1"/>
+          </a:effectRef>
+          <a:fontRef idx="minor">
+            <a:schemeClr val="lt1"/>
+          </a:fontRef>
+        </p:style>
+        <p:txBody>
+          <a:bodyPr wrap="square" rtlCol="0" anchor="ctr">
+            <a:noAutofit/>
+          </a:bodyPr>
+          <a:lstStyle/>
+          <a:p>
+            <a:pPr algn="ctr"/>
+            <a:endParaRPr lang="en-US" dirty="0"/>
+          </a:p>
+        </p:txBody>
+      </p:sp>
+      <p:sp>
+        <p:nvSpPr>
+          <p:cNvPr id="18" name="Isosceles Triangle 17">
+            <a:extLst>
+              <a:ext uri="{FF2B5EF4-FFF2-40B4-BE49-F238E27FC236}">
+                <a16:creationId xmlns:a16="http://schemas.microsoft.com/office/drawing/2014/main" id="{FF9F2414-84E8-453E-B1F3-389FDE8192D9}"/>
+              </a:ext>
+              <a:ext uri="{C183D7F6-B498-43B3-948B-1728B52AA6E4}">
+                <adec:decorative xmlns:adec="http://schemas.microsoft.com/office/drawing/2017/decorative" val="1"/>
+              </a:ext>
+            </a:extLst>
+          </p:cNvPr>
+          <p:cNvSpPr>
+            <a:spLocks noGrp="1" noRot="1" noChangeAspect="1" noMove="1" noResize="1" noEditPoints="1" noAdjustHandles="1" noChangeArrowheads="1" noChangeShapeType="1" noTextEdit="1"/>
+          </p:cNvSpPr>
+          <p:nvPr>
+            <p:extLst>
+              <p:ext uri="{386F3935-93C4-4BCD-93E2-E3B085C9AB24}">
+                <p16:designElem xmlns:p16="http://schemas.microsoft.com/office/powerpoint/2015/main" val="1"/>
+              </p:ext>
+            </p:extLst>
+          </p:nvPr>
+        </p:nvSpPr>
+        <p:spPr>
+          <a:xfrm flipH="1">
+            <a:off x="7976344" y="6115501"/>
+            <a:ext cx="1494513" cy="742499"/>
+          </a:xfrm>
+          <a:prstGeom prst="triangle">
+            <a:avLst/>
+          </a:prstGeom>
+          <a:solidFill>
+            <a:schemeClr val="accent1">
+              <a:alpha val="30000"/>
+            </a:schemeClr>
+          </a:solidFill>
+          <a:ln>
+            <a:noFill/>
+          </a:ln>
+        </p:spPr>
+        <p:style>
+          <a:lnRef idx="2">
+            <a:schemeClr val="accent1">
+              <a:shade val="50000"/>
+            </a:schemeClr>
+          </a:lnRef>
+          <a:fillRef idx="1">
+            <a:schemeClr val="accent1"/>
+          </a:fillRef>
+          <a:effectRef idx="0">
+            <a:schemeClr val="accent1"/>
+          </a:effectRef>
+          <a:fontRef idx="minor">
+            <a:schemeClr val="lt1"/>
+          </a:fontRef>
+        </p:style>
+        <p:txBody>
+          <a:bodyPr rtlCol="0" anchor="ctr"/>
+          <a:lstStyle/>
+          <a:p>
+            <a:pPr algn="ctr"/>
+            <a:endParaRPr lang="en-US"/>
+          </a:p>
+        </p:txBody>
+      </p:sp>
+      <p:pic>
+        <p:nvPicPr>
+          <p:cNvPr id="3" name="slide3" descr="India">
+            <a:extLst>
+              <a:ext uri="{FF2B5EF4-FFF2-40B4-BE49-F238E27FC236}">
+                <a16:creationId xmlns:a16="http://schemas.microsoft.com/office/drawing/2014/main" id="{178A9856-0406-48B2-932D-D2F0BF8225DF}"/>
+              </a:ext>
+            </a:extLst>
+          </p:cNvPr>
+          <p:cNvPicPr>
+            <a:picLocks noChangeAspect="1"/>
+          </p:cNvPicPr>
+          <p:nvPr/>
+        </p:nvPicPr>
+        <p:blipFill rotWithShape="1">
+          <a:blip r:embed="rId2">
+            <a:extLst>
+              <a:ext uri="{28A0092B-C50C-407E-A947-70E740481C1C}">
+                <a14:useLocalDpi xmlns:a14="http://schemas.microsoft.com/office/drawing/2010/main" val="0"/>
+              </a:ext>
+            </a:extLst>
+          </a:blip>
+          <a:srcRect t="5384" r="11849" b="3952"/>
+          <a:stretch/>
+        </p:blipFill>
+        <p:spPr>
+          <a:xfrm>
+            <a:off x="864952" y="943429"/>
+            <a:ext cx="9222477" cy="5050971"/>
+          </a:xfrm>
+          <a:prstGeom prst="rect">
+            <a:avLst/>
+          </a:prstGeom>
+          <a:ln>
+            <a:noFill/>
+          </a:ln>
+        </p:spPr>
+      </p:pic>
+      <p:sp>
+        <p:nvSpPr>
+          <p:cNvPr id="20" name="Isosceles Triangle 19">
+            <a:extLst>
+              <a:ext uri="{FF2B5EF4-FFF2-40B4-BE49-F238E27FC236}">
+                <a16:creationId xmlns:a16="http://schemas.microsoft.com/office/drawing/2014/main" id="{3ECA69A1-7536-43AC-85EF-C7106179F5ED}"/>
+              </a:ext>
+              <a:ext uri="{C183D7F6-B498-43B3-948B-1728B52AA6E4}">
+                <adec:decorative xmlns:adec="http://schemas.microsoft.com/office/drawing/2017/decorative" val="1"/>
+              </a:ext>
+            </a:extLst>
+          </p:cNvPr>
+          <p:cNvSpPr>
+            <a:spLocks noGrp="1" noRot="1" noChangeAspect="1" noMove="1" noResize="1" noEditPoints="1" noAdjustHandles="1" noChangeArrowheads="1" noChangeShapeType="1" noTextEdit="1"/>
+          </p:cNvSpPr>
+          <p:nvPr>
+            <p:extLst>
+              <p:ext uri="{386F3935-93C4-4BCD-93E2-E3B085C9AB24}">
+                <p16:designElem xmlns:p16="http://schemas.microsoft.com/office/powerpoint/2015/main" val="1"/>
+              </p:ext>
+            </p:extLst>
+          </p:nvPr>
+        </p:nvSpPr>
+        <p:spPr>
+          <a:xfrm flipH="1">
+            <a:off x="7604080" y="6453143"/>
+            <a:ext cx="814903" cy="404857"/>
+          </a:xfrm>
+          <a:prstGeom prst="triangle">
+            <a:avLst/>
+          </a:prstGeom>
+          <a:solidFill>
+            <a:schemeClr val="accent1">
+              <a:alpha val="30000"/>
+            </a:schemeClr>
+          </a:solidFill>
+          <a:ln>
+            <a:noFill/>
+          </a:ln>
+        </p:spPr>
+        <p:style>
+          <a:lnRef idx="2">
+            <a:schemeClr val="accent1">
+              <a:shade val="50000"/>
+            </a:schemeClr>
+          </a:lnRef>
+          <a:fillRef idx="1">
+            <a:schemeClr val="accent1"/>
+          </a:fillRef>
+          <a:effectRef idx="0">
+            <a:schemeClr val="accent1"/>
+          </a:effectRef>
+          <a:fontRef idx="minor">
+            <a:schemeClr val="lt1"/>
+          </a:fontRef>
+        </p:style>
+        <p:txBody>
+          <a:bodyPr rtlCol="0" anchor="ctr"/>
+          <a:lstStyle/>
+          <a:p>
+            <a:pPr algn="ctr"/>
+            <a:endParaRPr lang="en-US"/>
+          </a:p>
+        </p:txBody>
+      </p:sp>
+      <p:sp>
+        <p:nvSpPr>
+          <p:cNvPr id="2" name="CasellaDiTesto 1">
+            <a:extLst>
+              <a:ext uri="{FF2B5EF4-FFF2-40B4-BE49-F238E27FC236}">
+                <a16:creationId xmlns:a16="http://schemas.microsoft.com/office/drawing/2014/main" id="{6E60EB06-F003-AE49-0BA4-C5B6F56CAD98}"/>
+              </a:ext>
+            </a:extLst>
+          </p:cNvPr>
+          <p:cNvSpPr txBox="1"/>
+          <p:nvPr/>
+        </p:nvSpPr>
+        <p:spPr>
+          <a:xfrm>
+            <a:off x="1943100" y="736600"/>
+            <a:ext cx="2971800" cy="1415723"/>
+          </a:xfrm>
+          <a:prstGeom prst="rect">
+            <a:avLst/>
+          </a:prstGeom>
+          <a:noFill/>
+        </p:spPr>
+        <p:txBody>
+          <a:bodyPr vert="horz" lIns="91440" tIns="45720" rIns="91440" bIns="45720" rtlCol="0" anchor="ctr">
+            <a:normAutofit/>
+          </a:bodyPr>
+          <a:lstStyle/>
+          <a:p>
+            <a:pPr algn="ctr">
+              <a:lnSpc>
+                <a:spcPct val="90000"/>
+              </a:lnSpc>
+              <a:spcBef>
+                <a:spcPct val="0"/>
+              </a:spcBef>
+              <a:spcAft>
+                <a:spcPts val="600"/>
+              </a:spcAft>
+            </a:pPr>
+            <a:r>
+              <a:rPr lang="en-US" sz="2400" kern="1200" dirty="0">
+                <a:latin typeface="+mj-lt"/>
+                <a:ea typeface="+mj-ea"/>
+                <a:cs typeface="+mj-cs"/>
+              </a:rPr>
+              <a:t>Carbon emissions prediction for </a:t>
+            </a:r>
+            <a:r>
+              <a:rPr lang="en-US" sz="2400" dirty="0">
+                <a:latin typeface="+mj-lt"/>
+                <a:ea typeface="+mj-ea"/>
+                <a:cs typeface="+mj-cs"/>
+              </a:rPr>
+              <a:t>India</a:t>
+            </a:r>
+            <a:endParaRPr lang="en-US" sz="2400" kern="1200" dirty="0">
+              <a:latin typeface="+mj-lt"/>
+              <a:ea typeface="+mj-ea"/>
+              <a:cs typeface="+mj-cs"/>
+            </a:endParaRPr>
+          </a:p>
+        </p:txBody>
+      </p:sp>
+    </p:spTree>
+    <p:extLst>
+      <p:ext uri="{BB962C8B-B14F-4D97-AF65-F5344CB8AC3E}">
+        <p14:creationId xmlns:p14="http://schemas.microsoft.com/office/powerpoint/2010/main" val="2005109890"/>
+      </p:ext>
+    </p:extLst>
+  </p:cSld>
+  <p:clrMapOvr>
+    <a:masterClrMapping/>
+  </p:clrMapOvr>
+</p:sld>
+</file>
+
+<file path=ppt/slides/slide14.xml><?xml version="1.0" encoding="utf-8"?>
 <p:sld xmlns:a="http://schemas.openxmlformats.org/drawingml/2006/main" xmlns:r="http://schemas.openxmlformats.org/officeDocument/2006/relationships" xmlns:p="http://schemas.openxmlformats.org/presentationml/2006/main">
   <p:cSld>
     <p:spTree>

</xml_diff>

<commit_message>
Updated all the plots and percentage
</commit_message>
<xml_diff>
--- a/Visualization/GlobalCO2Emission.pptx
+++ b/Visualization/GlobalCO2Emission.pptx
@@ -15,7 +15,7 @@
     <p:sldId id="259" r:id="rId6"/>
     <p:sldId id="260" r:id="rId7"/>
     <p:sldId id="261" r:id="rId8"/>
-    <p:sldId id="262" r:id="rId9"/>
+    <p:sldId id="270" r:id="rId9"/>
     <p:sldId id="263" r:id="rId10"/>
     <p:sldId id="264" r:id="rId11"/>
     <p:sldId id="265" r:id="rId12"/>
@@ -210,7 +210,7 @@
           <a:p>
             <a:fld id="{77C7F53C-5A59-2E42-96D2-07BF9F9D3C00}" type="datetimeFigureOut">
               <a:rPr lang="it-IT" smtClean="0"/>
-              <a:t>07/03/23</a:t>
+              <a:t>08/03/23</a:t>
             </a:fld>
             <a:endParaRPr lang="it-IT"/>
           </a:p>
@@ -732,7 +732,7 @@
           <a:p>
             <a:fld id="{EED1C14C-A143-42F5-B247-D0E800131009}" type="datetimeFigureOut">
               <a:rPr lang="en-US" smtClean="0"/>
-              <a:t>3/7/23</a:t>
+              <a:t>3/8/23</a:t>
             </a:fld>
             <a:endParaRPr lang="en-US"/>
           </a:p>
@@ -930,7 +930,7 @@
           <a:p>
             <a:fld id="{EED1C14C-A143-42F5-B247-D0E800131009}" type="datetimeFigureOut">
               <a:rPr lang="en-US" smtClean="0"/>
-              <a:t>3/7/23</a:t>
+              <a:t>3/8/23</a:t>
             </a:fld>
             <a:endParaRPr lang="en-US"/>
           </a:p>
@@ -1138,7 +1138,7 @@
           <a:p>
             <a:fld id="{EED1C14C-A143-42F5-B247-D0E800131009}" type="datetimeFigureOut">
               <a:rPr lang="en-US" smtClean="0"/>
-              <a:t>3/7/23</a:t>
+              <a:t>3/8/23</a:t>
             </a:fld>
             <a:endParaRPr lang="en-US"/>
           </a:p>
@@ -1336,7 +1336,7 @@
           <a:p>
             <a:fld id="{EED1C14C-A143-42F5-B247-D0E800131009}" type="datetimeFigureOut">
               <a:rPr lang="en-US" smtClean="0"/>
-              <a:t>3/7/23</a:t>
+              <a:t>3/8/23</a:t>
             </a:fld>
             <a:endParaRPr lang="en-US"/>
           </a:p>
@@ -1611,7 +1611,7 @@
           <a:p>
             <a:fld id="{EED1C14C-A143-42F5-B247-D0E800131009}" type="datetimeFigureOut">
               <a:rPr lang="en-US" smtClean="0"/>
-              <a:t>3/7/23</a:t>
+              <a:t>3/8/23</a:t>
             </a:fld>
             <a:endParaRPr lang="en-US"/>
           </a:p>
@@ -1876,7 +1876,7 @@
           <a:p>
             <a:fld id="{EED1C14C-A143-42F5-B247-D0E800131009}" type="datetimeFigureOut">
               <a:rPr lang="en-US" smtClean="0"/>
-              <a:t>3/7/23</a:t>
+              <a:t>3/8/23</a:t>
             </a:fld>
             <a:endParaRPr lang="en-US"/>
           </a:p>
@@ -2288,7 +2288,7 @@
           <a:p>
             <a:fld id="{EED1C14C-A143-42F5-B247-D0E800131009}" type="datetimeFigureOut">
               <a:rPr lang="en-US" smtClean="0"/>
-              <a:t>3/7/23</a:t>
+              <a:t>3/8/23</a:t>
             </a:fld>
             <a:endParaRPr lang="en-US"/>
           </a:p>
@@ -2429,7 +2429,7 @@
           <a:p>
             <a:fld id="{EED1C14C-A143-42F5-B247-D0E800131009}" type="datetimeFigureOut">
               <a:rPr lang="en-US" smtClean="0"/>
-              <a:t>3/7/23</a:t>
+              <a:t>3/8/23</a:t>
             </a:fld>
             <a:endParaRPr lang="en-US"/>
           </a:p>
@@ -2542,7 +2542,7 @@
           <a:p>
             <a:fld id="{EED1C14C-A143-42F5-B247-D0E800131009}" type="datetimeFigureOut">
               <a:rPr lang="en-US" smtClean="0"/>
-              <a:t>3/7/23</a:t>
+              <a:t>3/8/23</a:t>
             </a:fld>
             <a:endParaRPr lang="en-US"/>
           </a:p>
@@ -2853,7 +2853,7 @@
           <a:p>
             <a:fld id="{EED1C14C-A143-42F5-B247-D0E800131009}" type="datetimeFigureOut">
               <a:rPr lang="en-US" smtClean="0"/>
-              <a:t>3/7/23</a:t>
+              <a:t>3/8/23</a:t>
             </a:fld>
             <a:endParaRPr lang="en-US"/>
           </a:p>
@@ -3141,7 +3141,7 @@
           <a:p>
             <a:fld id="{EED1C14C-A143-42F5-B247-D0E800131009}" type="datetimeFigureOut">
               <a:rPr lang="en-US" smtClean="0"/>
-              <a:t>3/7/23</a:t>
+              <a:t>3/8/23</a:t>
             </a:fld>
             <a:endParaRPr lang="en-US"/>
           </a:p>
@@ -3382,7 +3382,7 @@
           <a:p>
             <a:fld id="{EED1C14C-A143-42F5-B247-D0E800131009}" type="datetimeFigureOut">
               <a:rPr lang="en-US" smtClean="0"/>
-              <a:t>3/7/23</a:t>
+              <a:t>3/8/23</a:t>
             </a:fld>
             <a:endParaRPr lang="en-US"/>
           </a:p>
@@ -4792,6 +4792,95 @@
           </a:p>
         </p:txBody>
       </p:sp>
+      <p:sp>
+        <p:nvSpPr>
+          <p:cNvPr id="3" name="CasellaDiTesto 2">
+            <a:extLst>
+              <a:ext uri="{FF2B5EF4-FFF2-40B4-BE49-F238E27FC236}">
+                <a16:creationId xmlns:a16="http://schemas.microsoft.com/office/drawing/2014/main" id="{DBAC3798-CE81-D6CE-BA0F-B4BE28D3C1C3}"/>
+              </a:ext>
+            </a:extLst>
+          </p:cNvPr>
+          <p:cNvSpPr txBox="1"/>
+          <p:nvPr/>
+        </p:nvSpPr>
+        <p:spPr>
+          <a:xfrm>
+            <a:off x="10025772" y="1822705"/>
+            <a:ext cx="1161835" cy="369332"/>
+          </a:xfrm>
+          <a:prstGeom prst="rect">
+            <a:avLst/>
+          </a:prstGeom>
+          <a:noFill/>
+        </p:spPr>
+        <p:txBody>
+          <a:bodyPr wrap="square" rtlCol="0">
+            <a:spAutoFit/>
+          </a:bodyPr>
+          <a:lstStyle/>
+          <a:p>
+            <a:r>
+              <a:rPr lang="it-IT" dirty="0"/>
+              <a:t>43 % </a:t>
+            </a:r>
+          </a:p>
+        </p:txBody>
+      </p:sp>
+      <p:sp>
+        <p:nvSpPr>
+          <p:cNvPr id="5" name="Freccia su 4">
+            <a:extLst>
+              <a:ext uri="{FF2B5EF4-FFF2-40B4-BE49-F238E27FC236}">
+                <a16:creationId xmlns:a16="http://schemas.microsoft.com/office/drawing/2014/main" id="{F521E0B8-6922-C4A9-C964-C78B982E1EF7}"/>
+              </a:ext>
+            </a:extLst>
+          </p:cNvPr>
+          <p:cNvSpPr/>
+          <p:nvPr/>
+        </p:nvSpPr>
+        <p:spPr>
+          <a:xfrm>
+            <a:off x="9794929" y="1621691"/>
+            <a:ext cx="272750" cy="771360"/>
+          </a:xfrm>
+          <a:prstGeom prst="upArrow">
+            <a:avLst/>
+          </a:prstGeom>
+          <a:solidFill>
+            <a:srgbClr val="FF0000"/>
+          </a:solidFill>
+          <a:ln>
+            <a:solidFill>
+              <a:srgbClr val="FF0000"/>
+            </a:solidFill>
+          </a:ln>
+        </p:spPr>
+        <p:style>
+          <a:lnRef idx="2">
+            <a:schemeClr val="accent1">
+              <a:shade val="50000"/>
+            </a:schemeClr>
+          </a:lnRef>
+          <a:fillRef idx="1">
+            <a:schemeClr val="accent1"/>
+          </a:fillRef>
+          <a:effectRef idx="0">
+            <a:schemeClr val="accent1"/>
+          </a:effectRef>
+          <a:fontRef idx="minor">
+            <a:schemeClr val="lt1"/>
+          </a:fontRef>
+        </p:style>
+        <p:txBody>
+          <a:bodyPr rtlCol="0" anchor="ctr"/>
+          <a:lstStyle/>
+          <a:p>
+            <a:pPr algn="ctr"/>
+            <a:endParaRPr lang="it-IT" dirty="0"/>
+          </a:p>
+        </p:txBody>
+      </p:sp>
     </p:spTree>
     <p:extLst>
       <p:ext uri="{BB962C8B-B14F-4D97-AF65-F5344CB8AC3E}">
@@ -4802,6 +4891,128 @@
   <p:clrMapOvr>
     <a:masterClrMapping/>
   </p:clrMapOvr>
+  <p:timing>
+    <p:tnLst>
+      <p:par>
+        <p:cTn id="1" dur="indefinite" restart="never" nodeType="tmRoot">
+          <p:childTnLst>
+            <p:seq concurrent="1" nextAc="seek">
+              <p:cTn id="2" dur="indefinite" nodeType="mainSeq">
+                <p:childTnLst>
+                  <p:par>
+                    <p:cTn id="3" fill="hold">
+                      <p:stCondLst>
+                        <p:cond delay="indefinite"/>
+                      </p:stCondLst>
+                      <p:childTnLst>
+                        <p:par>
+                          <p:cTn id="4" fill="hold">
+                            <p:stCondLst>
+                              <p:cond delay="0"/>
+                            </p:stCondLst>
+                            <p:childTnLst>
+                              <p:par>
+                                <p:cTn id="5" presetID="10" presetClass="entr" presetSubtype="0" fill="hold" grpId="0" nodeType="clickEffect">
+                                  <p:stCondLst>
+                                    <p:cond delay="0"/>
+                                  </p:stCondLst>
+                                  <p:childTnLst>
+                                    <p:set>
+                                      <p:cBhvr>
+                                        <p:cTn id="6" dur="1" fill="hold">
+                                          <p:stCondLst>
+                                            <p:cond delay="0"/>
+                                          </p:stCondLst>
+                                        </p:cTn>
+                                        <p:tgtEl>
+                                          <p:spTgt spid="5"/>
+                                        </p:tgtEl>
+                                        <p:attrNameLst>
+                                          <p:attrName>style.visibility</p:attrName>
+                                        </p:attrNameLst>
+                                      </p:cBhvr>
+                                      <p:to>
+                                        <p:strVal val="visible"/>
+                                      </p:to>
+                                    </p:set>
+                                    <p:animEffect transition="in" filter="fade">
+                                      <p:cBhvr>
+                                        <p:cTn id="7" dur="500"/>
+                                        <p:tgtEl>
+                                          <p:spTgt spid="5"/>
+                                        </p:tgtEl>
+                                      </p:cBhvr>
+                                    </p:animEffect>
+                                  </p:childTnLst>
+                                </p:cTn>
+                              </p:par>
+                              <p:par>
+                                <p:cTn id="8" presetID="10" presetClass="entr" presetSubtype="0" fill="hold" grpId="0" nodeType="withEffect">
+                                  <p:stCondLst>
+                                    <p:cond delay="0"/>
+                                  </p:stCondLst>
+                                  <p:childTnLst>
+                                    <p:set>
+                                      <p:cBhvr>
+                                        <p:cTn id="9" dur="1" fill="hold">
+                                          <p:stCondLst>
+                                            <p:cond delay="0"/>
+                                          </p:stCondLst>
+                                        </p:cTn>
+                                        <p:tgtEl>
+                                          <p:spTgt spid="3"/>
+                                        </p:tgtEl>
+                                        <p:attrNameLst>
+                                          <p:attrName>style.visibility</p:attrName>
+                                        </p:attrNameLst>
+                                      </p:cBhvr>
+                                      <p:to>
+                                        <p:strVal val="visible"/>
+                                      </p:to>
+                                    </p:set>
+                                    <p:animEffect transition="in" filter="fade">
+                                      <p:cBhvr>
+                                        <p:cTn id="10" dur="500"/>
+                                        <p:tgtEl>
+                                          <p:spTgt spid="3"/>
+                                        </p:tgtEl>
+                                      </p:cBhvr>
+                                    </p:animEffect>
+                                  </p:childTnLst>
+                                </p:cTn>
+                              </p:par>
+                            </p:childTnLst>
+                          </p:cTn>
+                        </p:par>
+                      </p:childTnLst>
+                    </p:cTn>
+                  </p:par>
+                </p:childTnLst>
+              </p:cTn>
+              <p:prevCondLst>
+                <p:cond evt="onPrev" delay="0">
+                  <p:tgtEl>
+                    <p:sldTgt/>
+                  </p:tgtEl>
+                </p:cond>
+              </p:prevCondLst>
+              <p:nextCondLst>
+                <p:cond evt="onNext" delay="0">
+                  <p:tgtEl>
+                    <p:sldTgt/>
+                  </p:tgtEl>
+                </p:cond>
+              </p:nextCondLst>
+            </p:seq>
+          </p:childTnLst>
+        </p:cTn>
+      </p:par>
+    </p:tnLst>
+    <p:bldLst>
+      <p:bldP spid="3" grpId="0"/>
+      <p:bldP spid="5" grpId="0" animBg="1"/>
+    </p:bldLst>
+  </p:timing>
 </p:sld>
 </file>
 
@@ -5480,6 +5691,95 @@
           </a:p>
         </p:txBody>
       </p:sp>
+      <p:sp>
+        <p:nvSpPr>
+          <p:cNvPr id="2" name="CasellaDiTesto 1">
+            <a:extLst>
+              <a:ext uri="{FF2B5EF4-FFF2-40B4-BE49-F238E27FC236}">
+                <a16:creationId xmlns:a16="http://schemas.microsoft.com/office/drawing/2014/main" id="{F110F0ED-C61D-F3C9-CB45-30212E60EB59}"/>
+              </a:ext>
+            </a:extLst>
+          </p:cNvPr>
+          <p:cNvSpPr txBox="1"/>
+          <p:nvPr/>
+        </p:nvSpPr>
+        <p:spPr>
+          <a:xfrm>
+            <a:off x="8309022" y="1967657"/>
+            <a:ext cx="1161835" cy="369332"/>
+          </a:xfrm>
+          <a:prstGeom prst="rect">
+            <a:avLst/>
+          </a:prstGeom>
+          <a:noFill/>
+        </p:spPr>
+        <p:txBody>
+          <a:bodyPr wrap="square" rtlCol="0">
+            <a:spAutoFit/>
+          </a:bodyPr>
+          <a:lstStyle/>
+          <a:p>
+            <a:r>
+              <a:rPr lang="it-IT" dirty="0"/>
+              <a:t>174 % </a:t>
+            </a:r>
+          </a:p>
+        </p:txBody>
+      </p:sp>
+      <p:sp>
+        <p:nvSpPr>
+          <p:cNvPr id="4" name="Freccia su 3">
+            <a:extLst>
+              <a:ext uri="{FF2B5EF4-FFF2-40B4-BE49-F238E27FC236}">
+                <a16:creationId xmlns:a16="http://schemas.microsoft.com/office/drawing/2014/main" id="{FED7DC56-85E5-DC22-BF21-750AEBEBB1C3}"/>
+              </a:ext>
+            </a:extLst>
+          </p:cNvPr>
+          <p:cNvSpPr/>
+          <p:nvPr/>
+        </p:nvSpPr>
+        <p:spPr>
+          <a:xfrm>
+            <a:off x="8078179" y="1766643"/>
+            <a:ext cx="272750" cy="771360"/>
+          </a:xfrm>
+          <a:prstGeom prst="upArrow">
+            <a:avLst/>
+          </a:prstGeom>
+          <a:solidFill>
+            <a:srgbClr val="FF0000"/>
+          </a:solidFill>
+          <a:ln>
+            <a:solidFill>
+              <a:srgbClr val="FF0000"/>
+            </a:solidFill>
+          </a:ln>
+        </p:spPr>
+        <p:style>
+          <a:lnRef idx="2">
+            <a:schemeClr val="accent1">
+              <a:shade val="50000"/>
+            </a:schemeClr>
+          </a:lnRef>
+          <a:fillRef idx="1">
+            <a:schemeClr val="accent1"/>
+          </a:fillRef>
+          <a:effectRef idx="0">
+            <a:schemeClr val="accent1"/>
+          </a:effectRef>
+          <a:fontRef idx="minor">
+            <a:schemeClr val="lt1"/>
+          </a:fontRef>
+        </p:style>
+        <p:txBody>
+          <a:bodyPr rtlCol="0" anchor="ctr"/>
+          <a:lstStyle/>
+          <a:p>
+            <a:pPr algn="ctr"/>
+            <a:endParaRPr lang="it-IT" dirty="0"/>
+          </a:p>
+        </p:txBody>
+      </p:sp>
     </p:spTree>
     <p:extLst>
       <p:ext uri="{BB962C8B-B14F-4D97-AF65-F5344CB8AC3E}">
@@ -5490,6 +5790,128 @@
   <p:clrMapOvr>
     <a:masterClrMapping/>
   </p:clrMapOvr>
+  <p:timing>
+    <p:tnLst>
+      <p:par>
+        <p:cTn id="1" dur="indefinite" restart="never" nodeType="tmRoot">
+          <p:childTnLst>
+            <p:seq concurrent="1" nextAc="seek">
+              <p:cTn id="2" dur="indefinite" nodeType="mainSeq">
+                <p:childTnLst>
+                  <p:par>
+                    <p:cTn id="3" fill="hold">
+                      <p:stCondLst>
+                        <p:cond delay="indefinite"/>
+                      </p:stCondLst>
+                      <p:childTnLst>
+                        <p:par>
+                          <p:cTn id="4" fill="hold">
+                            <p:stCondLst>
+                              <p:cond delay="0"/>
+                            </p:stCondLst>
+                            <p:childTnLst>
+                              <p:par>
+                                <p:cTn id="5" presetID="10" presetClass="entr" presetSubtype="0" fill="hold" grpId="0" nodeType="clickEffect">
+                                  <p:stCondLst>
+                                    <p:cond delay="0"/>
+                                  </p:stCondLst>
+                                  <p:childTnLst>
+                                    <p:set>
+                                      <p:cBhvr>
+                                        <p:cTn id="6" dur="1" fill="hold">
+                                          <p:stCondLst>
+                                            <p:cond delay="0"/>
+                                          </p:stCondLst>
+                                        </p:cTn>
+                                        <p:tgtEl>
+                                          <p:spTgt spid="4"/>
+                                        </p:tgtEl>
+                                        <p:attrNameLst>
+                                          <p:attrName>style.visibility</p:attrName>
+                                        </p:attrNameLst>
+                                      </p:cBhvr>
+                                      <p:to>
+                                        <p:strVal val="visible"/>
+                                      </p:to>
+                                    </p:set>
+                                    <p:animEffect transition="in" filter="fade">
+                                      <p:cBhvr>
+                                        <p:cTn id="7" dur="500"/>
+                                        <p:tgtEl>
+                                          <p:spTgt spid="4"/>
+                                        </p:tgtEl>
+                                      </p:cBhvr>
+                                    </p:animEffect>
+                                  </p:childTnLst>
+                                </p:cTn>
+                              </p:par>
+                              <p:par>
+                                <p:cTn id="8" presetID="10" presetClass="entr" presetSubtype="0" fill="hold" grpId="0" nodeType="withEffect">
+                                  <p:stCondLst>
+                                    <p:cond delay="0"/>
+                                  </p:stCondLst>
+                                  <p:childTnLst>
+                                    <p:set>
+                                      <p:cBhvr>
+                                        <p:cTn id="9" dur="1" fill="hold">
+                                          <p:stCondLst>
+                                            <p:cond delay="0"/>
+                                          </p:stCondLst>
+                                        </p:cTn>
+                                        <p:tgtEl>
+                                          <p:spTgt spid="2"/>
+                                        </p:tgtEl>
+                                        <p:attrNameLst>
+                                          <p:attrName>style.visibility</p:attrName>
+                                        </p:attrNameLst>
+                                      </p:cBhvr>
+                                      <p:to>
+                                        <p:strVal val="visible"/>
+                                      </p:to>
+                                    </p:set>
+                                    <p:animEffect transition="in" filter="fade">
+                                      <p:cBhvr>
+                                        <p:cTn id="10" dur="500"/>
+                                        <p:tgtEl>
+                                          <p:spTgt spid="2"/>
+                                        </p:tgtEl>
+                                      </p:cBhvr>
+                                    </p:animEffect>
+                                  </p:childTnLst>
+                                </p:cTn>
+                              </p:par>
+                            </p:childTnLst>
+                          </p:cTn>
+                        </p:par>
+                      </p:childTnLst>
+                    </p:cTn>
+                  </p:par>
+                </p:childTnLst>
+              </p:cTn>
+              <p:prevCondLst>
+                <p:cond evt="onPrev" delay="0">
+                  <p:tgtEl>
+                    <p:sldTgt/>
+                  </p:tgtEl>
+                </p:cond>
+              </p:prevCondLst>
+              <p:nextCondLst>
+                <p:cond evt="onNext" delay="0">
+                  <p:tgtEl>
+                    <p:sldTgt/>
+                  </p:tgtEl>
+                </p:cond>
+              </p:nextCondLst>
+            </p:seq>
+          </p:childTnLst>
+        </p:cTn>
+      </p:par>
+    </p:tnLst>
+    <p:bldLst>
+      <p:bldP spid="2" grpId="0"/>
+      <p:bldP spid="4" grpId="0" animBg="1"/>
+    </p:bldLst>
+  </p:timing>
 </p:sld>
 </file>
 
@@ -6168,6 +6590,95 @@
           </a:p>
         </p:txBody>
       </p:sp>
+      <p:sp>
+        <p:nvSpPr>
+          <p:cNvPr id="4" name="CasellaDiTesto 3">
+            <a:extLst>
+              <a:ext uri="{FF2B5EF4-FFF2-40B4-BE49-F238E27FC236}">
+                <a16:creationId xmlns:a16="http://schemas.microsoft.com/office/drawing/2014/main" id="{4B59FC53-0984-F0B5-4C9A-45628B18D7EA}"/>
+              </a:ext>
+            </a:extLst>
+          </p:cNvPr>
+          <p:cNvSpPr txBox="1"/>
+          <p:nvPr/>
+        </p:nvSpPr>
+        <p:spPr>
+          <a:xfrm>
+            <a:off x="9974713" y="1994354"/>
+            <a:ext cx="1161835" cy="369332"/>
+          </a:xfrm>
+          <a:prstGeom prst="rect">
+            <a:avLst/>
+          </a:prstGeom>
+          <a:noFill/>
+        </p:spPr>
+        <p:txBody>
+          <a:bodyPr wrap="square" rtlCol="0">
+            <a:spAutoFit/>
+          </a:bodyPr>
+          <a:lstStyle/>
+          <a:p>
+            <a:r>
+              <a:rPr lang="it-IT" dirty="0"/>
+              <a:t>267 % </a:t>
+            </a:r>
+          </a:p>
+        </p:txBody>
+      </p:sp>
+      <p:sp>
+        <p:nvSpPr>
+          <p:cNvPr id="5" name="Freccia su 4">
+            <a:extLst>
+              <a:ext uri="{FF2B5EF4-FFF2-40B4-BE49-F238E27FC236}">
+                <a16:creationId xmlns:a16="http://schemas.microsoft.com/office/drawing/2014/main" id="{F1415895-9CB5-9DDA-4382-764A351F0546}"/>
+              </a:ext>
+            </a:extLst>
+          </p:cNvPr>
+          <p:cNvSpPr/>
+          <p:nvPr/>
+        </p:nvSpPr>
+        <p:spPr>
+          <a:xfrm>
+            <a:off x="9743870" y="1793340"/>
+            <a:ext cx="272750" cy="771360"/>
+          </a:xfrm>
+          <a:prstGeom prst="upArrow">
+            <a:avLst/>
+          </a:prstGeom>
+          <a:solidFill>
+            <a:srgbClr val="FF0000"/>
+          </a:solidFill>
+          <a:ln>
+            <a:solidFill>
+              <a:srgbClr val="FF0000"/>
+            </a:solidFill>
+          </a:ln>
+        </p:spPr>
+        <p:style>
+          <a:lnRef idx="2">
+            <a:schemeClr val="accent1">
+              <a:shade val="50000"/>
+            </a:schemeClr>
+          </a:lnRef>
+          <a:fillRef idx="1">
+            <a:schemeClr val="accent1"/>
+          </a:fillRef>
+          <a:effectRef idx="0">
+            <a:schemeClr val="accent1"/>
+          </a:effectRef>
+          <a:fontRef idx="minor">
+            <a:schemeClr val="lt1"/>
+          </a:fontRef>
+        </p:style>
+        <p:txBody>
+          <a:bodyPr rtlCol="0" anchor="ctr"/>
+          <a:lstStyle/>
+          <a:p>
+            <a:pPr algn="ctr"/>
+            <a:endParaRPr lang="it-IT" dirty="0"/>
+          </a:p>
+        </p:txBody>
+      </p:sp>
     </p:spTree>
     <p:extLst>
       <p:ext uri="{BB962C8B-B14F-4D97-AF65-F5344CB8AC3E}">
@@ -6178,6 +6689,128 @@
   <p:clrMapOvr>
     <a:masterClrMapping/>
   </p:clrMapOvr>
+  <p:timing>
+    <p:tnLst>
+      <p:par>
+        <p:cTn id="1" dur="indefinite" restart="never" nodeType="tmRoot">
+          <p:childTnLst>
+            <p:seq concurrent="1" nextAc="seek">
+              <p:cTn id="2" dur="indefinite" nodeType="mainSeq">
+                <p:childTnLst>
+                  <p:par>
+                    <p:cTn id="3" fill="hold">
+                      <p:stCondLst>
+                        <p:cond delay="indefinite"/>
+                      </p:stCondLst>
+                      <p:childTnLst>
+                        <p:par>
+                          <p:cTn id="4" fill="hold">
+                            <p:stCondLst>
+                              <p:cond delay="0"/>
+                            </p:stCondLst>
+                            <p:childTnLst>
+                              <p:par>
+                                <p:cTn id="5" presetID="10" presetClass="entr" presetSubtype="0" fill="hold" grpId="0" nodeType="clickEffect">
+                                  <p:stCondLst>
+                                    <p:cond delay="0"/>
+                                  </p:stCondLst>
+                                  <p:childTnLst>
+                                    <p:set>
+                                      <p:cBhvr>
+                                        <p:cTn id="6" dur="1" fill="hold">
+                                          <p:stCondLst>
+                                            <p:cond delay="0"/>
+                                          </p:stCondLst>
+                                        </p:cTn>
+                                        <p:tgtEl>
+                                          <p:spTgt spid="5"/>
+                                        </p:tgtEl>
+                                        <p:attrNameLst>
+                                          <p:attrName>style.visibility</p:attrName>
+                                        </p:attrNameLst>
+                                      </p:cBhvr>
+                                      <p:to>
+                                        <p:strVal val="visible"/>
+                                      </p:to>
+                                    </p:set>
+                                    <p:animEffect transition="in" filter="fade">
+                                      <p:cBhvr>
+                                        <p:cTn id="7" dur="500"/>
+                                        <p:tgtEl>
+                                          <p:spTgt spid="5"/>
+                                        </p:tgtEl>
+                                      </p:cBhvr>
+                                    </p:animEffect>
+                                  </p:childTnLst>
+                                </p:cTn>
+                              </p:par>
+                              <p:par>
+                                <p:cTn id="8" presetID="10" presetClass="entr" presetSubtype="0" fill="hold" grpId="0" nodeType="withEffect">
+                                  <p:stCondLst>
+                                    <p:cond delay="0"/>
+                                  </p:stCondLst>
+                                  <p:childTnLst>
+                                    <p:set>
+                                      <p:cBhvr>
+                                        <p:cTn id="9" dur="1" fill="hold">
+                                          <p:stCondLst>
+                                            <p:cond delay="0"/>
+                                          </p:stCondLst>
+                                        </p:cTn>
+                                        <p:tgtEl>
+                                          <p:spTgt spid="4"/>
+                                        </p:tgtEl>
+                                        <p:attrNameLst>
+                                          <p:attrName>style.visibility</p:attrName>
+                                        </p:attrNameLst>
+                                      </p:cBhvr>
+                                      <p:to>
+                                        <p:strVal val="visible"/>
+                                      </p:to>
+                                    </p:set>
+                                    <p:animEffect transition="in" filter="fade">
+                                      <p:cBhvr>
+                                        <p:cTn id="10" dur="500"/>
+                                        <p:tgtEl>
+                                          <p:spTgt spid="4"/>
+                                        </p:tgtEl>
+                                      </p:cBhvr>
+                                    </p:animEffect>
+                                  </p:childTnLst>
+                                </p:cTn>
+                              </p:par>
+                            </p:childTnLst>
+                          </p:cTn>
+                        </p:par>
+                      </p:childTnLst>
+                    </p:cTn>
+                  </p:par>
+                </p:childTnLst>
+              </p:cTn>
+              <p:prevCondLst>
+                <p:cond evt="onPrev" delay="0">
+                  <p:tgtEl>
+                    <p:sldTgt/>
+                  </p:tgtEl>
+                </p:cond>
+              </p:prevCondLst>
+              <p:nextCondLst>
+                <p:cond evt="onNext" delay="0">
+                  <p:tgtEl>
+                    <p:sldTgt/>
+                  </p:tgtEl>
+                </p:cond>
+              </p:nextCondLst>
+            </p:seq>
+          </p:childTnLst>
+        </p:cTn>
+      </p:par>
+    </p:tnLst>
+    <p:bldLst>
+      <p:bldP spid="4" grpId="0"/>
+      <p:bldP spid="5" grpId="0" animBg="1"/>
+    </p:bldLst>
+  </p:timing>
 </p:sld>
 </file>
 
@@ -6856,6 +7489,95 @@
           </a:p>
         </p:txBody>
       </p:sp>
+      <p:sp>
+        <p:nvSpPr>
+          <p:cNvPr id="4" name="CasellaDiTesto 3">
+            <a:extLst>
+              <a:ext uri="{FF2B5EF4-FFF2-40B4-BE49-F238E27FC236}">
+                <a16:creationId xmlns:a16="http://schemas.microsoft.com/office/drawing/2014/main" id="{9B359D5C-E3BE-7BFC-7A8B-6AA83CC2FD0C}"/>
+              </a:ext>
+            </a:extLst>
+          </p:cNvPr>
+          <p:cNvSpPr txBox="1"/>
+          <p:nvPr/>
+        </p:nvSpPr>
+        <p:spPr>
+          <a:xfrm>
+            <a:off x="10194401" y="1994354"/>
+            <a:ext cx="1161835" cy="369332"/>
+          </a:xfrm>
+          <a:prstGeom prst="rect">
+            <a:avLst/>
+          </a:prstGeom>
+          <a:noFill/>
+        </p:spPr>
+        <p:txBody>
+          <a:bodyPr wrap="square" rtlCol="0">
+            <a:spAutoFit/>
+          </a:bodyPr>
+          <a:lstStyle/>
+          <a:p>
+            <a:r>
+              <a:rPr lang="it-IT" dirty="0"/>
+              <a:t>228 % </a:t>
+            </a:r>
+          </a:p>
+        </p:txBody>
+      </p:sp>
+      <p:sp>
+        <p:nvSpPr>
+          <p:cNvPr id="5" name="Freccia su 4">
+            <a:extLst>
+              <a:ext uri="{FF2B5EF4-FFF2-40B4-BE49-F238E27FC236}">
+                <a16:creationId xmlns:a16="http://schemas.microsoft.com/office/drawing/2014/main" id="{BF5F0617-D60B-9232-C0E7-2F73E6AE4B20}"/>
+              </a:ext>
+            </a:extLst>
+          </p:cNvPr>
+          <p:cNvSpPr/>
+          <p:nvPr/>
+        </p:nvSpPr>
+        <p:spPr>
+          <a:xfrm>
+            <a:off x="9963558" y="1793340"/>
+            <a:ext cx="272750" cy="771360"/>
+          </a:xfrm>
+          <a:prstGeom prst="upArrow">
+            <a:avLst/>
+          </a:prstGeom>
+          <a:solidFill>
+            <a:srgbClr val="FF0000"/>
+          </a:solidFill>
+          <a:ln>
+            <a:solidFill>
+              <a:srgbClr val="FF0000"/>
+            </a:solidFill>
+          </a:ln>
+        </p:spPr>
+        <p:style>
+          <a:lnRef idx="2">
+            <a:schemeClr val="accent1">
+              <a:shade val="50000"/>
+            </a:schemeClr>
+          </a:lnRef>
+          <a:fillRef idx="1">
+            <a:schemeClr val="accent1"/>
+          </a:fillRef>
+          <a:effectRef idx="0">
+            <a:schemeClr val="accent1"/>
+          </a:effectRef>
+          <a:fontRef idx="minor">
+            <a:schemeClr val="lt1"/>
+          </a:fontRef>
+        </p:style>
+        <p:txBody>
+          <a:bodyPr rtlCol="0" anchor="ctr"/>
+          <a:lstStyle/>
+          <a:p>
+            <a:pPr algn="ctr"/>
+            <a:endParaRPr lang="it-IT" dirty="0"/>
+          </a:p>
+        </p:txBody>
+      </p:sp>
     </p:spTree>
     <p:extLst>
       <p:ext uri="{BB962C8B-B14F-4D97-AF65-F5344CB8AC3E}">
@@ -6866,6 +7588,128 @@
   <p:clrMapOvr>
     <a:masterClrMapping/>
   </p:clrMapOvr>
+  <p:timing>
+    <p:tnLst>
+      <p:par>
+        <p:cTn id="1" dur="indefinite" restart="never" nodeType="tmRoot">
+          <p:childTnLst>
+            <p:seq concurrent="1" nextAc="seek">
+              <p:cTn id="2" dur="indefinite" nodeType="mainSeq">
+                <p:childTnLst>
+                  <p:par>
+                    <p:cTn id="3" fill="hold">
+                      <p:stCondLst>
+                        <p:cond delay="indefinite"/>
+                      </p:stCondLst>
+                      <p:childTnLst>
+                        <p:par>
+                          <p:cTn id="4" fill="hold">
+                            <p:stCondLst>
+                              <p:cond delay="0"/>
+                            </p:stCondLst>
+                            <p:childTnLst>
+                              <p:par>
+                                <p:cTn id="5" presetID="10" presetClass="entr" presetSubtype="0" fill="hold" grpId="0" nodeType="clickEffect">
+                                  <p:stCondLst>
+                                    <p:cond delay="0"/>
+                                  </p:stCondLst>
+                                  <p:childTnLst>
+                                    <p:set>
+                                      <p:cBhvr>
+                                        <p:cTn id="6" dur="1" fill="hold">
+                                          <p:stCondLst>
+                                            <p:cond delay="0"/>
+                                          </p:stCondLst>
+                                        </p:cTn>
+                                        <p:tgtEl>
+                                          <p:spTgt spid="5"/>
+                                        </p:tgtEl>
+                                        <p:attrNameLst>
+                                          <p:attrName>style.visibility</p:attrName>
+                                        </p:attrNameLst>
+                                      </p:cBhvr>
+                                      <p:to>
+                                        <p:strVal val="visible"/>
+                                      </p:to>
+                                    </p:set>
+                                    <p:animEffect transition="in" filter="fade">
+                                      <p:cBhvr>
+                                        <p:cTn id="7" dur="500"/>
+                                        <p:tgtEl>
+                                          <p:spTgt spid="5"/>
+                                        </p:tgtEl>
+                                      </p:cBhvr>
+                                    </p:animEffect>
+                                  </p:childTnLst>
+                                </p:cTn>
+                              </p:par>
+                              <p:par>
+                                <p:cTn id="8" presetID="10" presetClass="entr" presetSubtype="0" fill="hold" grpId="0" nodeType="withEffect">
+                                  <p:stCondLst>
+                                    <p:cond delay="0"/>
+                                  </p:stCondLst>
+                                  <p:childTnLst>
+                                    <p:set>
+                                      <p:cBhvr>
+                                        <p:cTn id="9" dur="1" fill="hold">
+                                          <p:stCondLst>
+                                            <p:cond delay="0"/>
+                                          </p:stCondLst>
+                                        </p:cTn>
+                                        <p:tgtEl>
+                                          <p:spTgt spid="4"/>
+                                        </p:tgtEl>
+                                        <p:attrNameLst>
+                                          <p:attrName>style.visibility</p:attrName>
+                                        </p:attrNameLst>
+                                      </p:cBhvr>
+                                      <p:to>
+                                        <p:strVal val="visible"/>
+                                      </p:to>
+                                    </p:set>
+                                    <p:animEffect transition="in" filter="fade">
+                                      <p:cBhvr>
+                                        <p:cTn id="10" dur="500"/>
+                                        <p:tgtEl>
+                                          <p:spTgt spid="4"/>
+                                        </p:tgtEl>
+                                      </p:cBhvr>
+                                    </p:animEffect>
+                                  </p:childTnLst>
+                                </p:cTn>
+                              </p:par>
+                            </p:childTnLst>
+                          </p:cTn>
+                        </p:par>
+                      </p:childTnLst>
+                    </p:cTn>
+                  </p:par>
+                </p:childTnLst>
+              </p:cTn>
+              <p:prevCondLst>
+                <p:cond evt="onPrev" delay="0">
+                  <p:tgtEl>
+                    <p:sldTgt/>
+                  </p:tgtEl>
+                </p:cond>
+              </p:prevCondLst>
+              <p:nextCondLst>
+                <p:cond evt="onNext" delay="0">
+                  <p:tgtEl>
+                    <p:sldTgt/>
+                  </p:tgtEl>
+                </p:cond>
+              </p:nextCondLst>
+            </p:seq>
+          </p:childTnLst>
+        </p:cTn>
+      </p:par>
+    </p:tnLst>
+    <p:bldLst>
+      <p:bldP spid="4" grpId="0"/>
+      <p:bldP spid="5" grpId="0" animBg="1"/>
+    </p:bldLst>
+  </p:timing>
 </p:sld>
 </file>
 
@@ -6904,33 +7748,19 @@
         </p:nvSpPr>
         <p:spPr/>
         <p:txBody>
-          <a:bodyPr/>
+          <a:bodyPr>
+            <a:normAutofit/>
+          </a:bodyPr>
           <a:lstStyle/>
           <a:p>
             <a:r>
               <a:rPr lang="it-IT" dirty="0"/>
-              <a:t>Are </a:t>
+              <a:t>(CLONCLUSIONS AND QUESTIONS)</a:t>
             </a:r>
-            <a:r>
-              <a:rPr lang="it-IT" dirty="0" err="1"/>
-              <a:t>we</a:t>
-            </a:r>
-            <a:r>
+            <a:br>
               <a:rPr lang="it-IT" dirty="0"/>
-              <a:t> </a:t>
-            </a:r>
-            <a:r>
-              <a:rPr lang="it-IT" dirty="0" err="1"/>
-              <a:t>fucked</a:t>
-            </a:r>
-            <a:r>
-              <a:rPr lang="it-IT" dirty="0"/>
-              <a:t>? </a:t>
-            </a:r>
-            <a:r>
-              <a:rPr lang="it-IT"/>
-              <a:t>YES!</a:t>
-            </a:r>
+            </a:br>
+            <a:endParaRPr lang="it-IT" dirty="0"/>
           </a:p>
         </p:txBody>
       </p:sp>
@@ -6999,10 +7829,10 @@
       </p:grpSpPr>
       <p:sp useBgFill="1">
         <p:nvSpPr>
-          <p:cNvPr id="10" name="Rectangle 9">
-            <a:extLst>
-              <a:ext uri="{FF2B5EF4-FFF2-40B4-BE49-F238E27FC236}">
-                <a16:creationId xmlns:a16="http://schemas.microsoft.com/office/drawing/2014/main" id="{32AEEBC8-9D30-42EF-95F2-386C2653FBF0}"/>
+          <p:cNvPr id="17" name="Rectangle 16">
+            <a:extLst>
+              <a:ext uri="{FF2B5EF4-FFF2-40B4-BE49-F238E27FC236}">
+                <a16:creationId xmlns:a16="http://schemas.microsoft.com/office/drawing/2014/main" id="{2C9A9DA9-7DC8-488B-A882-123947B0F3D9}"/>
               </a:ext>
               <a:ext uri="{C183D7F6-B498-43B3-948B-1728B52AA6E4}">
                 <adec:decorative xmlns:adec="http://schemas.microsoft.com/office/drawing/2017/decorative" val="1"/>
@@ -7057,47 +7887,12 @@
           </a:p>
         </p:txBody>
       </p:sp>
-      <p:sp>
-        <p:nvSpPr>
-          <p:cNvPr id="2" name="Titolo 1">
-            <a:extLst>
-              <a:ext uri="{FF2B5EF4-FFF2-40B4-BE49-F238E27FC236}">
-                <a16:creationId xmlns:a16="http://schemas.microsoft.com/office/drawing/2014/main" id="{75749EA5-47E2-6913-5EBD-D723B4407722}"/>
-              </a:ext>
-            </a:extLst>
-          </p:cNvPr>
-          <p:cNvSpPr>
-            <a:spLocks noGrp="1"/>
-          </p:cNvSpPr>
-          <p:nvPr>
-            <p:ph type="title"/>
-          </p:nvPr>
-        </p:nvSpPr>
-        <p:spPr>
-          <a:xfrm>
-            <a:off x="630936" y="502920"/>
-            <a:ext cx="3419856" cy="1463040"/>
-          </a:xfrm>
-        </p:spPr>
-        <p:txBody>
-          <a:bodyPr anchor="ctr">
-            <a:normAutofit/>
-          </a:bodyPr>
-          <a:lstStyle/>
-          <a:p>
-            <a:r>
-              <a:rPr lang="it-IT" sz="4800"/>
-              <a:t>Introduction</a:t>
-            </a:r>
-          </a:p>
-        </p:txBody>
-      </p:sp>
-      <p:sp>
-        <p:nvSpPr>
-          <p:cNvPr id="12" name="sketch line">
-            <a:extLst>
-              <a:ext uri="{FF2B5EF4-FFF2-40B4-BE49-F238E27FC236}">
-                <a16:creationId xmlns:a16="http://schemas.microsoft.com/office/drawing/2014/main" id="{2E92FA66-67D7-4CB4-94D3-E643A9AD4757}"/>
+      <p:sp useBgFill="1">
+        <p:nvSpPr>
+          <p:cNvPr id="19" name="Rectangle 18">
+            <a:extLst>
+              <a:ext uri="{FF2B5EF4-FFF2-40B4-BE49-F238E27FC236}">
+                <a16:creationId xmlns:a16="http://schemas.microsoft.com/office/drawing/2014/main" id="{57F6BDD4-E066-4008-8011-6CC31AEB4556}"/>
               </a:ext>
               <a:ext uri="{C183D7F6-B498-43B3-948B-1728B52AA6E4}">
                 <adec:decorative xmlns:adec="http://schemas.microsoft.com/office/drawing/2017/decorative" val="1"/>
@@ -7116,179 +7911,26 @@
           </p:nvPr>
         </p:nvSpPr>
         <p:spPr>
-          <a:xfrm rot="5400000">
-            <a:off x="3566159" y="1225296"/>
-            <a:ext cx="1554480" cy="18288"/>
-          </a:xfrm>
-          <a:custGeom>
+          <a:xfrm>
+            <a:off x="409575" y="633619"/>
+            <a:ext cx="4279383" cy="5495925"/>
+          </a:xfrm>
+          <a:prstGeom prst="rect">
             <a:avLst/>
-            <a:gdLst>
-              <a:gd name="connsiteX0" fmla="*/ 0 w 1554480"/>
-              <a:gd name="connsiteY0" fmla="*/ 0 h 18288"/>
-              <a:gd name="connsiteX1" fmla="*/ 549250 w 1554480"/>
-              <a:gd name="connsiteY1" fmla="*/ 0 h 18288"/>
-              <a:gd name="connsiteX2" fmla="*/ 1082954 w 1554480"/>
-              <a:gd name="connsiteY2" fmla="*/ 0 h 18288"/>
-              <a:gd name="connsiteX3" fmla="*/ 1554480 w 1554480"/>
-              <a:gd name="connsiteY3" fmla="*/ 0 h 18288"/>
-              <a:gd name="connsiteX4" fmla="*/ 1554480 w 1554480"/>
-              <a:gd name="connsiteY4" fmla="*/ 18288 h 18288"/>
-              <a:gd name="connsiteX5" fmla="*/ 1067410 w 1554480"/>
-              <a:gd name="connsiteY5" fmla="*/ 18288 h 18288"/>
-              <a:gd name="connsiteX6" fmla="*/ 549250 w 1554480"/>
-              <a:gd name="connsiteY6" fmla="*/ 18288 h 18288"/>
-              <a:gd name="connsiteX7" fmla="*/ 0 w 1554480"/>
-              <a:gd name="connsiteY7" fmla="*/ 18288 h 18288"/>
-              <a:gd name="connsiteX8" fmla="*/ 0 w 1554480"/>
-              <a:gd name="connsiteY8" fmla="*/ 0 h 18288"/>
-            </a:gdLst>
-            <a:ahLst/>
-            <a:cxnLst>
-              <a:cxn ang="0">
-                <a:pos x="connsiteX0" y="connsiteY0"/>
-              </a:cxn>
-              <a:cxn ang="0">
-                <a:pos x="connsiteX1" y="connsiteY1"/>
-              </a:cxn>
-              <a:cxn ang="0">
-                <a:pos x="connsiteX2" y="connsiteY2"/>
-              </a:cxn>
-              <a:cxn ang="0">
-                <a:pos x="connsiteX3" y="connsiteY3"/>
-              </a:cxn>
-              <a:cxn ang="0">
-                <a:pos x="connsiteX4" y="connsiteY4"/>
-              </a:cxn>
-              <a:cxn ang="0">
-                <a:pos x="connsiteX5" y="connsiteY5"/>
-              </a:cxn>
-              <a:cxn ang="0">
-                <a:pos x="connsiteX6" y="connsiteY6"/>
-              </a:cxn>
-              <a:cxn ang="0">
-                <a:pos x="connsiteX7" y="connsiteY7"/>
-              </a:cxn>
-              <a:cxn ang="0">
-                <a:pos x="connsiteX8" y="connsiteY8"/>
-              </a:cxn>
-            </a:cxnLst>
-            <a:rect l="l" t="t" r="r" b="b"/>
-            <a:pathLst>
-              <a:path w="1554480" h="18288" fill="none" extrusionOk="0">
-                <a:moveTo>
-                  <a:pt x="0" y="0"/>
-                </a:moveTo>
-                <a:cubicBezTo>
-                  <a:pt x="114141" y="-19864"/>
-                  <a:pt x="345055" y="-1657"/>
-                  <a:pt x="549250" y="0"/>
-                </a:cubicBezTo>
-                <a:cubicBezTo>
-                  <a:pt x="753445" y="1657"/>
-                  <a:pt x="862292" y="-5674"/>
-                  <a:pt x="1082954" y="0"/>
-                </a:cubicBezTo>
-                <a:cubicBezTo>
-                  <a:pt x="1303616" y="5674"/>
-                  <a:pt x="1363530" y="4537"/>
-                  <a:pt x="1554480" y="0"/>
-                </a:cubicBezTo>
-                <a:cubicBezTo>
-                  <a:pt x="1554963" y="7176"/>
-                  <a:pt x="1553909" y="13682"/>
-                  <a:pt x="1554480" y="18288"/>
-                </a:cubicBezTo>
-                <a:cubicBezTo>
-                  <a:pt x="1338847" y="6127"/>
-                  <a:pt x="1215066" y="37851"/>
-                  <a:pt x="1067410" y="18288"/>
-                </a:cubicBezTo>
-                <a:cubicBezTo>
-                  <a:pt x="919754" y="-1275"/>
-                  <a:pt x="800465" y="3080"/>
-                  <a:pt x="549250" y="18288"/>
-                </a:cubicBezTo>
-                <a:cubicBezTo>
-                  <a:pt x="298035" y="33496"/>
-                  <a:pt x="158868" y="22769"/>
-                  <a:pt x="0" y="18288"/>
-                </a:cubicBezTo>
-                <a:cubicBezTo>
-                  <a:pt x="-655" y="13237"/>
-                  <a:pt x="709" y="4645"/>
-                  <a:pt x="0" y="0"/>
-                </a:cubicBezTo>
-                <a:close/>
-              </a:path>
-              <a:path w="1554480" h="18288" stroke="0" extrusionOk="0">
-                <a:moveTo>
-                  <a:pt x="0" y="0"/>
-                </a:moveTo>
-                <a:cubicBezTo>
-                  <a:pt x="249941" y="-58"/>
-                  <a:pt x="367334" y="23448"/>
-                  <a:pt x="502615" y="0"/>
-                </a:cubicBezTo>
-                <a:cubicBezTo>
-                  <a:pt x="637897" y="-23448"/>
-                  <a:pt x="813653" y="-20418"/>
-                  <a:pt x="974141" y="0"/>
-                </a:cubicBezTo>
-                <a:cubicBezTo>
-                  <a:pt x="1134629" y="20418"/>
-                  <a:pt x="1268772" y="6288"/>
-                  <a:pt x="1554480" y="0"/>
-                </a:cubicBezTo>
-                <a:cubicBezTo>
-                  <a:pt x="1554917" y="7222"/>
-                  <a:pt x="1555359" y="13299"/>
-                  <a:pt x="1554480" y="18288"/>
-                </a:cubicBezTo>
-                <a:cubicBezTo>
-                  <a:pt x="1336087" y="12172"/>
-                  <a:pt x="1310024" y="19759"/>
-                  <a:pt x="1067410" y="18288"/>
-                </a:cubicBezTo>
-                <a:cubicBezTo>
-                  <a:pt x="824796" y="16818"/>
-                  <a:pt x="787902" y="34647"/>
-                  <a:pt x="518160" y="18288"/>
-                </a:cubicBezTo>
-                <a:cubicBezTo>
-                  <a:pt x="248418" y="1930"/>
-                  <a:pt x="133160" y="9205"/>
-                  <a:pt x="0" y="18288"/>
-                </a:cubicBezTo>
-                <a:cubicBezTo>
-                  <a:pt x="-643" y="9451"/>
-                  <a:pt x="-340" y="7114"/>
-                  <a:pt x="0" y="0"/>
-                </a:cubicBezTo>
-                <a:close/>
-              </a:path>
-            </a:pathLst>
-          </a:custGeom>
-          <a:solidFill>
-            <a:schemeClr val="accent2"/>
-          </a:solidFill>
-          <a:ln w="41275" cap="rnd">
+          </a:prstGeom>
+          <a:ln w="9525">
             <a:solidFill>
-              <a:schemeClr val="accent2"/>
+              <a:srgbClr val="DEDEDE"/>
             </a:solidFill>
-            <a:round/>
-            <a:extLst>
-              <a:ext uri="{C807C97D-BFC1-408E-A445-0C87EB9F89A2}">
-                <ask:lineSketchStyleProps xmlns:ask="http://schemas.microsoft.com/office/drawing/2018/sketchyshapes" sd="1219033472">
-                  <a:prstGeom prst="rect">
-                    <a:avLst/>
-                  </a:prstGeom>
-                  <ask:type>
-                    <ask:lineSketchFreehand/>
-                  </ask:type>
-                </ask:lineSketchStyleProps>
-              </a:ext>
-            </a:extLst>
           </a:ln>
+          <a:effectLst>
+            <a:outerShdw blurRad="50800" dist="38100" dir="2700000" algn="tl" rotWithShape="0">
+              <a:schemeClr val="bg1">
+                <a:lumMod val="85000"/>
+                <a:alpha val="50000"/>
+              </a:schemeClr>
+            </a:outerShdw>
+          </a:effectLst>
         </p:spPr>
         <p:style>
           <a:lnRef idx="2">
@@ -7310,17 +7952,46 @@
           <a:bodyPr rtlCol="0" anchor="ctr"/>
           <a:lstStyle/>
           <a:p>
-            <a:pPr algn="ctr"/>
-            <a:endParaRPr lang="en-US"/>
-          </a:p>
-        </p:txBody>
-      </p:sp>
-      <p:sp>
-        <p:nvSpPr>
-          <p:cNvPr id="3" name="Segnaposto contenuto 2">
-            <a:extLst>
-              <a:ext uri="{FF2B5EF4-FFF2-40B4-BE49-F238E27FC236}">
-                <a16:creationId xmlns:a16="http://schemas.microsoft.com/office/drawing/2014/main" id="{41EFF75C-A4DD-5749-8B7F-DEA1D7E80D3E}"/>
+            <a:pPr marL="0" marR="0" lvl="0" indent="0" algn="ctr" defTabSz="914400" rtl="0" eaLnBrk="1" fontAlgn="auto" latinLnBrk="0" hangingPunct="1">
+              <a:lnSpc>
+                <a:spcPct val="100000"/>
+              </a:lnSpc>
+              <a:spcBef>
+                <a:spcPts val="0"/>
+              </a:spcBef>
+              <a:spcAft>
+                <a:spcPts val="0"/>
+              </a:spcAft>
+              <a:buClrTx/>
+              <a:buSzTx/>
+              <a:buFontTx/>
+              <a:buNone/>
+              <a:tabLst/>
+              <a:defRPr/>
+            </a:pPr>
+            <a:endParaRPr kumimoji="0" lang="en-US" sz="1800" b="0" i="0" u="none" strike="noStrike" kern="1200" cap="none" spc="0" normalizeH="0" baseline="0" noProof="0">
+              <a:ln>
+                <a:noFill/>
+              </a:ln>
+              <a:solidFill>
+                <a:prstClr val="white"/>
+              </a:solidFill>
+              <a:effectLst/>
+              <a:uLnTx/>
+              <a:uFillTx/>
+              <a:latin typeface="Calibri" panose="020F0502020204030204"/>
+              <a:ea typeface="+mn-ea"/>
+              <a:cs typeface="+mn-cs"/>
+            </a:endParaRPr>
+          </a:p>
+        </p:txBody>
+      </p:sp>
+      <p:sp>
+        <p:nvSpPr>
+          <p:cNvPr id="2" name="Titolo 1">
+            <a:extLst>
+              <a:ext uri="{FF2B5EF4-FFF2-40B4-BE49-F238E27FC236}">
+                <a16:creationId xmlns:a16="http://schemas.microsoft.com/office/drawing/2014/main" id="{75749EA5-47E2-6913-5EBD-D723B4407722}"/>
               </a:ext>
             </a:extLst>
           </p:cNvPr>
@@ -7328,67 +7999,214 @@
             <a:spLocks noGrp="1"/>
           </p:cNvSpPr>
           <p:nvPr>
-            <p:ph idx="1"/>
+            <p:ph type="title"/>
           </p:nvPr>
         </p:nvSpPr>
         <p:spPr>
           <a:xfrm>
-            <a:off x="4654295" y="502920"/>
-            <a:ext cx="6894576" cy="1463040"/>
-          </a:xfrm>
-        </p:spPr>
-        <p:txBody>
-          <a:bodyPr anchor="ctr">
+            <a:off x="841247" y="978619"/>
+            <a:ext cx="3410712" cy="1106424"/>
+          </a:xfrm>
+        </p:spPr>
+        <p:txBody>
+          <a:bodyPr>
             <a:normAutofit/>
           </a:bodyPr>
           <a:lstStyle/>
+          <a:p>
+            <a:r>
+              <a:rPr lang="it-IT" sz="2800" dirty="0"/>
+              <a:t>Carbon </a:t>
+            </a:r>
+            <a:r>
+              <a:rPr lang="it-IT" sz="2800" dirty="0" err="1"/>
+              <a:t>emissions</a:t>
+            </a:r>
+            <a:endParaRPr lang="it-IT" sz="2800" dirty="0"/>
+          </a:p>
+        </p:txBody>
+      </p:sp>
+      <p:sp>
+        <p:nvSpPr>
+          <p:cNvPr id="21" name="Rectangle 20">
+            <a:extLst>
+              <a:ext uri="{FF2B5EF4-FFF2-40B4-BE49-F238E27FC236}">
+                <a16:creationId xmlns:a16="http://schemas.microsoft.com/office/drawing/2014/main" id="{2711A8FB-68FC-45FC-B01E-38F809E2D439}"/>
+              </a:ext>
+              <a:ext uri="{C183D7F6-B498-43B3-948B-1728B52AA6E4}">
+                <adec:decorative xmlns:adec="http://schemas.microsoft.com/office/drawing/2017/decorative" val="1"/>
+              </a:ext>
+            </a:extLst>
+          </p:cNvPr>
+          <p:cNvSpPr>
+            <a:spLocks noGrp="1" noRot="1" noChangeAspect="1" noMove="1" noResize="1" noEditPoints="1" noAdjustHandles="1" noChangeArrowheads="1" noChangeShapeType="1" noTextEdit="1"/>
+          </p:cNvSpPr>
+          <p:nvPr>
+            <p:extLst>
+              <p:ext uri="{386F3935-93C4-4BCD-93E2-E3B085C9AB24}">
+                <p16:designElem xmlns:p16="http://schemas.microsoft.com/office/powerpoint/2015/main" val="1"/>
+              </p:ext>
+            </p:extLst>
+          </p:nvPr>
+        </p:nvSpPr>
+        <p:spPr>
+          <a:xfrm>
+            <a:off x="345567" y="1171300"/>
+            <a:ext cx="128016" cy="704088"/>
+          </a:xfrm>
+          <a:prstGeom prst="rect">
+            <a:avLst/>
+          </a:prstGeom>
+          <a:solidFill>
+            <a:schemeClr val="accent2"/>
+          </a:solidFill>
+          <a:ln>
+            <a:noFill/>
+          </a:ln>
+        </p:spPr>
+        <p:style>
+          <a:lnRef idx="2">
+            <a:schemeClr val="accent1">
+              <a:shade val="50000"/>
+            </a:schemeClr>
+          </a:lnRef>
+          <a:fillRef idx="1">
+            <a:schemeClr val="accent1"/>
+          </a:fillRef>
+          <a:effectRef idx="0">
+            <a:schemeClr val="accent1"/>
+          </a:effectRef>
+          <a:fontRef idx="minor">
+            <a:schemeClr val="lt1"/>
+          </a:fontRef>
+        </p:style>
+        <p:txBody>
+          <a:bodyPr rtlCol="0" anchor="ctr"/>
+          <a:lstStyle/>
+          <a:p>
+            <a:pPr algn="ctr"/>
+            <a:endParaRPr lang="en-US">
+              <a:solidFill>
+                <a:prstClr val="white"/>
+              </a:solidFill>
+              <a:latin typeface="Calibri" panose="020F0502020204030204"/>
+            </a:endParaRPr>
+          </a:p>
+        </p:txBody>
+      </p:sp>
+      <p:sp>
+        <p:nvSpPr>
+          <p:cNvPr id="23" name="Rectangle 22">
+            <a:extLst>
+              <a:ext uri="{FF2B5EF4-FFF2-40B4-BE49-F238E27FC236}">
+                <a16:creationId xmlns:a16="http://schemas.microsoft.com/office/drawing/2014/main" id="{2A865FE3-5FC9-4049-87CF-30019C46C0F5}"/>
+              </a:ext>
+              <a:ext uri="{C183D7F6-B498-43B3-948B-1728B52AA6E4}">
+                <adec:decorative xmlns:adec="http://schemas.microsoft.com/office/drawing/2017/decorative" val="1"/>
+              </a:ext>
+            </a:extLst>
+          </p:cNvPr>
+          <p:cNvSpPr>
+            <a:spLocks noGrp="1" noRot="1" noChangeAspect="1" noMove="1" noResize="1" noEditPoints="1" noAdjustHandles="1" noChangeArrowheads="1" noChangeShapeType="1" noTextEdit="1"/>
+          </p:cNvSpPr>
+          <p:nvPr>
+            <p:extLst>
+              <p:ext uri="{386F3935-93C4-4BCD-93E2-E3B085C9AB24}">
+                <p16:designElem xmlns:p16="http://schemas.microsoft.com/office/powerpoint/2015/main" val="1"/>
+              </p:ext>
+            </p:extLst>
+          </p:nvPr>
+        </p:nvSpPr>
+        <p:spPr>
+          <a:xfrm>
+            <a:off x="877459" y="2093976"/>
+            <a:ext cx="3328416" cy="9144"/>
+          </a:xfrm>
+          <a:prstGeom prst="rect">
+            <a:avLst/>
+          </a:prstGeom>
+          <a:solidFill>
+            <a:srgbClr val="D5D5D5"/>
+          </a:solidFill>
+          <a:ln w="3175">
+            <a:noFill/>
+          </a:ln>
+          <a:effectLst/>
+        </p:spPr>
+        <p:style>
+          <a:lnRef idx="2">
+            <a:schemeClr val="accent1">
+              <a:shade val="50000"/>
+            </a:schemeClr>
+          </a:lnRef>
+          <a:fillRef idx="1">
+            <a:schemeClr val="accent1"/>
+          </a:fillRef>
+          <a:effectRef idx="0">
+            <a:schemeClr val="accent1"/>
+          </a:effectRef>
+          <a:fontRef idx="minor">
+            <a:schemeClr val="lt1"/>
+          </a:fontRef>
+        </p:style>
+        <p:txBody>
+          <a:bodyPr rtlCol="0" anchor="ctr"/>
+          <a:lstStyle/>
+          <a:p>
+            <a:pPr algn="ctr"/>
+            <a:endParaRPr lang="en-US">
+              <a:solidFill>
+                <a:prstClr val="white"/>
+              </a:solidFill>
+              <a:latin typeface="Calibri" panose="020F0502020204030204"/>
+            </a:endParaRPr>
+          </a:p>
+        </p:txBody>
+      </p:sp>
+      <p:sp>
+        <p:nvSpPr>
+          <p:cNvPr id="3" name="Segnaposto contenuto 2">
+            <a:extLst>
+              <a:ext uri="{FF2B5EF4-FFF2-40B4-BE49-F238E27FC236}">
+                <a16:creationId xmlns:a16="http://schemas.microsoft.com/office/drawing/2014/main" id="{41EFF75C-A4DD-5749-8B7F-DEA1D7E80D3E}"/>
+              </a:ext>
+            </a:extLst>
+          </p:cNvPr>
+          <p:cNvSpPr>
+            <a:spLocks noGrp="1"/>
+          </p:cNvSpPr>
+          <p:nvPr>
+            <p:ph idx="1"/>
+          </p:nvPr>
+        </p:nvSpPr>
+        <p:spPr>
+          <a:xfrm>
+            <a:off x="841248" y="2252870"/>
+            <a:ext cx="3412219" cy="3560251"/>
+          </a:xfrm>
+        </p:spPr>
+        <p:txBody>
+          <a:bodyPr>
+            <a:normAutofit/>
+          </a:bodyPr>
+          <a:lstStyle/>
+          <a:p>
+            <a:r>
+              <a:rPr lang="it-IT" sz="1700"/>
+              <a:t>CO2 and CO in the atmosphere, produced by vehicles and industrial processes </a:t>
+            </a:r>
+          </a:p>
+          <a:p>
+            <a:r>
+              <a:rPr lang="it-IT" sz="1700"/>
+              <a:t>measured in metric tons</a:t>
+            </a:r>
+          </a:p>
           <a:p>
             <a:pPr marL="0" indent="0">
               <a:buNone/>
             </a:pPr>
-            <a:r>
-              <a:rPr lang="it-IT" sz="2200" dirty="0"/>
-              <a:t>Carbon </a:t>
-            </a:r>
-            <a:r>
-              <a:rPr lang="it-IT" sz="2200" dirty="0" err="1"/>
-              <a:t>emissions</a:t>
-            </a:r>
-            <a:r>
-              <a:rPr lang="it-IT" sz="2200" dirty="0"/>
-              <a:t>?</a:t>
-            </a:r>
-          </a:p>
-          <a:p>
-            <a:pPr marL="0" indent="0">
-              <a:buNone/>
-            </a:pPr>
-            <a:r>
-              <a:rPr lang="it-IT" sz="2200" dirty="0"/>
-              <a:t>- </a:t>
-            </a:r>
-            <a:r>
-              <a:rPr lang="it-IT" sz="2200" dirty="0" err="1"/>
-              <a:t>measured</a:t>
-            </a:r>
-            <a:r>
-              <a:rPr lang="it-IT" sz="2200" dirty="0"/>
-              <a:t> in </a:t>
-            </a:r>
-            <a:r>
-              <a:rPr lang="it-IT" sz="2200" dirty="0" err="1"/>
-              <a:t>metric</a:t>
-            </a:r>
-            <a:r>
-              <a:rPr lang="it-IT" sz="2200" dirty="0"/>
-              <a:t> tons</a:t>
-            </a:r>
-          </a:p>
-          <a:p>
-            <a:pPr marL="0" indent="0">
-              <a:buNone/>
-            </a:pPr>
-            <a:endParaRPr lang="it-IT" sz="2200" dirty="0"/>
+            <a:endParaRPr lang="it-IT" sz="1700"/>
           </a:p>
         </p:txBody>
       </p:sp>
@@ -7420,8 +8238,8 @@
         </p:blipFill>
         <p:spPr>
           <a:xfrm>
-            <a:off x="1171454" y="2290936"/>
-            <a:ext cx="9836899" cy="3959352"/>
+            <a:off x="5120640" y="2039021"/>
+            <a:ext cx="6656832" cy="2679374"/>
           </a:xfrm>
           <a:prstGeom prst="rect">
             <a:avLst/>
@@ -7438,6 +8256,214 @@
   <p:clrMapOvr>
     <a:masterClrMapping/>
   </p:clrMapOvr>
+  <p:timing>
+    <p:tnLst>
+      <p:par>
+        <p:cTn id="1" dur="indefinite" restart="never" nodeType="tmRoot">
+          <p:childTnLst>
+            <p:seq concurrent="1" nextAc="seek">
+              <p:cTn id="2" dur="indefinite" nodeType="mainSeq">
+                <p:childTnLst>
+                  <p:par>
+                    <p:cTn id="3" fill="hold">
+                      <p:stCondLst>
+                        <p:cond delay="indefinite"/>
+                      </p:stCondLst>
+                      <p:childTnLst>
+                        <p:par>
+                          <p:cTn id="4" fill="hold">
+                            <p:stCondLst>
+                              <p:cond delay="0"/>
+                            </p:stCondLst>
+                            <p:childTnLst>
+                              <p:par>
+                                <p:cTn id="5" presetID="10" presetClass="entr" presetSubtype="0" fill="hold" nodeType="clickEffect">
+                                  <p:stCondLst>
+                                    <p:cond delay="0"/>
+                                  </p:stCondLst>
+                                  <p:childTnLst>
+                                    <p:set>
+                                      <p:cBhvr>
+                                        <p:cTn id="6" dur="1" fill="hold">
+                                          <p:stCondLst>
+                                            <p:cond delay="0"/>
+                                          </p:stCondLst>
+                                        </p:cTn>
+                                        <p:tgtEl>
+                                          <p:spTgt spid="5"/>
+                                        </p:tgtEl>
+                                        <p:attrNameLst>
+                                          <p:attrName>style.visibility</p:attrName>
+                                        </p:attrNameLst>
+                                      </p:cBhvr>
+                                      <p:to>
+                                        <p:strVal val="visible"/>
+                                      </p:to>
+                                    </p:set>
+                                    <p:animEffect transition="in" filter="fade">
+                                      <p:cBhvr>
+                                        <p:cTn id="7" dur="500"/>
+                                        <p:tgtEl>
+                                          <p:spTgt spid="5"/>
+                                        </p:tgtEl>
+                                      </p:cBhvr>
+                                    </p:animEffect>
+                                  </p:childTnLst>
+                                </p:cTn>
+                              </p:par>
+                            </p:childTnLst>
+                          </p:cTn>
+                        </p:par>
+                      </p:childTnLst>
+                    </p:cTn>
+                  </p:par>
+                  <p:par>
+                    <p:cTn id="8" fill="hold">
+                      <p:stCondLst>
+                        <p:cond delay="indefinite"/>
+                      </p:stCondLst>
+                      <p:childTnLst>
+                        <p:par>
+                          <p:cTn id="9" fill="hold">
+                            <p:stCondLst>
+                              <p:cond delay="0"/>
+                            </p:stCondLst>
+                            <p:childTnLst>
+                              <p:par>
+                                <p:cTn id="10" presetID="10" presetClass="entr" presetSubtype="0" fill="hold" grpId="0" nodeType="clickEffect">
+                                  <p:stCondLst>
+                                    <p:cond delay="0"/>
+                                  </p:stCondLst>
+                                  <p:childTnLst>
+                                    <p:set>
+                                      <p:cBhvr>
+                                        <p:cTn id="11" dur="1" fill="hold">
+                                          <p:stCondLst>
+                                            <p:cond delay="0"/>
+                                          </p:stCondLst>
+                                        </p:cTn>
+                                        <p:tgtEl>
+                                          <p:spTgt spid="3">
+                                            <p:txEl>
+                                              <p:pRg st="0" end="0"/>
+                                            </p:txEl>
+                                          </p:spTgt>
+                                        </p:tgtEl>
+                                        <p:attrNameLst>
+                                          <p:attrName>style.visibility</p:attrName>
+                                        </p:attrNameLst>
+                                      </p:cBhvr>
+                                      <p:to>
+                                        <p:strVal val="visible"/>
+                                      </p:to>
+                                    </p:set>
+                                    <p:animEffect transition="in" filter="fade">
+                                      <p:cBhvr>
+                                        <p:cTn id="12" dur="500"/>
+                                        <p:tgtEl>
+                                          <p:spTgt spid="3">
+                                            <p:txEl>
+                                              <p:pRg st="0" end="0"/>
+                                            </p:txEl>
+                                          </p:spTgt>
+                                        </p:tgtEl>
+                                      </p:cBhvr>
+                                    </p:animEffect>
+                                  </p:childTnLst>
+                                </p:cTn>
+                              </p:par>
+                            </p:childTnLst>
+                          </p:cTn>
+                        </p:par>
+                      </p:childTnLst>
+                    </p:cTn>
+                  </p:par>
+                  <p:par>
+                    <p:cTn id="13" fill="hold">
+                      <p:stCondLst>
+                        <p:cond delay="indefinite"/>
+                      </p:stCondLst>
+                      <p:childTnLst>
+                        <p:par>
+                          <p:cTn id="14" fill="hold">
+                            <p:stCondLst>
+                              <p:cond delay="0"/>
+                            </p:stCondLst>
+                            <p:childTnLst>
+                              <p:par>
+                                <p:cTn id="15" presetID="10" presetClass="entr" presetSubtype="0" fill="hold" grpId="0" nodeType="clickEffect">
+                                  <p:stCondLst>
+                                    <p:cond delay="0"/>
+                                  </p:stCondLst>
+                                  <p:childTnLst>
+                                    <p:set>
+                                      <p:cBhvr>
+                                        <p:cTn id="16" dur="1" fill="hold">
+                                          <p:stCondLst>
+                                            <p:cond delay="0"/>
+                                          </p:stCondLst>
+                                        </p:cTn>
+                                        <p:tgtEl>
+                                          <p:spTgt spid="3">
+                                            <p:txEl>
+                                              <p:pRg st="1" end="1"/>
+                                            </p:txEl>
+                                          </p:spTgt>
+                                        </p:tgtEl>
+                                        <p:attrNameLst>
+                                          <p:attrName>style.visibility</p:attrName>
+                                        </p:attrNameLst>
+                                      </p:cBhvr>
+                                      <p:to>
+                                        <p:strVal val="visible"/>
+                                      </p:to>
+                                    </p:set>
+                                    <p:animEffect transition="in" filter="fade">
+                                      <p:cBhvr>
+                                        <p:cTn id="17" dur="500"/>
+                                        <p:tgtEl>
+                                          <p:spTgt spid="3">
+                                            <p:txEl>
+                                              <p:pRg st="1" end="1"/>
+                                            </p:txEl>
+                                          </p:spTgt>
+                                        </p:tgtEl>
+                                      </p:cBhvr>
+                                    </p:animEffect>
+                                  </p:childTnLst>
+                                </p:cTn>
+                              </p:par>
+                            </p:childTnLst>
+                          </p:cTn>
+                        </p:par>
+                      </p:childTnLst>
+                    </p:cTn>
+                  </p:par>
+                </p:childTnLst>
+              </p:cTn>
+              <p:prevCondLst>
+                <p:cond evt="onPrev" delay="0">
+                  <p:tgtEl>
+                    <p:sldTgt/>
+                  </p:tgtEl>
+                </p:cond>
+              </p:prevCondLst>
+              <p:nextCondLst>
+                <p:cond evt="onNext" delay="0">
+                  <p:tgtEl>
+                    <p:sldTgt/>
+                  </p:tgtEl>
+                </p:cond>
+              </p:nextCondLst>
+            </p:seq>
+          </p:childTnLst>
+        </p:cTn>
+      </p:par>
+    </p:tnLst>
+    <p:bldLst>
+      <p:bldP spid="3" grpId="0" uiExpand="1" build="p"/>
+    </p:bldLst>
+  </p:timing>
 </p:sld>
 </file>
 
@@ -7468,10 +8494,10 @@
       </p:grpSpPr>
       <p:sp useBgFill="1">
         <p:nvSpPr>
-          <p:cNvPr id="26" name="Rectangle 25">
-            <a:extLst>
-              <a:ext uri="{FF2B5EF4-FFF2-40B4-BE49-F238E27FC236}">
-                <a16:creationId xmlns:a16="http://schemas.microsoft.com/office/drawing/2014/main" id="{665DBBEF-238B-476B-96AB-8AAC3224ECEA}"/>
+          <p:cNvPr id="33" name="Rectangle 32">
+            <a:extLst>
+              <a:ext uri="{FF2B5EF4-FFF2-40B4-BE49-F238E27FC236}">
+                <a16:creationId xmlns:a16="http://schemas.microsoft.com/office/drawing/2014/main" id="{68AF5748-FED8-45BA-8631-26D1D10F3246}"/>
               </a:ext>
               <a:ext uri="{C183D7F6-B498-43B3-948B-1728B52AA6E4}">
                 <adec:decorative xmlns:adec="http://schemas.microsoft.com/office/drawing/2017/decorative" val="1"/>
@@ -7540,8 +8566,8 @@
         </p:nvSpPr>
         <p:spPr>
           <a:xfrm>
-            <a:off x="638882" y="639193"/>
-            <a:ext cx="3571810" cy="3573516"/>
+            <a:off x="477981" y="1122363"/>
+            <a:ext cx="4023360" cy="3204134"/>
           </a:xfrm>
           <a:prstGeom prst="rect">
             <a:avLst/>
@@ -7565,7 +8591,7 @@
               </a:spcAft>
             </a:pPr>
             <a:r>
-              <a:rPr lang="en-US" sz="4400" kern="1200" dirty="0">
+              <a:rPr lang="en-US" sz="3600" kern="1200" dirty="0">
                 <a:solidFill>
                   <a:schemeClr val="tx1"/>
                 </a:solidFill>
@@ -7580,10 +8606,10 @@
       </p:sp>
       <p:sp>
         <p:nvSpPr>
-          <p:cNvPr id="28" name="sketch line">
-            <a:extLst>
-              <a:ext uri="{FF2B5EF4-FFF2-40B4-BE49-F238E27FC236}">
-                <a16:creationId xmlns:a16="http://schemas.microsoft.com/office/drawing/2014/main" id="{3FCFB1DE-0B7E-48CC-BA90-B2AB0889F9D6}"/>
+          <p:cNvPr id="35" name="Rectangle 34">
+            <a:extLst>
+              <a:ext uri="{FF2B5EF4-FFF2-40B4-BE49-F238E27FC236}">
+                <a16:creationId xmlns:a16="http://schemas.microsoft.com/office/drawing/2014/main" id="{AF2F604E-43BE-4DC3-B983-E071523364F8}"/>
               </a:ext>
               <a:ext uri="{C183D7F6-B498-43B3-948B-1728B52AA6E4}">
                 <adec:decorative xmlns:adec="http://schemas.microsoft.com/office/drawing/2017/decorative" val="1"/>
@@ -7602,228 +8628,18 @@
           </p:nvPr>
         </p:nvSpPr>
         <p:spPr>
-          <a:xfrm>
-            <a:off x="643278" y="4409267"/>
-            <a:ext cx="3255095" cy="18288"/>
-          </a:xfrm>
-          <a:custGeom>
+          <a:xfrm rot="5400000">
+            <a:off x="759921" y="346791"/>
+            <a:ext cx="146304" cy="704088"/>
+          </a:xfrm>
+          <a:prstGeom prst="rect">
             <a:avLst/>
-            <a:gdLst>
-              <a:gd name="connsiteX0" fmla="*/ 0 w 3255095"/>
-              <a:gd name="connsiteY0" fmla="*/ 0 h 18288"/>
-              <a:gd name="connsiteX1" fmla="*/ 618468 w 3255095"/>
-              <a:gd name="connsiteY1" fmla="*/ 0 h 18288"/>
-              <a:gd name="connsiteX2" fmla="*/ 1269487 w 3255095"/>
-              <a:gd name="connsiteY2" fmla="*/ 0 h 18288"/>
-              <a:gd name="connsiteX3" fmla="*/ 1953057 w 3255095"/>
-              <a:gd name="connsiteY3" fmla="*/ 0 h 18288"/>
-              <a:gd name="connsiteX4" fmla="*/ 2636627 w 3255095"/>
-              <a:gd name="connsiteY4" fmla="*/ 0 h 18288"/>
-              <a:gd name="connsiteX5" fmla="*/ 3255095 w 3255095"/>
-              <a:gd name="connsiteY5" fmla="*/ 0 h 18288"/>
-              <a:gd name="connsiteX6" fmla="*/ 3255095 w 3255095"/>
-              <a:gd name="connsiteY6" fmla="*/ 18288 h 18288"/>
-              <a:gd name="connsiteX7" fmla="*/ 2538974 w 3255095"/>
-              <a:gd name="connsiteY7" fmla="*/ 18288 h 18288"/>
-              <a:gd name="connsiteX8" fmla="*/ 1822853 w 3255095"/>
-              <a:gd name="connsiteY8" fmla="*/ 18288 h 18288"/>
-              <a:gd name="connsiteX9" fmla="*/ 1171834 w 3255095"/>
-              <a:gd name="connsiteY9" fmla="*/ 18288 h 18288"/>
-              <a:gd name="connsiteX10" fmla="*/ 0 w 3255095"/>
-              <a:gd name="connsiteY10" fmla="*/ 18288 h 18288"/>
-              <a:gd name="connsiteX11" fmla="*/ 0 w 3255095"/>
-              <a:gd name="connsiteY11" fmla="*/ 0 h 18288"/>
-            </a:gdLst>
-            <a:ahLst/>
-            <a:cxnLst>
-              <a:cxn ang="0">
-                <a:pos x="connsiteX0" y="connsiteY0"/>
-              </a:cxn>
-              <a:cxn ang="0">
-                <a:pos x="connsiteX1" y="connsiteY1"/>
-              </a:cxn>
-              <a:cxn ang="0">
-                <a:pos x="connsiteX2" y="connsiteY2"/>
-              </a:cxn>
-              <a:cxn ang="0">
-                <a:pos x="connsiteX3" y="connsiteY3"/>
-              </a:cxn>
-              <a:cxn ang="0">
-                <a:pos x="connsiteX4" y="connsiteY4"/>
-              </a:cxn>
-              <a:cxn ang="0">
-                <a:pos x="connsiteX5" y="connsiteY5"/>
-              </a:cxn>
-              <a:cxn ang="0">
-                <a:pos x="connsiteX6" y="connsiteY6"/>
-              </a:cxn>
-              <a:cxn ang="0">
-                <a:pos x="connsiteX7" y="connsiteY7"/>
-              </a:cxn>
-              <a:cxn ang="0">
-                <a:pos x="connsiteX8" y="connsiteY8"/>
-              </a:cxn>
-              <a:cxn ang="0">
-                <a:pos x="connsiteX9" y="connsiteY9"/>
-              </a:cxn>
-              <a:cxn ang="0">
-                <a:pos x="connsiteX10" y="connsiteY10"/>
-              </a:cxn>
-              <a:cxn ang="0">
-                <a:pos x="connsiteX11" y="connsiteY11"/>
-              </a:cxn>
-            </a:cxnLst>
-            <a:rect l="l" t="t" r="r" b="b"/>
-            <a:pathLst>
-              <a:path w="3255095" h="18288" fill="none" extrusionOk="0">
-                <a:moveTo>
-                  <a:pt x="0" y="0"/>
-                </a:moveTo>
-                <a:cubicBezTo>
-                  <a:pt x="240201" y="-22123"/>
-                  <a:pt x="462021" y="-19623"/>
-                  <a:pt x="618468" y="0"/>
-                </a:cubicBezTo>
-                <a:cubicBezTo>
-                  <a:pt x="774915" y="19623"/>
-                  <a:pt x="974734" y="2035"/>
-                  <a:pt x="1269487" y="0"/>
-                </a:cubicBezTo>
-                <a:cubicBezTo>
-                  <a:pt x="1564240" y="-2035"/>
-                  <a:pt x="1733579" y="10639"/>
-                  <a:pt x="1953057" y="0"/>
-                </a:cubicBezTo>
-                <a:cubicBezTo>
-                  <a:pt x="2172535" y="-10639"/>
-                  <a:pt x="2453962" y="14018"/>
-                  <a:pt x="2636627" y="0"/>
-                </a:cubicBezTo>
-                <a:cubicBezTo>
-                  <a:pt x="2819292" y="-14018"/>
-                  <a:pt x="3121375" y="5399"/>
-                  <a:pt x="3255095" y="0"/>
-                </a:cubicBezTo>
-                <a:cubicBezTo>
-                  <a:pt x="3254386" y="8157"/>
-                  <a:pt x="3254682" y="12125"/>
-                  <a:pt x="3255095" y="18288"/>
-                </a:cubicBezTo>
-                <a:cubicBezTo>
-                  <a:pt x="3088545" y="23203"/>
-                  <a:pt x="2687475" y="7419"/>
-                  <a:pt x="2538974" y="18288"/>
-                </a:cubicBezTo>
-                <a:cubicBezTo>
-                  <a:pt x="2390473" y="29157"/>
-                  <a:pt x="2137381" y="-8959"/>
-                  <a:pt x="1822853" y="18288"/>
-                </a:cubicBezTo>
-                <a:cubicBezTo>
-                  <a:pt x="1508325" y="45535"/>
-                  <a:pt x="1466437" y="20385"/>
-                  <a:pt x="1171834" y="18288"/>
-                </a:cubicBezTo>
-                <a:cubicBezTo>
-                  <a:pt x="877231" y="16191"/>
-                  <a:pt x="561097" y="37643"/>
-                  <a:pt x="0" y="18288"/>
-                </a:cubicBezTo>
-                <a:cubicBezTo>
-                  <a:pt x="-46" y="12483"/>
-                  <a:pt x="-203" y="6491"/>
-                  <a:pt x="0" y="0"/>
-                </a:cubicBezTo>
-                <a:close/>
-              </a:path>
-              <a:path w="3255095" h="18288" stroke="0" extrusionOk="0">
-                <a:moveTo>
-                  <a:pt x="0" y="0"/>
-                </a:moveTo>
-                <a:cubicBezTo>
-                  <a:pt x="291965" y="19429"/>
-                  <a:pt x="363155" y="8568"/>
-                  <a:pt x="618468" y="0"/>
-                </a:cubicBezTo>
-                <a:cubicBezTo>
-                  <a:pt x="873781" y="-8568"/>
-                  <a:pt x="904459" y="-19505"/>
-                  <a:pt x="1171834" y="0"/>
-                </a:cubicBezTo>
-                <a:cubicBezTo>
-                  <a:pt x="1439209" y="19505"/>
-                  <a:pt x="1744369" y="9790"/>
-                  <a:pt x="1887955" y="0"/>
-                </a:cubicBezTo>
-                <a:cubicBezTo>
-                  <a:pt x="2031541" y="-9790"/>
-                  <a:pt x="2346378" y="21240"/>
-                  <a:pt x="2506423" y="0"/>
-                </a:cubicBezTo>
-                <a:cubicBezTo>
-                  <a:pt x="2666468" y="-21240"/>
-                  <a:pt x="2990257" y="30414"/>
-                  <a:pt x="3255095" y="0"/>
-                </a:cubicBezTo>
-                <a:cubicBezTo>
-                  <a:pt x="3254831" y="4493"/>
-                  <a:pt x="3255479" y="9472"/>
-                  <a:pt x="3255095" y="18288"/>
-                </a:cubicBezTo>
-                <a:cubicBezTo>
-                  <a:pt x="3120743" y="16690"/>
-                  <a:pt x="2759628" y="42462"/>
-                  <a:pt x="2604076" y="18288"/>
-                </a:cubicBezTo>
-                <a:cubicBezTo>
-                  <a:pt x="2448524" y="-5886"/>
-                  <a:pt x="2184336" y="19599"/>
-                  <a:pt x="1887955" y="18288"/>
-                </a:cubicBezTo>
-                <a:cubicBezTo>
-                  <a:pt x="1591574" y="16977"/>
-                  <a:pt x="1548845" y="6870"/>
-                  <a:pt x="1334589" y="18288"/>
-                </a:cubicBezTo>
-                <a:cubicBezTo>
-                  <a:pt x="1120333" y="29706"/>
-                  <a:pt x="996014" y="9662"/>
-                  <a:pt x="683570" y="18288"/>
-                </a:cubicBezTo>
-                <a:cubicBezTo>
-                  <a:pt x="371126" y="26914"/>
-                  <a:pt x="198687" y="16167"/>
-                  <a:pt x="0" y="18288"/>
-                </a:cubicBezTo>
-                <a:cubicBezTo>
-                  <a:pt x="843" y="9577"/>
-                  <a:pt x="371" y="6900"/>
-                  <a:pt x="0" y="0"/>
-                </a:cubicBezTo>
-                <a:close/>
-              </a:path>
-            </a:pathLst>
-          </a:custGeom>
+          </a:prstGeom>
           <a:solidFill>
             <a:schemeClr val="accent2"/>
           </a:solidFill>
-          <a:ln w="38100" cap="rnd">
-            <a:solidFill>
-              <a:schemeClr val="accent2"/>
-            </a:solidFill>
-            <a:round/>
-            <a:extLst>
-              <a:ext uri="{C807C97D-BFC1-408E-A445-0C87EB9F89A2}">
-                <ask:lineSketchStyleProps xmlns:ask="http://schemas.microsoft.com/office/drawing/2018/sketchyshapes" sd="1219033472">
-                  <a:prstGeom prst="rect">
-                    <a:avLst/>
-                  </a:prstGeom>
-                  <ask:type>
-                    <ask:lineSketchFreehand/>
-                  </ask:type>
-                </ask:lineSketchStyleProps>
-              </a:ext>
-            </a:extLst>
+          <a:ln>
+            <a:noFill/>
           </a:ln>
         </p:spPr>
         <p:style>
@@ -7846,17 +8662,115 @@
           <a:bodyPr rtlCol="0" anchor="ctr"/>
           <a:lstStyle/>
           <a:p>
+            <a:pPr marL="0" marR="0" lvl="0" indent="0" algn="ctr" defTabSz="914400" rtl="0" eaLnBrk="1" fontAlgn="auto" latinLnBrk="0" hangingPunct="1">
+              <a:lnSpc>
+                <a:spcPct val="100000"/>
+              </a:lnSpc>
+              <a:spcBef>
+                <a:spcPts val="0"/>
+              </a:spcBef>
+              <a:spcAft>
+                <a:spcPts val="0"/>
+              </a:spcAft>
+              <a:buClrTx/>
+              <a:buSzTx/>
+              <a:buFontTx/>
+              <a:buNone/>
+              <a:tabLst/>
+              <a:defRPr/>
+            </a:pPr>
+            <a:endParaRPr kumimoji="0" lang="en-US" sz="1800" b="0" i="0" u="none" strike="noStrike" kern="1200" cap="none" spc="0" normalizeH="0" baseline="0" noProof="0">
+              <a:ln>
+                <a:noFill/>
+              </a:ln>
+              <a:solidFill>
+                <a:prstClr val="white"/>
+              </a:solidFill>
+              <a:effectLst/>
+              <a:uLnTx/>
+              <a:uFillTx/>
+              <a:latin typeface="Calibri" panose="020F0502020204030204"/>
+              <a:ea typeface="+mn-ea"/>
+              <a:cs typeface="+mn-cs"/>
+            </a:endParaRPr>
+          </a:p>
+        </p:txBody>
+      </p:sp>
+      <p:sp>
+        <p:nvSpPr>
+          <p:cNvPr id="37" name="Rectangle 36">
+            <a:extLst>
+              <a:ext uri="{FF2B5EF4-FFF2-40B4-BE49-F238E27FC236}">
+                <a16:creationId xmlns:a16="http://schemas.microsoft.com/office/drawing/2014/main" id="{08C9B587-E65E-4B52-B37C-ABEBB6E87928}"/>
+              </a:ext>
+              <a:ext uri="{C183D7F6-B498-43B3-948B-1728B52AA6E4}">
+                <adec:decorative xmlns:adec="http://schemas.microsoft.com/office/drawing/2017/decorative" val="1"/>
+              </a:ext>
+            </a:extLst>
+          </p:cNvPr>
+          <p:cNvSpPr>
+            <a:spLocks noGrp="1" noRot="1" noChangeAspect="1" noMove="1" noResize="1" noEditPoints="1" noAdjustHandles="1" noChangeArrowheads="1" noChangeShapeType="1" noTextEdit="1"/>
+          </p:cNvSpPr>
+          <p:nvPr>
+            <p:extLst>
+              <p:ext uri="{386F3935-93C4-4BCD-93E2-E3B085C9AB24}">
+                <p16:designElem xmlns:p16="http://schemas.microsoft.com/office/powerpoint/2015/main" val="1"/>
+              </p:ext>
+            </p:extLst>
+          </p:nvPr>
+        </p:nvSpPr>
+        <p:spPr>
+          <a:xfrm>
+            <a:off x="481029" y="4546920"/>
+            <a:ext cx="4023360" cy="18288"/>
+          </a:xfrm>
+          <a:prstGeom prst="rect">
+            <a:avLst/>
+          </a:prstGeom>
+          <a:solidFill>
+            <a:srgbClr val="D5D5D5"/>
+          </a:solidFill>
+          <a:ln w="3175">
+            <a:noFill/>
+          </a:ln>
+          <a:effectLst/>
+        </p:spPr>
+        <p:style>
+          <a:lnRef idx="2">
+            <a:schemeClr val="accent1">
+              <a:shade val="50000"/>
+            </a:schemeClr>
+          </a:lnRef>
+          <a:fillRef idx="1">
+            <a:schemeClr val="accent1"/>
+          </a:fillRef>
+          <a:effectRef idx="0">
+            <a:schemeClr val="accent1"/>
+          </a:effectRef>
+          <a:fontRef idx="minor">
+            <a:schemeClr val="lt1"/>
+          </a:fontRef>
+        </p:style>
+        <p:txBody>
+          <a:bodyPr rtlCol="0" anchor="ctr"/>
+          <a:lstStyle/>
+          <a:p>
             <a:pPr algn="ctr"/>
-            <a:endParaRPr lang="en-US"/>
+            <a:endParaRPr lang="en-US">
+              <a:solidFill>
+                <a:prstClr val="white"/>
+              </a:solidFill>
+              <a:latin typeface="Calibri" panose="020F0502020204030204"/>
+            </a:endParaRPr>
           </a:p>
         </p:txBody>
       </p:sp>
       <p:pic>
         <p:nvPicPr>
-          <p:cNvPr id="2" name="slide2" descr="Sheet 8">
-            <a:extLst>
-              <a:ext uri="{FF2B5EF4-FFF2-40B4-BE49-F238E27FC236}">
-                <a16:creationId xmlns:a16="http://schemas.microsoft.com/office/drawing/2014/main" id="{3787ECEC-A862-4021-8FE8-71680E81BFC0}"/>
+          <p:cNvPr id="5" name="slide2" descr="Major contibutors">
+            <a:extLst>
+              <a:ext uri="{FF2B5EF4-FFF2-40B4-BE49-F238E27FC236}">
+                <a16:creationId xmlns:a16="http://schemas.microsoft.com/office/drawing/2014/main" id="{D375DF4C-1C8A-4077-4AF9-E94B04549A37}"/>
               </a:ext>
             </a:extLst>
           </p:cNvPr>
@@ -7873,13 +8787,13 @@
               </a:ext>
             </a:extLst>
           </a:blip>
-          <a:srcRect t="4499" b="2805"/>
+          <a:srcRect t="5781" b="5691"/>
           <a:stretch/>
         </p:blipFill>
         <p:spPr>
           <a:xfrm>
-            <a:off x="4654296" y="1057884"/>
-            <a:ext cx="7214616" cy="4714799"/>
+            <a:off x="4864608" y="1166070"/>
+            <a:ext cx="6846363" cy="4379053"/>
           </a:xfrm>
           <a:prstGeom prst="rect">
             <a:avLst/>
@@ -7918,10 +8832,10 @@
       </p:grpSpPr>
       <p:pic>
         <p:nvPicPr>
-          <p:cNvPr id="3" name="slide3" descr="Map">
-            <a:extLst>
-              <a:ext uri="{FF2B5EF4-FFF2-40B4-BE49-F238E27FC236}">
-                <a16:creationId xmlns:a16="http://schemas.microsoft.com/office/drawing/2014/main" id="{5CA007DD-D066-40AA-8B79-B6CAA4107669}"/>
+          <p:cNvPr id="4" name="slide3" descr="Map">
+            <a:extLst>
+              <a:ext uri="{FF2B5EF4-FFF2-40B4-BE49-F238E27FC236}">
+                <a16:creationId xmlns:a16="http://schemas.microsoft.com/office/drawing/2014/main" id="{8F743E4D-ED75-02DF-F2D1-11CB0193B648}"/>
               </a:ext>
             </a:extLst>
           </p:cNvPr>
@@ -7938,13 +8852,13 @@
               </a:ext>
             </a:extLst>
           </a:blip>
-          <a:srcRect t="4923" b="5296"/>
+          <a:srcRect t="4734" b="5531"/>
           <a:stretch/>
         </p:blipFill>
         <p:spPr>
           <a:xfrm>
-            <a:off x="1676400" y="918975"/>
-            <a:ext cx="8774112" cy="5249128"/>
+            <a:off x="1157287" y="777615"/>
+            <a:ext cx="9877425" cy="5906125"/>
           </a:xfrm>
           <a:prstGeom prst="rect">
             <a:avLst/>
@@ -7965,8 +8879,8 @@
         </p:nvSpPr>
         <p:spPr>
           <a:xfrm>
-            <a:off x="787400" y="114300"/>
-            <a:ext cx="4330700" cy="830997"/>
+            <a:off x="187792" y="174260"/>
+            <a:ext cx="5673361" cy="461665"/>
           </a:xfrm>
           <a:prstGeom prst="rect">
             <a:avLst/>
@@ -8600,7 +9514,7 @@
         </p:nvGrpSpPr>
         <p:grpSpPr>
           <a:xfrm>
-            <a:off x="1431291" y="643467"/>
+            <a:off x="1393406" y="643467"/>
             <a:ext cx="9329418" cy="5571065"/>
             <a:chOff x="1429563" y="1231901"/>
             <a:chExt cx="8570874" cy="5118100"/>
@@ -9215,44 +10129,6 @@
           </a:p>
         </p:txBody>
       </p:sp>
-      <p:pic>
-        <p:nvPicPr>
-          <p:cNvPr id="5" name="slide5" descr="Total emission/China">
-            <a:extLst>
-              <a:ext uri="{FF2B5EF4-FFF2-40B4-BE49-F238E27FC236}">
-                <a16:creationId xmlns:a16="http://schemas.microsoft.com/office/drawing/2014/main" id="{71EE01FA-8BB4-45A0-A78C-85315452556A}"/>
-              </a:ext>
-            </a:extLst>
-          </p:cNvPr>
-          <p:cNvPicPr>
-            <a:picLocks noChangeAspect="1"/>
-          </p:cNvPicPr>
-          <p:nvPr/>
-        </p:nvPicPr>
-        <p:blipFill rotWithShape="1">
-          <a:blip r:embed="rId2">
-            <a:extLst>
-              <a:ext uri="{28A0092B-C50C-407E-A947-70E740481C1C}">
-                <a14:useLocalDpi xmlns:a14="http://schemas.microsoft.com/office/drawing/2010/main" val="0"/>
-              </a:ext>
-            </a:extLst>
-          </a:blip>
-          <a:srcRect t="5292" b="3709"/>
-          <a:stretch/>
-        </p:blipFill>
-        <p:spPr>
-          <a:xfrm>
-            <a:off x="1386680" y="643467"/>
-            <a:ext cx="9418639" cy="5571065"/>
-          </a:xfrm>
-          <a:prstGeom prst="rect">
-            <a:avLst/>
-          </a:prstGeom>
-          <a:ln>
-            <a:noFill/>
-          </a:ln>
-        </p:spPr>
-      </p:pic>
       <p:sp>
         <p:nvSpPr>
           <p:cNvPr id="27" name="Isosceles Triangle 26">
@@ -9318,55 +10194,111 @@
           </a:p>
         </p:txBody>
       </p:sp>
-      <p:sp>
-        <p:nvSpPr>
-          <p:cNvPr id="2" name="CasellaDiTesto 1">
-            <a:extLst>
-              <a:ext uri="{FF2B5EF4-FFF2-40B4-BE49-F238E27FC236}">
-                <a16:creationId xmlns:a16="http://schemas.microsoft.com/office/drawing/2014/main" id="{1BC10E1E-6F31-22B4-CA3A-A7A201F90200}"/>
-              </a:ext>
-            </a:extLst>
-          </p:cNvPr>
-          <p:cNvSpPr txBox="1"/>
+      <p:grpSp>
+        <p:nvGrpSpPr>
+          <p:cNvPr id="4" name="Gruppo 3">
+            <a:extLst>
+              <a:ext uri="{FF2B5EF4-FFF2-40B4-BE49-F238E27FC236}">
+                <a16:creationId xmlns:a16="http://schemas.microsoft.com/office/drawing/2014/main" id="{FCFD79E6-02E8-98B5-92F7-D64AF3DB9071}"/>
+              </a:ext>
+            </a:extLst>
+          </p:cNvPr>
+          <p:cNvGrpSpPr/>
           <p:nvPr/>
-        </p:nvSpPr>
-        <p:spPr>
+        </p:nvGrpSpPr>
+        <p:grpSpPr>
           <a:xfrm>
-            <a:off x="2425700" y="1675166"/>
-            <a:ext cx="2933700" cy="2547257"/>
-          </a:xfrm>
-          <a:prstGeom prst="rect">
-            <a:avLst/>
-          </a:prstGeom>
-          <a:noFill/>
-        </p:spPr>
-        <p:txBody>
-          <a:bodyPr vert="horz" lIns="91440" tIns="45720" rIns="91440" bIns="45720" rtlCol="0" anchor="ctr">
-            <a:normAutofit/>
-          </a:bodyPr>
-          <a:lstStyle/>
-          <a:p>
-            <a:pPr algn="ctr">
-              <a:lnSpc>
-                <a:spcPct val="90000"/>
-              </a:lnSpc>
-              <a:spcBef>
-                <a:spcPct val="0"/>
-              </a:spcBef>
-              <a:spcAft>
-                <a:spcPts val="600"/>
-              </a:spcAft>
-            </a:pPr>
-            <a:r>
-              <a:rPr lang="en-US" sz="2800" kern="1200" dirty="0">
-                <a:ea typeface="+mj-ea"/>
-                <a:cs typeface="+mj-cs"/>
-              </a:rPr>
-              <a:t>Carbon emissions for China</a:t>
-            </a:r>
-          </a:p>
-        </p:txBody>
-      </p:sp>
+            <a:off x="1162050" y="458808"/>
+            <a:ext cx="9867900" cy="5940384"/>
+            <a:chOff x="1162050" y="458808"/>
+            <a:chExt cx="9867900" cy="5940384"/>
+          </a:xfrm>
+        </p:grpSpPr>
+        <p:pic>
+          <p:nvPicPr>
+            <p:cNvPr id="3" name="slide5" descr="Total emission/China">
+              <a:extLst>
+                <a:ext uri="{FF2B5EF4-FFF2-40B4-BE49-F238E27FC236}">
+                  <a16:creationId xmlns:a16="http://schemas.microsoft.com/office/drawing/2014/main" id="{148F04D5-0D96-4F81-BB3D-F665E269DD05}"/>
+                </a:ext>
+              </a:extLst>
+            </p:cNvPr>
+            <p:cNvPicPr>
+              <a:picLocks noChangeAspect="1"/>
+            </p:cNvPicPr>
+            <p:nvPr/>
+          </p:nvPicPr>
+          <p:blipFill rotWithShape="1">
+            <a:blip r:embed="rId2">
+              <a:extLst>
+                <a:ext uri="{28A0092B-C50C-407E-A947-70E740481C1C}">
+                  <a14:useLocalDpi xmlns:a14="http://schemas.microsoft.com/office/drawing/2010/main" val="0"/>
+                </a:ext>
+              </a:extLst>
+            </a:blip>
+            <a:srcRect t="4574" b="2894"/>
+            <a:stretch/>
+          </p:blipFill>
+          <p:spPr>
+            <a:xfrm>
+              <a:off x="1162050" y="458808"/>
+              <a:ext cx="9867900" cy="5940384"/>
+            </a:xfrm>
+            <a:prstGeom prst="rect">
+              <a:avLst/>
+            </a:prstGeom>
+          </p:spPr>
+        </p:pic>
+        <p:sp>
+          <p:nvSpPr>
+            <p:cNvPr id="2" name="CasellaDiTesto 1">
+              <a:extLst>
+                <a:ext uri="{FF2B5EF4-FFF2-40B4-BE49-F238E27FC236}">
+                  <a16:creationId xmlns:a16="http://schemas.microsoft.com/office/drawing/2014/main" id="{1BC10E1E-6F31-22B4-CA3A-A7A201F90200}"/>
+                </a:ext>
+              </a:extLst>
+            </p:cNvPr>
+            <p:cNvSpPr txBox="1"/>
+            <p:nvPr/>
+          </p:nvSpPr>
+          <p:spPr>
+            <a:xfrm>
+              <a:off x="2425700" y="1675166"/>
+              <a:ext cx="2933700" cy="2547257"/>
+            </a:xfrm>
+            <a:prstGeom prst="rect">
+              <a:avLst/>
+            </a:prstGeom>
+            <a:noFill/>
+          </p:spPr>
+          <p:txBody>
+            <a:bodyPr vert="horz" lIns="91440" tIns="45720" rIns="91440" bIns="45720" rtlCol="0" anchor="ctr">
+              <a:normAutofit/>
+            </a:bodyPr>
+            <a:lstStyle/>
+            <a:p>
+              <a:pPr algn="ctr">
+                <a:lnSpc>
+                  <a:spcPct val="90000"/>
+                </a:lnSpc>
+                <a:spcBef>
+                  <a:spcPct val="0"/>
+                </a:spcBef>
+                <a:spcAft>
+                  <a:spcPts val="600"/>
+                </a:spcAft>
+              </a:pPr>
+              <a:r>
+                <a:rPr lang="en-US" sz="2800" kern="1200" dirty="0">
+                  <a:ea typeface="+mj-ea"/>
+                  <a:cs typeface="+mj-cs"/>
+                </a:rPr>
+                <a:t>Carbon emissions for China</a:t>
+              </a:r>
+            </a:p>
+          </p:txBody>
+        </p:sp>
+      </p:grpSp>
     </p:spTree>
     <p:extLst>
       <p:ext uri="{BB962C8B-B14F-4D97-AF65-F5344CB8AC3E}">
@@ -9889,44 +10821,6 @@
           </a:p>
         </p:txBody>
       </p:sp>
-      <p:pic>
-        <p:nvPicPr>
-          <p:cNvPr id="6" name="slide6" descr="Total emission/Countries">
-            <a:extLst>
-              <a:ext uri="{FF2B5EF4-FFF2-40B4-BE49-F238E27FC236}">
-                <a16:creationId xmlns:a16="http://schemas.microsoft.com/office/drawing/2014/main" id="{6338F4D0-21F9-49C4-BB4F-C36F58C6EAD5}"/>
-              </a:ext>
-            </a:extLst>
-          </p:cNvPr>
-          <p:cNvPicPr>
-            <a:picLocks noChangeAspect="1"/>
-          </p:cNvPicPr>
-          <p:nvPr/>
-        </p:nvPicPr>
-        <p:blipFill rotWithShape="1">
-          <a:blip r:embed="rId2">
-            <a:extLst>
-              <a:ext uri="{28A0092B-C50C-407E-A947-70E740481C1C}">
-                <a14:useLocalDpi xmlns:a14="http://schemas.microsoft.com/office/drawing/2010/main" val="0"/>
-              </a:ext>
-            </a:extLst>
-          </a:blip>
-          <a:srcRect t="5319" b="3496"/>
-          <a:stretch/>
-        </p:blipFill>
-        <p:spPr>
-          <a:xfrm>
-            <a:off x="1810564" y="939800"/>
-            <a:ext cx="8570871" cy="5080000"/>
-          </a:xfrm>
-          <a:prstGeom prst="rect">
-            <a:avLst/>
-          </a:prstGeom>
-          <a:ln>
-            <a:noFill/>
-          </a:ln>
-        </p:spPr>
-      </p:pic>
       <p:sp>
         <p:nvSpPr>
           <p:cNvPr id="23" name="Isosceles Triangle 22">
@@ -9992,82 +10886,138 @@
           </a:p>
         </p:txBody>
       </p:sp>
-      <p:sp>
-        <p:nvSpPr>
-          <p:cNvPr id="2" name="CasellaDiTesto 1">
-            <a:extLst>
-              <a:ext uri="{FF2B5EF4-FFF2-40B4-BE49-F238E27FC236}">
-                <a16:creationId xmlns:a16="http://schemas.microsoft.com/office/drawing/2014/main" id="{F9DBB351-A316-3F7F-DEC2-053F769125B3}"/>
-              </a:ext>
-            </a:extLst>
-          </p:cNvPr>
-          <p:cNvSpPr txBox="1"/>
+      <p:grpSp>
+        <p:nvGrpSpPr>
+          <p:cNvPr id="4" name="Gruppo 3">
+            <a:extLst>
+              <a:ext uri="{FF2B5EF4-FFF2-40B4-BE49-F238E27FC236}">
+                <a16:creationId xmlns:a16="http://schemas.microsoft.com/office/drawing/2014/main" id="{38D7E9D5-D792-158F-C719-1362F2F435B9}"/>
+              </a:ext>
+            </a:extLst>
+          </p:cNvPr>
+          <p:cNvGrpSpPr/>
           <p:nvPr/>
-        </p:nvSpPr>
-        <p:spPr>
+        </p:nvGrpSpPr>
+        <p:grpSpPr>
           <a:xfrm>
-            <a:off x="2578100" y="1510066"/>
-            <a:ext cx="2628900" cy="2547257"/>
-          </a:xfrm>
-          <a:prstGeom prst="rect">
-            <a:avLst/>
-          </a:prstGeom>
-          <a:noFill/>
-        </p:spPr>
-        <p:txBody>
-          <a:bodyPr vert="horz" lIns="91440" tIns="45720" rIns="91440" bIns="45720" rtlCol="0" anchor="ctr">
-            <a:normAutofit/>
-          </a:bodyPr>
-          <a:lstStyle/>
-          <a:p>
-            <a:pPr algn="ctr">
-              <a:lnSpc>
-                <a:spcPct val="90000"/>
-              </a:lnSpc>
-              <a:spcBef>
-                <a:spcPct val="0"/>
-              </a:spcBef>
-              <a:spcAft>
-                <a:spcPts val="600"/>
-              </a:spcAft>
-            </a:pPr>
-            <a:r>
-              <a:rPr lang="en-US" sz="2400" kern="1200" dirty="0">
+            <a:off x="906421" y="629131"/>
+            <a:ext cx="9867900" cy="5940384"/>
+            <a:chOff x="906421" y="629131"/>
+            <a:chExt cx="9867900" cy="5940384"/>
+          </a:xfrm>
+        </p:grpSpPr>
+        <p:pic>
+          <p:nvPicPr>
+            <p:cNvPr id="3" name="slide6" descr="Total emission/Countries">
+              <a:extLst>
+                <a:ext uri="{FF2B5EF4-FFF2-40B4-BE49-F238E27FC236}">
+                  <a16:creationId xmlns:a16="http://schemas.microsoft.com/office/drawing/2014/main" id="{7D8A9A44-4FD4-674F-FC5E-AA6E5C869DA9}"/>
+                </a:ext>
+              </a:extLst>
+            </p:cNvPr>
+            <p:cNvPicPr>
+              <a:picLocks noChangeAspect="1"/>
+            </p:cNvPicPr>
+            <p:nvPr/>
+          </p:nvPicPr>
+          <p:blipFill rotWithShape="1">
+            <a:blip r:embed="rId2">
+              <a:extLst>
+                <a:ext uri="{28A0092B-C50C-407E-A947-70E740481C1C}">
+                  <a14:useLocalDpi xmlns:a14="http://schemas.microsoft.com/office/drawing/2010/main" val="0"/>
+                </a:ext>
+              </a:extLst>
+            </a:blip>
+            <a:srcRect t="4574" b="2894"/>
+            <a:stretch/>
+          </p:blipFill>
+          <p:spPr>
+            <a:xfrm>
+              <a:off x="906421" y="629131"/>
+              <a:ext cx="9867900" cy="5940384"/>
+            </a:xfrm>
+            <a:prstGeom prst="rect">
+              <a:avLst/>
+            </a:prstGeom>
+          </p:spPr>
+        </p:pic>
+        <p:sp>
+          <p:nvSpPr>
+            <p:cNvPr id="2" name="CasellaDiTesto 1">
+              <a:extLst>
+                <a:ext uri="{FF2B5EF4-FFF2-40B4-BE49-F238E27FC236}">
+                  <a16:creationId xmlns:a16="http://schemas.microsoft.com/office/drawing/2014/main" id="{F9DBB351-A316-3F7F-DEC2-053F769125B3}"/>
+                </a:ext>
+              </a:extLst>
+            </p:cNvPr>
+            <p:cNvSpPr txBox="1"/>
+            <p:nvPr/>
+          </p:nvSpPr>
+          <p:spPr>
+            <a:xfrm>
+              <a:off x="2578100" y="1510066"/>
+              <a:ext cx="2628900" cy="2547257"/>
+            </a:xfrm>
+            <a:prstGeom prst="rect">
+              <a:avLst/>
+            </a:prstGeom>
+            <a:noFill/>
+          </p:spPr>
+          <p:txBody>
+            <a:bodyPr vert="horz" lIns="91440" tIns="45720" rIns="91440" bIns="45720" rtlCol="0" anchor="ctr">
+              <a:normAutofit/>
+            </a:bodyPr>
+            <a:lstStyle/>
+            <a:p>
+              <a:pPr algn="ctr">
+                <a:lnSpc>
+                  <a:spcPct val="90000"/>
+                </a:lnSpc>
+                <a:spcBef>
+                  <a:spcPct val="0"/>
+                </a:spcBef>
+                <a:spcAft>
+                  <a:spcPts val="600"/>
+                </a:spcAft>
+              </a:pPr>
+              <a:r>
+                <a:rPr lang="en-US" sz="2400" kern="1200" dirty="0">
+                  <a:latin typeface="+mj-lt"/>
+                  <a:ea typeface="+mj-ea"/>
+                  <a:cs typeface="+mj-cs"/>
+                </a:rPr>
+                <a:t>Carbon emissions:</a:t>
+              </a:r>
+            </a:p>
+            <a:p>
+              <a:pPr algn="ctr">
+                <a:lnSpc>
+                  <a:spcPct val="90000"/>
+                </a:lnSpc>
+                <a:spcBef>
+                  <a:spcPct val="0"/>
+                </a:spcBef>
+                <a:spcAft>
+                  <a:spcPts val="600"/>
+                </a:spcAft>
+              </a:pPr>
+              <a:r>
+                <a:rPr lang="en-US" sz="2400" dirty="0">
+                  <a:latin typeface="+mj-lt"/>
+                  <a:ea typeface="+mj-ea"/>
+                  <a:cs typeface="+mj-cs"/>
+                </a:rPr>
+                <a:t>A comparison</a:t>
+              </a:r>
+              <a:endParaRPr lang="en-US" sz="2400" kern="1200" dirty="0">
                 <a:latin typeface="+mj-lt"/>
                 <a:ea typeface="+mj-ea"/>
                 <a:cs typeface="+mj-cs"/>
-              </a:rPr>
-              <a:t>Carbon emissions:</a:t>
-            </a:r>
-          </a:p>
-          <a:p>
-            <a:pPr algn="ctr">
-              <a:lnSpc>
-                <a:spcPct val="90000"/>
-              </a:lnSpc>
-              <a:spcBef>
-                <a:spcPct val="0"/>
-              </a:spcBef>
-              <a:spcAft>
-                <a:spcPts val="600"/>
-              </a:spcAft>
-            </a:pPr>
-            <a:r>
-              <a:rPr lang="en-US" sz="2400" dirty="0">
-                <a:latin typeface="+mj-lt"/>
-                <a:ea typeface="+mj-ea"/>
-                <a:cs typeface="+mj-cs"/>
-              </a:rPr>
-              <a:t>A comparison</a:t>
-            </a:r>
-            <a:endParaRPr lang="en-US" sz="2400" kern="1200" dirty="0">
-              <a:latin typeface="+mj-lt"/>
-              <a:ea typeface="+mj-ea"/>
-              <a:cs typeface="+mj-cs"/>
-            </a:endParaRPr>
-          </a:p>
-        </p:txBody>
-      </p:sp>
+              </a:endParaRPr>
+            </a:p>
+          </p:txBody>
+        </p:sp>
+      </p:grpSp>
     </p:spTree>
     <p:extLst>
       <p:ext uri="{BB962C8B-B14F-4D97-AF65-F5344CB8AC3E}">
@@ -10106,12 +11056,12 @@
           <a:chExt cx="0" cy="0"/>
         </a:xfrm>
       </p:grpSpPr>
-      <p:sp useBgFill="1">
-        <p:nvSpPr>
-          <p:cNvPr id="22" name="Rectangle 7">
-            <a:extLst>
-              <a:ext uri="{FF2B5EF4-FFF2-40B4-BE49-F238E27FC236}">
-                <a16:creationId xmlns:a16="http://schemas.microsoft.com/office/drawing/2014/main" id="{BA79A7CF-01AF-4178-9369-94E0C90EB046}"/>
+      <p:sp>
+        <p:nvSpPr>
+          <p:cNvPr id="11" name="Rectangle 10">
+            <a:extLst>
+              <a:ext uri="{FF2B5EF4-FFF2-40B4-BE49-F238E27FC236}">
+                <a16:creationId xmlns:a16="http://schemas.microsoft.com/office/drawing/2014/main" id="{F3060C83-F051-4F0E-ABAD-AA0DFC48B218}"/>
               </a:ext>
               <a:ext uri="{C183D7F6-B498-43B3-948B-1728B52AA6E4}">
                 <adec:decorative xmlns:adec="http://schemas.microsoft.com/office/drawing/2017/decorative" val="1"/>
@@ -10132,182 +11082,7 @@
         <p:spPr>
           <a:xfrm>
             <a:off x="0" y="0"/>
-            <a:ext cx="12191999" cy="6857365"/>
-          </a:xfrm>
-          <a:prstGeom prst="rect">
-            <a:avLst/>
-          </a:prstGeom>
-          <a:ln>
-            <a:noFill/>
-          </a:ln>
-        </p:spPr>
-        <p:style>
-          <a:lnRef idx="2">
-            <a:schemeClr val="accent1">
-              <a:shade val="50000"/>
-            </a:schemeClr>
-          </a:lnRef>
-          <a:fillRef idx="1">
-            <a:schemeClr val="accent1"/>
-          </a:fillRef>
-          <a:effectRef idx="0">
-            <a:schemeClr val="accent1"/>
-          </a:effectRef>
-          <a:fontRef idx="minor">
-            <a:schemeClr val="lt1"/>
-          </a:fontRef>
-        </p:style>
-        <p:txBody>
-          <a:bodyPr rtlCol="0" anchor="ctr"/>
-          <a:lstStyle/>
-          <a:p>
-            <a:pPr algn="ctr"/>
-            <a:endParaRPr lang="en-US"/>
-          </a:p>
-        </p:txBody>
-      </p:sp>
-      <p:sp>
-        <p:nvSpPr>
-          <p:cNvPr id="3" name="CasellaDiTesto 2">
-            <a:extLst>
-              <a:ext uri="{FF2B5EF4-FFF2-40B4-BE49-F238E27FC236}">
-                <a16:creationId xmlns:a16="http://schemas.microsoft.com/office/drawing/2014/main" id="{85460DFA-2F33-4974-8FCE-711332038CAC}"/>
-              </a:ext>
-            </a:extLst>
-          </p:cNvPr>
-          <p:cNvSpPr txBox="1"/>
-          <p:nvPr/>
-        </p:nvSpPr>
-        <p:spPr>
-          <a:xfrm>
-            <a:off x="9267909" y="2023110"/>
-            <a:ext cx="2469624" cy="2846070"/>
-          </a:xfrm>
-          <a:prstGeom prst="rect">
-            <a:avLst/>
-          </a:prstGeom>
-        </p:spPr>
-        <p:txBody>
-          <a:bodyPr vert="horz" lIns="91440" tIns="45720" rIns="91440" bIns="45720" rtlCol="0" anchor="ctr">
-            <a:normAutofit/>
-          </a:bodyPr>
-          <a:lstStyle/>
-          <a:p>
-            <a:pPr>
-              <a:lnSpc>
-                <a:spcPct val="90000"/>
-              </a:lnSpc>
-              <a:spcBef>
-                <a:spcPct val="0"/>
-              </a:spcBef>
-              <a:spcAft>
-                <a:spcPts val="600"/>
-              </a:spcAft>
-            </a:pPr>
-            <a:r>
-              <a:rPr lang="en-US" sz="3700" kern="1200" dirty="0">
-                <a:solidFill>
-                  <a:schemeClr val="tx1"/>
-                </a:solidFill>
-                <a:latin typeface="+mj-lt"/>
-                <a:ea typeface="+mj-ea"/>
-                <a:cs typeface="+mj-cs"/>
-              </a:rPr>
-              <a:t>Prediction, baby, prediction!</a:t>
-            </a:r>
-          </a:p>
-        </p:txBody>
-      </p:sp>
-      <p:sp>
-        <p:nvSpPr>
-          <p:cNvPr id="23" name="Rectangle 9">
-            <a:extLst>
-              <a:ext uri="{FF2B5EF4-FFF2-40B4-BE49-F238E27FC236}">
-                <a16:creationId xmlns:a16="http://schemas.microsoft.com/office/drawing/2014/main" id="{99413ED5-9ED4-4772-BCE4-2BCAE6B12E35}"/>
-              </a:ext>
-              <a:ext uri="{C183D7F6-B498-43B3-948B-1728B52AA6E4}">
-                <adec:decorative xmlns:adec="http://schemas.microsoft.com/office/drawing/2017/decorative" val="1"/>
-              </a:ext>
-            </a:extLst>
-          </p:cNvPr>
-          <p:cNvSpPr>
-            <a:spLocks noGrp="1" noRot="1" noChangeAspect="1" noMove="1" noResize="1" noEditPoints="1" noAdjustHandles="1" noChangeArrowheads="1" noChangeShapeType="1" noTextEdit="1"/>
-          </p:cNvSpPr>
-          <p:nvPr>
-            <p:extLst>
-              <p:ext uri="{386F3935-93C4-4BCD-93E2-E3B085C9AB24}">
-                <p16:designElem xmlns:p16="http://schemas.microsoft.com/office/powerpoint/2015/main" val="1"/>
-              </p:ext>
-            </p:extLst>
-          </p:nvPr>
-        </p:nvSpPr>
-        <p:spPr>
-          <a:xfrm rot="16200000">
-            <a:off x="3433973" y="-827233"/>
-            <a:ext cx="1715478" cy="8583421"/>
-          </a:xfrm>
-          <a:prstGeom prst="rect">
-            <a:avLst/>
-          </a:prstGeom>
-          <a:solidFill>
-            <a:schemeClr val="accent4"/>
-          </a:solidFill>
-          <a:ln>
-            <a:noFill/>
-          </a:ln>
-        </p:spPr>
-        <p:style>
-          <a:lnRef idx="2">
-            <a:schemeClr val="accent1">
-              <a:shade val="50000"/>
-            </a:schemeClr>
-          </a:lnRef>
-          <a:fillRef idx="1">
-            <a:schemeClr val="accent1"/>
-          </a:fillRef>
-          <a:effectRef idx="0">
-            <a:schemeClr val="accent1"/>
-          </a:effectRef>
-          <a:fontRef idx="minor">
-            <a:schemeClr val="lt1"/>
-          </a:fontRef>
-        </p:style>
-        <p:txBody>
-          <a:bodyPr rtlCol="0" anchor="ctr"/>
-          <a:lstStyle/>
-          <a:p>
-            <a:pPr algn="ctr"/>
-            <a:endParaRPr lang="en-US" dirty="0"/>
-          </a:p>
-        </p:txBody>
-      </p:sp>
-      <p:sp>
-        <p:nvSpPr>
-          <p:cNvPr id="24" name="Rectangle 11">
-            <a:extLst>
-              <a:ext uri="{FF2B5EF4-FFF2-40B4-BE49-F238E27FC236}">
-                <a16:creationId xmlns:a16="http://schemas.microsoft.com/office/drawing/2014/main" id="{04357C93-F0CB-4A1C-8F77-4E9063789819}"/>
-              </a:ext>
-              <a:ext uri="{C183D7F6-B498-43B3-948B-1728B52AA6E4}">
-                <adec:decorative xmlns:adec="http://schemas.microsoft.com/office/drawing/2017/decorative" val="1"/>
-              </a:ext>
-            </a:extLst>
-          </p:cNvPr>
-          <p:cNvSpPr>
-            <a:spLocks noGrp="1" noRot="1" noChangeAspect="1" noMove="1" noResize="1" noEditPoints="1" noAdjustHandles="1" noChangeArrowheads="1" noChangeShapeType="1" noTextEdit="1"/>
-          </p:cNvSpPr>
-          <p:nvPr>
-            <p:extLst>
-              <p:ext uri="{386F3935-93C4-4BCD-93E2-E3B085C9AB24}">
-                <p16:designElem xmlns:p16="http://schemas.microsoft.com/office/powerpoint/2015/main" val="1"/>
-              </p:ext>
-            </p:extLst>
-          </p:nvPr>
-        </p:nvSpPr>
-        <p:spPr>
-          <a:xfrm>
-            <a:off x="302085" y="664308"/>
-            <a:ext cx="8082632" cy="5600340"/>
+            <a:ext cx="12192000" cy="6858000"/>
           </a:xfrm>
           <a:prstGeom prst="rect">
             <a:avLst/>
@@ -10318,13 +11093,6 @@
           <a:ln>
             <a:noFill/>
           </a:ln>
-          <a:effectLst>
-            <a:outerShdw blurRad="139700" dist="127000" dir="5400000" algn="t" rotWithShape="0">
-              <a:prstClr val="black">
-                <a:alpha val="15000"/>
-              </a:prstClr>
-            </a:outerShdw>
-          </a:effectLst>
         </p:spPr>
         <p:style>
           <a:lnRef idx="2">
@@ -10347,247 +11115,13 @@
           <a:lstStyle/>
           <a:p>
             <a:pPr algn="ctr"/>
-            <a:endParaRPr lang="en-US"/>
-          </a:p>
-        </p:txBody>
-      </p:sp>
-      <p:pic>
-        <p:nvPicPr>
-          <p:cNvPr id="2" name="slide2" descr="Sheet 1">
-            <a:extLst>
-              <a:ext uri="{FF2B5EF4-FFF2-40B4-BE49-F238E27FC236}">
-                <a16:creationId xmlns:a16="http://schemas.microsoft.com/office/drawing/2014/main" id="{FD97D938-71C2-4507-A9E6-CDA1E01BE6F0}"/>
-              </a:ext>
-            </a:extLst>
-          </p:cNvPr>
-          <p:cNvPicPr>
-            <a:picLocks noChangeAspect="1"/>
-          </p:cNvPicPr>
-          <p:nvPr/>
-        </p:nvPicPr>
-        <p:blipFill rotWithShape="1">
-          <a:blip r:embed="rId2">
-            <a:extLst>
-              <a:ext uri="{28A0092B-C50C-407E-A947-70E740481C1C}">
-                <a14:useLocalDpi xmlns:a14="http://schemas.microsoft.com/office/drawing/2010/main" val="0"/>
-              </a:ext>
-            </a:extLst>
-          </a:blip>
-          <a:srcRect t="5346" r="11650" b="3243"/>
-          <a:stretch/>
-        </p:blipFill>
-        <p:spPr>
-          <a:xfrm>
-            <a:off x="545238" y="1368584"/>
-            <a:ext cx="7608304" cy="4191788"/>
-          </a:xfrm>
-          <a:prstGeom prst="rect">
-            <a:avLst/>
-          </a:prstGeom>
-        </p:spPr>
-      </p:pic>
-      <p:sp>
-        <p:nvSpPr>
-          <p:cNvPr id="14" name="Rectangle 13">
-            <a:extLst>
-              <a:ext uri="{FF2B5EF4-FFF2-40B4-BE49-F238E27FC236}">
-                <a16:creationId xmlns:a16="http://schemas.microsoft.com/office/drawing/2014/main" id="{90F533E9-6690-41A8-A372-4C6C622D028D}"/>
-              </a:ext>
-              <a:ext uri="{C183D7F6-B498-43B3-948B-1728B52AA6E4}">
-                <adec:decorative xmlns:adec="http://schemas.microsoft.com/office/drawing/2017/decorative" val="1"/>
-              </a:ext>
-            </a:extLst>
-          </p:cNvPr>
-          <p:cNvSpPr>
-            <a:spLocks noGrp="1" noRot="1" noChangeAspect="1" noMove="1" noResize="1" noEditPoints="1" noAdjustHandles="1" noChangeArrowheads="1" noChangeShapeType="1" noTextEdit="1"/>
-          </p:cNvSpPr>
-          <p:nvPr>
-            <p:extLst>
-              <p:ext uri="{386F3935-93C4-4BCD-93E2-E3B085C9AB24}">
-                <p16:designElem xmlns:p16="http://schemas.microsoft.com/office/powerpoint/2015/main" val="1"/>
-              </p:ext>
-            </p:extLst>
-          </p:nvPr>
-        </p:nvSpPr>
-        <p:spPr>
-          <a:xfrm rot="5400000">
-            <a:off x="7950447" y="3392097"/>
-            <a:ext cx="1719072" cy="152382"/>
-          </a:xfrm>
-          <a:prstGeom prst="rect">
-            <a:avLst/>
-          </a:prstGeom>
-          <a:solidFill>
-            <a:schemeClr val="accent4"/>
-          </a:solidFill>
-          <a:ln>
-            <a:noFill/>
-          </a:ln>
-        </p:spPr>
-        <p:style>
-          <a:lnRef idx="2">
-            <a:schemeClr val="accent1">
-              <a:shade val="50000"/>
-            </a:schemeClr>
-          </a:lnRef>
-          <a:fillRef idx="1">
-            <a:schemeClr val="accent1"/>
-          </a:fillRef>
-          <a:effectRef idx="0">
-            <a:schemeClr val="accent1"/>
-          </a:effectRef>
-          <a:fontRef idx="minor">
-            <a:schemeClr val="lt1"/>
-          </a:fontRef>
-        </p:style>
-        <p:txBody>
-          <a:bodyPr rtlCol="0" anchor="ctr"/>
-          <a:lstStyle/>
-          <a:p>
-            <a:pPr algn="ctr"/>
-            <a:endParaRPr lang="en-US"/>
-          </a:p>
-        </p:txBody>
-      </p:sp>
-      <p:sp>
-        <p:nvSpPr>
-          <p:cNvPr id="4" name="CasellaDiTesto 3">
-            <a:extLst>
-              <a:ext uri="{FF2B5EF4-FFF2-40B4-BE49-F238E27FC236}">
-                <a16:creationId xmlns:a16="http://schemas.microsoft.com/office/drawing/2014/main" id="{ACBE010E-80B2-656F-0381-A0386565E4B5}"/>
-              </a:ext>
-            </a:extLst>
-          </p:cNvPr>
-          <p:cNvSpPr txBox="1"/>
-          <p:nvPr/>
-        </p:nvSpPr>
-        <p:spPr>
-          <a:xfrm>
-            <a:off x="1587500" y="1790700"/>
-            <a:ext cx="1346200" cy="338554"/>
-          </a:xfrm>
-          <a:prstGeom prst="rect">
-            <a:avLst/>
-          </a:prstGeom>
-          <a:noFill/>
-        </p:spPr>
-        <p:txBody>
-          <a:bodyPr wrap="square" rtlCol="0">
-            <a:spAutoFit/>
-          </a:bodyPr>
-          <a:lstStyle/>
-          <a:p>
-            <a:r>
-              <a:rPr lang="it-IT" sz="1600" dirty="0"/>
-              <a:t>Global trend</a:t>
-            </a:r>
-          </a:p>
-        </p:txBody>
-      </p:sp>
-    </p:spTree>
-    <p:extLst>
-      <p:ext uri="{BB962C8B-B14F-4D97-AF65-F5344CB8AC3E}">
-        <p14:creationId xmlns:p14="http://schemas.microsoft.com/office/powerpoint/2010/main" val="617971141"/>
-      </p:ext>
-    </p:extLst>
-  </p:cSld>
-  <p:clrMapOvr>
-    <a:masterClrMapping/>
-  </p:clrMapOvr>
-</p:sld>
-</file>
-
-<file path=ppt/slides/slide9.xml><?xml version="1.0" encoding="utf-8"?>
-<p:sld xmlns:a="http://schemas.openxmlformats.org/drawingml/2006/main" xmlns:r="http://schemas.openxmlformats.org/officeDocument/2006/relationships" xmlns:p="http://schemas.openxmlformats.org/presentationml/2006/main">
-  <p:cSld>
-    <p:bg>
-      <p:bgPr>
-        <a:solidFill>
-          <a:schemeClr val="bg1"/>
-        </a:solidFill>
-        <a:effectLst/>
-      </p:bgPr>
-    </p:bg>
-    <p:spTree>
-      <p:nvGrpSpPr>
-        <p:cNvPr id="1" name=""/>
-        <p:cNvGrpSpPr/>
-        <p:nvPr/>
-      </p:nvGrpSpPr>
-      <p:grpSpPr>
-        <a:xfrm>
-          <a:off x="0" y="0"/>
-          <a:ext cx="0" cy="0"/>
-          <a:chOff x="0" y="0"/>
-          <a:chExt cx="0" cy="0"/>
-        </a:xfrm>
-      </p:grpSpPr>
-      <p:sp>
-        <p:nvSpPr>
-          <p:cNvPr id="8" name="Rectangle 7">
-            <a:extLst>
-              <a:ext uri="{FF2B5EF4-FFF2-40B4-BE49-F238E27FC236}">
-                <a16:creationId xmlns:a16="http://schemas.microsoft.com/office/drawing/2014/main" id="{F3060C83-F051-4F0E-ABAD-AA0DFC48B218}"/>
-              </a:ext>
-              <a:ext uri="{C183D7F6-B498-43B3-948B-1728B52AA6E4}">
-                <adec:decorative xmlns:adec="http://schemas.microsoft.com/office/drawing/2017/decorative" val="1"/>
-              </a:ext>
-            </a:extLst>
-          </p:cNvPr>
-          <p:cNvSpPr>
-            <a:spLocks noGrp="1" noRot="1" noChangeAspect="1" noMove="1" noResize="1" noEditPoints="1" noAdjustHandles="1" noChangeArrowheads="1" noChangeShapeType="1" noTextEdit="1"/>
-          </p:cNvSpPr>
-          <p:nvPr>
-            <p:extLst>
-              <p:ext uri="{386F3935-93C4-4BCD-93E2-E3B085C9AB24}">
-                <p16:designElem xmlns:p16="http://schemas.microsoft.com/office/powerpoint/2015/main" val="1"/>
-              </p:ext>
-            </p:extLst>
-          </p:nvPr>
-        </p:nvSpPr>
-        <p:spPr>
-          <a:xfrm>
-            <a:off x="0" y="0"/>
-            <a:ext cx="12192000" cy="6858000"/>
-          </a:xfrm>
-          <a:prstGeom prst="rect">
-            <a:avLst/>
-          </a:prstGeom>
-          <a:solidFill>
-            <a:schemeClr val="bg1"/>
-          </a:solidFill>
-          <a:ln>
-            <a:noFill/>
-          </a:ln>
-        </p:spPr>
-        <p:style>
-          <a:lnRef idx="2">
-            <a:schemeClr val="accent1">
-              <a:shade val="50000"/>
-            </a:schemeClr>
-          </a:lnRef>
-          <a:fillRef idx="1">
-            <a:schemeClr val="accent1"/>
-          </a:fillRef>
-          <a:effectRef idx="0">
-            <a:schemeClr val="accent1"/>
-          </a:effectRef>
-          <a:fontRef idx="minor">
-            <a:schemeClr val="lt1"/>
-          </a:fontRef>
-        </p:style>
-        <p:txBody>
-          <a:bodyPr rtlCol="0" anchor="ctr"/>
-          <a:lstStyle/>
-          <a:p>
-            <a:pPr algn="ctr"/>
             <a:endParaRPr lang="en-US" dirty="0"/>
           </a:p>
         </p:txBody>
       </p:sp>
       <p:sp>
         <p:nvSpPr>
-          <p:cNvPr id="10" name="Freeform: Shape 9">
+          <p:cNvPr id="13" name="Freeform: Shape 12">
             <a:extLst>
               <a:ext uri="{FF2B5EF4-FFF2-40B4-BE49-F238E27FC236}">
                 <a16:creationId xmlns:a16="http://schemas.microsoft.com/office/drawing/2014/main" id="{83C98ABE-055B-441F-B07E-44F97F083C39}"/>
@@ -10703,7 +11237,7 @@
       </p:sp>
       <p:sp>
         <p:nvSpPr>
-          <p:cNvPr id="12" name="Rectangle 11">
+          <p:cNvPr id="15" name="Rectangle 14">
             <a:extLst>
               <a:ext uri="{FF2B5EF4-FFF2-40B4-BE49-F238E27FC236}">
                 <a16:creationId xmlns:a16="http://schemas.microsoft.com/office/drawing/2014/main" id="{29FDB030-9B49-4CED-8CCD-4D99382388AC}"/>
@@ -10768,7 +11302,7 @@
       </p:sp>
       <p:sp>
         <p:nvSpPr>
-          <p:cNvPr id="14" name="Rectangle 13">
+          <p:cNvPr id="17" name="Rectangle 16">
             <a:extLst>
               <a:ext uri="{FF2B5EF4-FFF2-40B4-BE49-F238E27FC236}">
                 <a16:creationId xmlns:a16="http://schemas.microsoft.com/office/drawing/2014/main" id="{3783CA14-24A1-485C-8B30-D6A5D87987AD}"/>
@@ -10833,7 +11367,7 @@
       </p:sp>
       <p:sp>
         <p:nvSpPr>
-          <p:cNvPr id="16" name="Freeform: Shape 15">
+          <p:cNvPr id="19" name="Freeform: Shape 18">
             <a:extLst>
               <a:ext uri="{FF2B5EF4-FFF2-40B4-BE49-F238E27FC236}">
                 <a16:creationId xmlns:a16="http://schemas.microsoft.com/office/drawing/2014/main" id="{9A97C86A-04D6-40F7-AE84-31AB43E6A846}"/>
@@ -10943,6 +11477,891 @@
       </p:sp>
       <p:sp>
         <p:nvSpPr>
+          <p:cNvPr id="21" name="Isosceles Triangle 20">
+            <a:extLst>
+              <a:ext uri="{FF2B5EF4-FFF2-40B4-BE49-F238E27FC236}">
+                <a16:creationId xmlns:a16="http://schemas.microsoft.com/office/drawing/2014/main" id="{FF9F2414-84E8-453E-B1F3-389FDE8192D9}"/>
+              </a:ext>
+              <a:ext uri="{C183D7F6-B498-43B3-948B-1728B52AA6E4}">
+                <adec:decorative xmlns:adec="http://schemas.microsoft.com/office/drawing/2017/decorative" val="1"/>
+              </a:ext>
+            </a:extLst>
+          </p:cNvPr>
+          <p:cNvSpPr>
+            <a:spLocks noGrp="1" noRot="1" noChangeAspect="1" noMove="1" noResize="1" noEditPoints="1" noAdjustHandles="1" noChangeArrowheads="1" noChangeShapeType="1" noTextEdit="1"/>
+          </p:cNvSpPr>
+          <p:nvPr>
+            <p:extLst>
+              <p:ext uri="{386F3935-93C4-4BCD-93E2-E3B085C9AB24}">
+                <p16:designElem xmlns:p16="http://schemas.microsoft.com/office/powerpoint/2015/main" val="1"/>
+              </p:ext>
+            </p:extLst>
+          </p:nvPr>
+        </p:nvSpPr>
+        <p:spPr>
+          <a:xfrm flipH="1">
+            <a:off x="7976344" y="6115501"/>
+            <a:ext cx="1494513" cy="742499"/>
+          </a:xfrm>
+          <a:prstGeom prst="triangle">
+            <a:avLst/>
+          </a:prstGeom>
+          <a:solidFill>
+            <a:schemeClr val="accent1">
+              <a:alpha val="30000"/>
+            </a:schemeClr>
+          </a:solidFill>
+          <a:ln>
+            <a:noFill/>
+          </a:ln>
+        </p:spPr>
+        <p:style>
+          <a:lnRef idx="2">
+            <a:schemeClr val="accent1">
+              <a:shade val="50000"/>
+            </a:schemeClr>
+          </a:lnRef>
+          <a:fillRef idx="1">
+            <a:schemeClr val="accent1"/>
+          </a:fillRef>
+          <a:effectRef idx="0">
+            <a:schemeClr val="accent1"/>
+          </a:effectRef>
+          <a:fontRef idx="minor">
+            <a:schemeClr val="lt1"/>
+          </a:fontRef>
+        </p:style>
+        <p:txBody>
+          <a:bodyPr rtlCol="0" anchor="ctr"/>
+          <a:lstStyle/>
+          <a:p>
+            <a:pPr algn="ctr"/>
+            <a:endParaRPr lang="en-US"/>
+          </a:p>
+        </p:txBody>
+      </p:sp>
+      <p:sp>
+        <p:nvSpPr>
+          <p:cNvPr id="23" name="Isosceles Triangle 22">
+            <a:extLst>
+              <a:ext uri="{FF2B5EF4-FFF2-40B4-BE49-F238E27FC236}">
+                <a16:creationId xmlns:a16="http://schemas.microsoft.com/office/drawing/2014/main" id="{3ECA69A1-7536-43AC-85EF-C7106179F5ED}"/>
+              </a:ext>
+              <a:ext uri="{C183D7F6-B498-43B3-948B-1728B52AA6E4}">
+                <adec:decorative xmlns:adec="http://schemas.microsoft.com/office/drawing/2017/decorative" val="1"/>
+              </a:ext>
+            </a:extLst>
+          </p:cNvPr>
+          <p:cNvSpPr>
+            <a:spLocks noGrp="1" noRot="1" noChangeAspect="1" noMove="1" noResize="1" noEditPoints="1" noAdjustHandles="1" noChangeArrowheads="1" noChangeShapeType="1" noTextEdit="1"/>
+          </p:cNvSpPr>
+          <p:nvPr>
+            <p:extLst>
+              <p:ext uri="{386F3935-93C4-4BCD-93E2-E3B085C9AB24}">
+                <p16:designElem xmlns:p16="http://schemas.microsoft.com/office/powerpoint/2015/main" val="1"/>
+              </p:ext>
+            </p:extLst>
+          </p:nvPr>
+        </p:nvSpPr>
+        <p:spPr>
+          <a:xfrm flipH="1">
+            <a:off x="7604080" y="6453143"/>
+            <a:ext cx="814903" cy="404857"/>
+          </a:xfrm>
+          <a:prstGeom prst="triangle">
+            <a:avLst/>
+          </a:prstGeom>
+          <a:solidFill>
+            <a:schemeClr val="accent1">
+              <a:alpha val="30000"/>
+            </a:schemeClr>
+          </a:solidFill>
+          <a:ln>
+            <a:noFill/>
+          </a:ln>
+        </p:spPr>
+        <p:style>
+          <a:lnRef idx="2">
+            <a:schemeClr val="accent1">
+              <a:shade val="50000"/>
+            </a:schemeClr>
+          </a:lnRef>
+          <a:fillRef idx="1">
+            <a:schemeClr val="accent1"/>
+          </a:fillRef>
+          <a:effectRef idx="0">
+            <a:schemeClr val="accent1"/>
+          </a:effectRef>
+          <a:fontRef idx="minor">
+            <a:schemeClr val="lt1"/>
+          </a:fontRef>
+        </p:style>
+        <p:txBody>
+          <a:bodyPr rtlCol="0" anchor="ctr"/>
+          <a:lstStyle/>
+          <a:p>
+            <a:pPr algn="ctr"/>
+            <a:endParaRPr lang="en-US"/>
+          </a:p>
+        </p:txBody>
+      </p:sp>
+      <p:pic>
+        <p:nvPicPr>
+          <p:cNvPr id="5" name="slide2" descr="Global">
+            <a:extLst>
+              <a:ext uri="{FF2B5EF4-FFF2-40B4-BE49-F238E27FC236}">
+                <a16:creationId xmlns:a16="http://schemas.microsoft.com/office/drawing/2014/main" id="{261B1B29-B383-5D13-4466-2BF772C507A2}"/>
+              </a:ext>
+            </a:extLst>
+          </p:cNvPr>
+          <p:cNvPicPr>
+            <a:picLocks noChangeAspect="1"/>
+          </p:cNvPicPr>
+          <p:nvPr/>
+        </p:nvPicPr>
+        <p:blipFill rotWithShape="1">
+          <a:blip r:embed="rId2">
+            <a:extLst>
+              <a:ext uri="{28A0092B-C50C-407E-A947-70E740481C1C}">
+                <a14:useLocalDpi xmlns:a14="http://schemas.microsoft.com/office/drawing/2010/main" val="0"/>
+              </a:ext>
+            </a:extLst>
+          </a:blip>
+          <a:srcRect t="6264" b="3191"/>
+          <a:stretch/>
+        </p:blipFill>
+        <p:spPr>
+          <a:xfrm>
+            <a:off x="1194069" y="884419"/>
+            <a:ext cx="10093524" cy="5620597"/>
+          </a:xfrm>
+          <a:prstGeom prst="rect">
+            <a:avLst/>
+          </a:prstGeom>
+        </p:spPr>
+      </p:pic>
+      <p:sp>
+        <p:nvSpPr>
+          <p:cNvPr id="6" name="CasellaDiTesto 5">
+            <a:extLst>
+              <a:ext uri="{FF2B5EF4-FFF2-40B4-BE49-F238E27FC236}">
+                <a16:creationId xmlns:a16="http://schemas.microsoft.com/office/drawing/2014/main" id="{4FCC3706-1022-AE9E-C28E-AAD7C4543866}"/>
+              </a:ext>
+            </a:extLst>
+          </p:cNvPr>
+          <p:cNvSpPr txBox="1"/>
+          <p:nvPr/>
+        </p:nvSpPr>
+        <p:spPr>
+          <a:xfrm>
+            <a:off x="1670670" y="-91976"/>
+            <a:ext cx="6012305" cy="1098350"/>
+          </a:xfrm>
+          <a:prstGeom prst="rect">
+            <a:avLst/>
+          </a:prstGeom>
+        </p:spPr>
+        <p:txBody>
+          <a:bodyPr vert="horz" lIns="91440" tIns="45720" rIns="91440" bIns="45720" rtlCol="0" anchor="ctr">
+            <a:normAutofit/>
+          </a:bodyPr>
+          <a:lstStyle/>
+          <a:p>
+            <a:pPr>
+              <a:lnSpc>
+                <a:spcPct val="90000"/>
+              </a:lnSpc>
+              <a:spcBef>
+                <a:spcPct val="0"/>
+              </a:spcBef>
+              <a:spcAft>
+                <a:spcPts val="600"/>
+              </a:spcAft>
+            </a:pPr>
+            <a:r>
+              <a:rPr lang="en-US" sz="3200" kern="1200" dirty="0">
+                <a:solidFill>
+                  <a:schemeClr val="tx1"/>
+                </a:solidFill>
+                <a:latin typeface="+mj-lt"/>
+                <a:ea typeface="+mj-ea"/>
+                <a:cs typeface="+mj-cs"/>
+              </a:rPr>
+              <a:t>Global future trend forecasting</a:t>
+            </a:r>
+          </a:p>
+        </p:txBody>
+      </p:sp>
+      <p:sp>
+        <p:nvSpPr>
+          <p:cNvPr id="7" name="CasellaDiTesto 6">
+            <a:extLst>
+              <a:ext uri="{FF2B5EF4-FFF2-40B4-BE49-F238E27FC236}">
+                <a16:creationId xmlns:a16="http://schemas.microsoft.com/office/drawing/2014/main" id="{ECEAFE1B-E5CA-002D-C1FC-093257FADADB}"/>
+              </a:ext>
+            </a:extLst>
+          </p:cNvPr>
+          <p:cNvSpPr txBox="1"/>
+          <p:nvPr/>
+        </p:nvSpPr>
+        <p:spPr>
+          <a:xfrm>
+            <a:off x="9701700" y="2277786"/>
+            <a:ext cx="1161835" cy="369332"/>
+          </a:xfrm>
+          <a:prstGeom prst="rect">
+            <a:avLst/>
+          </a:prstGeom>
+          <a:noFill/>
+        </p:spPr>
+        <p:txBody>
+          <a:bodyPr wrap="square" rtlCol="0">
+            <a:spAutoFit/>
+          </a:bodyPr>
+          <a:lstStyle/>
+          <a:p>
+            <a:r>
+              <a:rPr lang="it-IT" dirty="0"/>
+              <a:t>113 % </a:t>
+            </a:r>
+          </a:p>
+        </p:txBody>
+      </p:sp>
+      <p:sp>
+        <p:nvSpPr>
+          <p:cNvPr id="8" name="Freccia su 7">
+            <a:extLst>
+              <a:ext uri="{FF2B5EF4-FFF2-40B4-BE49-F238E27FC236}">
+                <a16:creationId xmlns:a16="http://schemas.microsoft.com/office/drawing/2014/main" id="{F32A7528-F87C-E3F3-19B6-B09B11CD3352}"/>
+              </a:ext>
+            </a:extLst>
+          </p:cNvPr>
+          <p:cNvSpPr/>
+          <p:nvPr/>
+        </p:nvSpPr>
+        <p:spPr>
+          <a:xfrm>
+            <a:off x="9470857" y="2076772"/>
+            <a:ext cx="272750" cy="771360"/>
+          </a:xfrm>
+          <a:prstGeom prst="upArrow">
+            <a:avLst/>
+          </a:prstGeom>
+          <a:solidFill>
+            <a:srgbClr val="FF0000"/>
+          </a:solidFill>
+          <a:ln>
+            <a:solidFill>
+              <a:srgbClr val="FF0000"/>
+            </a:solidFill>
+          </a:ln>
+        </p:spPr>
+        <p:style>
+          <a:lnRef idx="2">
+            <a:schemeClr val="accent1">
+              <a:shade val="50000"/>
+            </a:schemeClr>
+          </a:lnRef>
+          <a:fillRef idx="1">
+            <a:schemeClr val="accent1"/>
+          </a:fillRef>
+          <a:effectRef idx="0">
+            <a:schemeClr val="accent1"/>
+          </a:effectRef>
+          <a:fontRef idx="minor">
+            <a:schemeClr val="lt1"/>
+          </a:fontRef>
+        </p:style>
+        <p:txBody>
+          <a:bodyPr rtlCol="0" anchor="ctr"/>
+          <a:lstStyle/>
+          <a:p>
+            <a:pPr algn="ctr"/>
+            <a:endParaRPr lang="it-IT" dirty="0"/>
+          </a:p>
+        </p:txBody>
+      </p:sp>
+    </p:spTree>
+    <p:extLst>
+      <p:ext uri="{BB962C8B-B14F-4D97-AF65-F5344CB8AC3E}">
+        <p14:creationId xmlns:p14="http://schemas.microsoft.com/office/powerpoint/2010/main" val="3508530979"/>
+      </p:ext>
+    </p:extLst>
+  </p:cSld>
+  <p:clrMapOvr>
+    <a:masterClrMapping/>
+  </p:clrMapOvr>
+  <p:timing>
+    <p:tnLst>
+      <p:par>
+        <p:cTn id="1" dur="indefinite" restart="never" nodeType="tmRoot">
+          <p:childTnLst>
+            <p:seq concurrent="1" nextAc="seek">
+              <p:cTn id="2" dur="indefinite" nodeType="mainSeq">
+                <p:childTnLst>
+                  <p:par>
+                    <p:cTn id="3" fill="hold">
+                      <p:stCondLst>
+                        <p:cond delay="indefinite"/>
+                      </p:stCondLst>
+                      <p:childTnLst>
+                        <p:par>
+                          <p:cTn id="4" fill="hold">
+                            <p:stCondLst>
+                              <p:cond delay="0"/>
+                            </p:stCondLst>
+                            <p:childTnLst>
+                              <p:par>
+                                <p:cTn id="5" presetID="10" presetClass="entr" presetSubtype="0" fill="hold" grpId="0" nodeType="clickEffect">
+                                  <p:stCondLst>
+                                    <p:cond delay="0"/>
+                                  </p:stCondLst>
+                                  <p:childTnLst>
+                                    <p:set>
+                                      <p:cBhvr>
+                                        <p:cTn id="6" dur="1" fill="hold">
+                                          <p:stCondLst>
+                                            <p:cond delay="0"/>
+                                          </p:stCondLst>
+                                        </p:cTn>
+                                        <p:tgtEl>
+                                          <p:spTgt spid="8"/>
+                                        </p:tgtEl>
+                                        <p:attrNameLst>
+                                          <p:attrName>style.visibility</p:attrName>
+                                        </p:attrNameLst>
+                                      </p:cBhvr>
+                                      <p:to>
+                                        <p:strVal val="visible"/>
+                                      </p:to>
+                                    </p:set>
+                                    <p:animEffect transition="in" filter="fade">
+                                      <p:cBhvr>
+                                        <p:cTn id="7" dur="500"/>
+                                        <p:tgtEl>
+                                          <p:spTgt spid="8"/>
+                                        </p:tgtEl>
+                                      </p:cBhvr>
+                                    </p:animEffect>
+                                  </p:childTnLst>
+                                </p:cTn>
+                              </p:par>
+                              <p:par>
+                                <p:cTn id="8" presetID="10" presetClass="entr" presetSubtype="0" fill="hold" grpId="0" nodeType="withEffect">
+                                  <p:stCondLst>
+                                    <p:cond delay="0"/>
+                                  </p:stCondLst>
+                                  <p:childTnLst>
+                                    <p:set>
+                                      <p:cBhvr>
+                                        <p:cTn id="9" dur="1" fill="hold">
+                                          <p:stCondLst>
+                                            <p:cond delay="0"/>
+                                          </p:stCondLst>
+                                        </p:cTn>
+                                        <p:tgtEl>
+                                          <p:spTgt spid="7"/>
+                                        </p:tgtEl>
+                                        <p:attrNameLst>
+                                          <p:attrName>style.visibility</p:attrName>
+                                        </p:attrNameLst>
+                                      </p:cBhvr>
+                                      <p:to>
+                                        <p:strVal val="visible"/>
+                                      </p:to>
+                                    </p:set>
+                                    <p:animEffect transition="in" filter="fade">
+                                      <p:cBhvr>
+                                        <p:cTn id="10" dur="500"/>
+                                        <p:tgtEl>
+                                          <p:spTgt spid="7"/>
+                                        </p:tgtEl>
+                                      </p:cBhvr>
+                                    </p:animEffect>
+                                  </p:childTnLst>
+                                </p:cTn>
+                              </p:par>
+                            </p:childTnLst>
+                          </p:cTn>
+                        </p:par>
+                      </p:childTnLst>
+                    </p:cTn>
+                  </p:par>
+                </p:childTnLst>
+              </p:cTn>
+              <p:prevCondLst>
+                <p:cond evt="onPrev" delay="0">
+                  <p:tgtEl>
+                    <p:sldTgt/>
+                  </p:tgtEl>
+                </p:cond>
+              </p:prevCondLst>
+              <p:nextCondLst>
+                <p:cond evt="onNext" delay="0">
+                  <p:tgtEl>
+                    <p:sldTgt/>
+                  </p:tgtEl>
+                </p:cond>
+              </p:nextCondLst>
+            </p:seq>
+          </p:childTnLst>
+        </p:cTn>
+      </p:par>
+    </p:tnLst>
+    <p:bldLst>
+      <p:bldP spid="7" grpId="0"/>
+      <p:bldP spid="8" grpId="0" animBg="1"/>
+    </p:bldLst>
+  </p:timing>
+</p:sld>
+</file>
+
+<file path=ppt/slides/slide9.xml><?xml version="1.0" encoding="utf-8"?>
+<p:sld xmlns:a="http://schemas.openxmlformats.org/drawingml/2006/main" xmlns:r="http://schemas.openxmlformats.org/officeDocument/2006/relationships" xmlns:p="http://schemas.openxmlformats.org/presentationml/2006/main">
+  <p:cSld>
+    <p:bg>
+      <p:bgPr>
+        <a:solidFill>
+          <a:schemeClr val="bg1"/>
+        </a:solidFill>
+        <a:effectLst/>
+      </p:bgPr>
+    </p:bg>
+    <p:spTree>
+      <p:nvGrpSpPr>
+        <p:cNvPr id="1" name=""/>
+        <p:cNvGrpSpPr/>
+        <p:nvPr/>
+      </p:nvGrpSpPr>
+      <p:grpSpPr>
+        <a:xfrm>
+          <a:off x="0" y="0"/>
+          <a:ext cx="0" cy="0"/>
+          <a:chOff x="0" y="0"/>
+          <a:chExt cx="0" cy="0"/>
+        </a:xfrm>
+      </p:grpSpPr>
+      <p:sp>
+        <p:nvSpPr>
+          <p:cNvPr id="8" name="Rectangle 7">
+            <a:extLst>
+              <a:ext uri="{FF2B5EF4-FFF2-40B4-BE49-F238E27FC236}">
+                <a16:creationId xmlns:a16="http://schemas.microsoft.com/office/drawing/2014/main" id="{F3060C83-F051-4F0E-ABAD-AA0DFC48B218}"/>
+              </a:ext>
+              <a:ext uri="{C183D7F6-B498-43B3-948B-1728B52AA6E4}">
+                <adec:decorative xmlns:adec="http://schemas.microsoft.com/office/drawing/2017/decorative" val="1"/>
+              </a:ext>
+            </a:extLst>
+          </p:cNvPr>
+          <p:cNvSpPr>
+            <a:spLocks noGrp="1" noRot="1" noChangeAspect="1" noMove="1" noResize="1" noEditPoints="1" noAdjustHandles="1" noChangeArrowheads="1" noChangeShapeType="1" noTextEdit="1"/>
+          </p:cNvSpPr>
+          <p:nvPr>
+            <p:extLst>
+              <p:ext uri="{386F3935-93C4-4BCD-93E2-E3B085C9AB24}">
+                <p16:designElem xmlns:p16="http://schemas.microsoft.com/office/powerpoint/2015/main" val="1"/>
+              </p:ext>
+            </p:extLst>
+          </p:nvPr>
+        </p:nvSpPr>
+        <p:spPr>
+          <a:xfrm>
+            <a:off x="0" y="0"/>
+            <a:ext cx="12192000" cy="6858000"/>
+          </a:xfrm>
+          <a:prstGeom prst="rect">
+            <a:avLst/>
+          </a:prstGeom>
+          <a:solidFill>
+            <a:schemeClr val="bg1"/>
+          </a:solidFill>
+          <a:ln>
+            <a:noFill/>
+          </a:ln>
+        </p:spPr>
+        <p:style>
+          <a:lnRef idx="2">
+            <a:schemeClr val="accent1">
+              <a:shade val="50000"/>
+            </a:schemeClr>
+          </a:lnRef>
+          <a:fillRef idx="1">
+            <a:schemeClr val="accent1"/>
+          </a:fillRef>
+          <a:effectRef idx="0">
+            <a:schemeClr val="accent1"/>
+          </a:effectRef>
+          <a:fontRef idx="minor">
+            <a:schemeClr val="lt1"/>
+          </a:fontRef>
+        </p:style>
+        <p:txBody>
+          <a:bodyPr rtlCol="0" anchor="ctr"/>
+          <a:lstStyle/>
+          <a:p>
+            <a:pPr algn="ctr"/>
+            <a:endParaRPr lang="en-US" dirty="0"/>
+          </a:p>
+        </p:txBody>
+      </p:sp>
+      <p:sp>
+        <p:nvSpPr>
+          <p:cNvPr id="10" name="Freeform: Shape 9">
+            <a:extLst>
+              <a:ext uri="{FF2B5EF4-FFF2-40B4-BE49-F238E27FC236}">
+                <a16:creationId xmlns:a16="http://schemas.microsoft.com/office/drawing/2014/main" id="{83C98ABE-055B-441F-B07E-44F97F083C39}"/>
+              </a:ext>
+              <a:ext uri="{C183D7F6-B498-43B3-948B-1728B52AA6E4}">
+                <adec:decorative xmlns:adec="http://schemas.microsoft.com/office/drawing/2017/decorative" val="1"/>
+              </a:ext>
+            </a:extLst>
+          </p:cNvPr>
+          <p:cNvSpPr>
+            <a:spLocks noGrp="1" noRot="1" noChangeAspect="1" noMove="1" noResize="1" noEditPoints="1" noAdjustHandles="1" noChangeArrowheads="1" noChangeShapeType="1" noTextEdit="1"/>
+          </p:cNvSpPr>
+          <p:nvPr>
+            <p:extLst>
+              <p:ext uri="{386F3935-93C4-4BCD-93E2-E3B085C9AB24}">
+                <p16:designElem xmlns:p16="http://schemas.microsoft.com/office/powerpoint/2015/main" val="1"/>
+              </p:ext>
+            </p:extLst>
+          </p:nvPr>
+        </p:nvSpPr>
+        <p:spPr>
+          <a:xfrm rot="18900000" flipH="1">
+            <a:off x="-376156" y="-253670"/>
+            <a:ext cx="1827638" cy="1376989"/>
+          </a:xfrm>
+          <a:custGeom>
+            <a:avLst/>
+            <a:gdLst>
+              <a:gd name="connsiteX0" fmla="*/ 0 w 1827638"/>
+              <a:gd name="connsiteY0" fmla="*/ 987379 h 1376989"/>
+              <a:gd name="connsiteX1" fmla="*/ 987379 w 1827638"/>
+              <a:gd name="connsiteY1" fmla="*/ 0 h 1376989"/>
+              <a:gd name="connsiteX2" fmla="*/ 1827638 w 1827638"/>
+              <a:gd name="connsiteY2" fmla="*/ 840260 h 1376989"/>
+              <a:gd name="connsiteX3" fmla="*/ 1827638 w 1827638"/>
+              <a:gd name="connsiteY3" fmla="*/ 1376989 h 1376989"/>
+              <a:gd name="connsiteX4" fmla="*/ 0 w 1827638"/>
+              <a:gd name="connsiteY4" fmla="*/ 1376989 h 1376989"/>
+            </a:gdLst>
+            <a:ahLst/>
+            <a:cxnLst>
+              <a:cxn ang="0">
+                <a:pos x="connsiteX0" y="connsiteY0"/>
+              </a:cxn>
+              <a:cxn ang="0">
+                <a:pos x="connsiteX1" y="connsiteY1"/>
+              </a:cxn>
+              <a:cxn ang="0">
+                <a:pos x="connsiteX2" y="connsiteY2"/>
+              </a:cxn>
+              <a:cxn ang="0">
+                <a:pos x="connsiteX3" y="connsiteY3"/>
+              </a:cxn>
+              <a:cxn ang="0">
+                <a:pos x="connsiteX4" y="connsiteY4"/>
+              </a:cxn>
+            </a:cxnLst>
+            <a:rect l="l" t="t" r="r" b="b"/>
+            <a:pathLst>
+              <a:path w="1827638" h="1376989">
+                <a:moveTo>
+                  <a:pt x="0" y="987379"/>
+                </a:moveTo>
+                <a:lnTo>
+                  <a:pt x="987379" y="0"/>
+                </a:lnTo>
+                <a:lnTo>
+                  <a:pt x="1827638" y="840260"/>
+                </a:lnTo>
+                <a:lnTo>
+                  <a:pt x="1827638" y="1376989"/>
+                </a:lnTo>
+                <a:lnTo>
+                  <a:pt x="0" y="1376989"/>
+                </a:lnTo>
+                <a:close/>
+              </a:path>
+            </a:pathLst>
+          </a:custGeom>
+          <a:solidFill>
+            <a:schemeClr val="accent1">
+              <a:alpha val="30000"/>
+            </a:schemeClr>
+          </a:solidFill>
+          <a:ln>
+            <a:noFill/>
+          </a:ln>
+        </p:spPr>
+        <p:style>
+          <a:lnRef idx="2">
+            <a:schemeClr val="accent1">
+              <a:shade val="50000"/>
+            </a:schemeClr>
+          </a:lnRef>
+          <a:fillRef idx="1">
+            <a:schemeClr val="accent1"/>
+          </a:fillRef>
+          <a:effectRef idx="0">
+            <a:schemeClr val="accent1"/>
+          </a:effectRef>
+          <a:fontRef idx="minor">
+            <a:schemeClr val="lt1"/>
+          </a:fontRef>
+        </p:style>
+        <p:txBody>
+          <a:bodyPr rtlCol="0" anchor="ctr"/>
+          <a:lstStyle/>
+          <a:p>
+            <a:pPr algn="ctr"/>
+            <a:endParaRPr lang="en-US" dirty="0"/>
+          </a:p>
+        </p:txBody>
+      </p:sp>
+      <p:sp>
+        <p:nvSpPr>
+          <p:cNvPr id="12" name="Rectangle 11">
+            <a:extLst>
+              <a:ext uri="{FF2B5EF4-FFF2-40B4-BE49-F238E27FC236}">
+                <a16:creationId xmlns:a16="http://schemas.microsoft.com/office/drawing/2014/main" id="{29FDB030-9B49-4CED-8CCD-4D99382388AC}"/>
+              </a:ext>
+              <a:ext uri="{C183D7F6-B498-43B3-948B-1728B52AA6E4}">
+                <adec:decorative xmlns:adec="http://schemas.microsoft.com/office/drawing/2017/decorative" val="1"/>
+              </a:ext>
+            </a:extLst>
+          </p:cNvPr>
+          <p:cNvSpPr>
+            <a:spLocks noGrp="1" noRot="1" noChangeAspect="1" noMove="1" noResize="1" noEditPoints="1" noAdjustHandles="1" noChangeArrowheads="1" noChangeShapeType="1" noTextEdit="1"/>
+          </p:cNvSpPr>
+          <p:nvPr>
+            <p:extLst>
+              <p:ext uri="{386F3935-93C4-4BCD-93E2-E3B085C9AB24}">
+                <p16:designElem xmlns:p16="http://schemas.microsoft.com/office/powerpoint/2015/main" val="1"/>
+              </p:ext>
+            </p:extLst>
+          </p:nvPr>
+        </p:nvSpPr>
+        <p:spPr>
+          <a:xfrm rot="18900000" flipH="1">
+            <a:off x="891641" y="422146"/>
+            <a:ext cx="645368" cy="645368"/>
+          </a:xfrm>
+          <a:prstGeom prst="rect">
+            <a:avLst/>
+          </a:prstGeom>
+          <a:solidFill>
+            <a:schemeClr val="accent1">
+              <a:alpha val="30000"/>
+            </a:schemeClr>
+          </a:solidFill>
+          <a:ln>
+            <a:noFill/>
+          </a:ln>
+        </p:spPr>
+        <p:style>
+          <a:lnRef idx="2">
+            <a:schemeClr val="accent1">
+              <a:shade val="50000"/>
+            </a:schemeClr>
+          </a:lnRef>
+          <a:fillRef idx="1">
+            <a:schemeClr val="accent1"/>
+          </a:fillRef>
+          <a:effectRef idx="0">
+            <a:schemeClr val="accent1"/>
+          </a:effectRef>
+          <a:fontRef idx="minor">
+            <a:schemeClr val="lt1"/>
+          </a:fontRef>
+        </p:style>
+        <p:txBody>
+          <a:bodyPr rtlCol="0" anchor="ctr"/>
+          <a:lstStyle/>
+          <a:p>
+            <a:pPr algn="ctr"/>
+            <a:endParaRPr lang="en-US"/>
+          </a:p>
+        </p:txBody>
+      </p:sp>
+      <p:sp>
+        <p:nvSpPr>
+          <p:cNvPr id="14" name="Rectangle 13">
+            <a:extLst>
+              <a:ext uri="{FF2B5EF4-FFF2-40B4-BE49-F238E27FC236}">
+                <a16:creationId xmlns:a16="http://schemas.microsoft.com/office/drawing/2014/main" id="{3783CA14-24A1-485C-8B30-D6A5D87987AD}"/>
+              </a:ext>
+              <a:ext uri="{C183D7F6-B498-43B3-948B-1728B52AA6E4}">
+                <adec:decorative xmlns:adec="http://schemas.microsoft.com/office/drawing/2017/decorative" val="1"/>
+              </a:ext>
+            </a:extLst>
+          </p:cNvPr>
+          <p:cNvSpPr>
+            <a:spLocks noGrp="1" noRot="1" noChangeAspect="1" noMove="1" noResize="1" noEditPoints="1" noAdjustHandles="1" noChangeArrowheads="1" noChangeShapeType="1" noTextEdit="1"/>
+          </p:cNvSpPr>
+          <p:nvPr>
+            <p:extLst>
+              <p:ext uri="{386F3935-93C4-4BCD-93E2-E3B085C9AB24}">
+                <p16:designElem xmlns:p16="http://schemas.microsoft.com/office/powerpoint/2015/main" val="1"/>
+              </p:ext>
+            </p:extLst>
+          </p:nvPr>
+        </p:nvSpPr>
+        <p:spPr>
+          <a:xfrm rot="18900000" flipH="1">
+            <a:off x="10043482" y="655140"/>
+            <a:ext cx="687472" cy="687472"/>
+          </a:xfrm>
+          <a:prstGeom prst="rect">
+            <a:avLst/>
+          </a:prstGeom>
+          <a:solidFill>
+            <a:schemeClr val="accent4">
+              <a:alpha val="30000"/>
+            </a:schemeClr>
+          </a:solidFill>
+          <a:ln>
+            <a:noFill/>
+          </a:ln>
+        </p:spPr>
+        <p:style>
+          <a:lnRef idx="2">
+            <a:schemeClr val="accent1">
+              <a:shade val="50000"/>
+            </a:schemeClr>
+          </a:lnRef>
+          <a:fillRef idx="1">
+            <a:schemeClr val="accent1"/>
+          </a:fillRef>
+          <a:effectRef idx="0">
+            <a:schemeClr val="accent1"/>
+          </a:effectRef>
+          <a:fontRef idx="minor">
+            <a:schemeClr val="lt1"/>
+          </a:fontRef>
+        </p:style>
+        <p:txBody>
+          <a:bodyPr rtlCol="0" anchor="ctr"/>
+          <a:lstStyle/>
+          <a:p>
+            <a:pPr algn="ctr"/>
+            <a:endParaRPr lang="en-US"/>
+          </a:p>
+        </p:txBody>
+      </p:sp>
+      <p:sp>
+        <p:nvSpPr>
+          <p:cNvPr id="16" name="Freeform: Shape 15">
+            <a:extLst>
+              <a:ext uri="{FF2B5EF4-FFF2-40B4-BE49-F238E27FC236}">
+                <a16:creationId xmlns:a16="http://schemas.microsoft.com/office/drawing/2014/main" id="{9A97C86A-04D6-40F7-AE84-31AB43E6A846}"/>
+              </a:ext>
+              <a:ext uri="{C183D7F6-B498-43B3-948B-1728B52AA6E4}">
+                <adec:decorative xmlns:adec="http://schemas.microsoft.com/office/drawing/2017/decorative" val="1"/>
+              </a:ext>
+            </a:extLst>
+          </p:cNvPr>
+          <p:cNvSpPr>
+            <a:spLocks noGrp="1" noRot="1" noChangeAspect="1" noMove="1" noResize="1" noEditPoints="1" noAdjustHandles="1" noChangeArrowheads="1" noChangeShapeType="1" noTextEdit="1"/>
+          </p:cNvSpPr>
+          <p:nvPr>
+            <p:extLst>
+              <p:ext uri="{386F3935-93C4-4BCD-93E2-E3B085C9AB24}">
+                <p16:designElem xmlns:p16="http://schemas.microsoft.com/office/powerpoint/2015/main" val="1"/>
+              </p:ext>
+            </p:extLst>
+          </p:nvPr>
+        </p:nvSpPr>
+        <p:spPr>
+          <a:xfrm rot="10800000" flipH="1">
+            <a:off x="9356643" y="0"/>
+            <a:ext cx="2835357" cy="1480837"/>
+          </a:xfrm>
+          <a:custGeom>
+            <a:avLst/>
+            <a:gdLst>
+              <a:gd name="connsiteX0" fmla="*/ 2835357 w 2835357"/>
+              <a:gd name="connsiteY0" fmla="*/ 1480837 h 1480837"/>
+              <a:gd name="connsiteX1" fmla="*/ 0 w 2835357"/>
+              <a:gd name="connsiteY1" fmla="*/ 1480837 h 1480837"/>
+              <a:gd name="connsiteX2" fmla="*/ 1552727 w 2835357"/>
+              <a:gd name="connsiteY2" fmla="*/ 0 h 1480837"/>
+              <a:gd name="connsiteX3" fmla="*/ 2835357 w 2835357"/>
+              <a:gd name="connsiteY3" fmla="*/ 1223245 h 1480837"/>
+            </a:gdLst>
+            <a:ahLst/>
+            <a:cxnLst>
+              <a:cxn ang="0">
+                <a:pos x="connsiteX0" y="connsiteY0"/>
+              </a:cxn>
+              <a:cxn ang="0">
+                <a:pos x="connsiteX1" y="connsiteY1"/>
+              </a:cxn>
+              <a:cxn ang="0">
+                <a:pos x="connsiteX2" y="connsiteY2"/>
+              </a:cxn>
+              <a:cxn ang="0">
+                <a:pos x="connsiteX3" y="connsiteY3"/>
+              </a:cxn>
+            </a:cxnLst>
+            <a:rect l="l" t="t" r="r" b="b"/>
+            <a:pathLst>
+              <a:path w="2835357" h="1480837">
+                <a:moveTo>
+                  <a:pt x="2835357" y="1480837"/>
+                </a:moveTo>
+                <a:lnTo>
+                  <a:pt x="0" y="1480837"/>
+                </a:lnTo>
+                <a:lnTo>
+                  <a:pt x="1552727" y="0"/>
+                </a:lnTo>
+                <a:lnTo>
+                  <a:pt x="2835357" y="1223245"/>
+                </a:lnTo>
+                <a:close/>
+              </a:path>
+            </a:pathLst>
+          </a:custGeom>
+          <a:solidFill>
+            <a:schemeClr val="accent4">
+              <a:alpha val="30000"/>
+            </a:schemeClr>
+          </a:solidFill>
+          <a:ln>
+            <a:noFill/>
+          </a:ln>
+        </p:spPr>
+        <p:style>
+          <a:lnRef idx="2">
+            <a:schemeClr val="accent1">
+              <a:shade val="50000"/>
+            </a:schemeClr>
+          </a:lnRef>
+          <a:fillRef idx="1">
+            <a:schemeClr val="accent1"/>
+          </a:fillRef>
+          <a:effectRef idx="0">
+            <a:schemeClr val="accent1"/>
+          </a:effectRef>
+          <a:fontRef idx="minor">
+            <a:schemeClr val="lt1"/>
+          </a:fontRef>
+        </p:style>
+        <p:txBody>
+          <a:bodyPr wrap="square" rtlCol="0" anchor="ctr">
+            <a:noAutofit/>
+          </a:bodyPr>
+          <a:lstStyle/>
+          <a:p>
+            <a:pPr algn="ctr"/>
+            <a:endParaRPr lang="en-US" dirty="0"/>
+          </a:p>
+        </p:txBody>
+      </p:sp>
+      <p:sp>
+        <p:nvSpPr>
           <p:cNvPr id="18" name="Isosceles Triangle 17">
             <a:extLst>
               <a:ext uri="{FF2B5EF4-FFF2-40B4-BE49-F238E27FC236}">
@@ -11149,7 +12568,7 @@
               </a:spcAft>
             </a:pPr>
             <a:r>
-              <a:rPr lang="en-US" sz="2400" kern="1200" dirty="0">
+              <a:rPr lang="en-US" sz="2400" kern="1200">
                 <a:latin typeface="+mj-lt"/>
                 <a:ea typeface="+mj-ea"/>
                 <a:cs typeface="+mj-cs"/>
@@ -11157,7 +12576,7 @@
               <a:t>Carbon emissions prediction for </a:t>
             </a:r>
             <a:r>
-              <a:rPr lang="en-US" sz="2400" dirty="0">
+              <a:rPr lang="en-US" sz="2400">
                 <a:latin typeface="+mj-lt"/>
                 <a:ea typeface="+mj-ea"/>
                 <a:cs typeface="+mj-cs"/>
@@ -11165,13 +12584,107 @@
               <a:t>G</a:t>
             </a:r>
             <a:r>
-              <a:rPr lang="en-US" sz="2400" kern="1200" dirty="0">
+              <a:rPr lang="en-US" sz="2400" kern="1200">
                 <a:latin typeface="+mj-lt"/>
                 <a:ea typeface="+mj-ea"/>
                 <a:cs typeface="+mj-cs"/>
               </a:rPr>
               <a:t>ermany</a:t>
             </a:r>
+            <a:endParaRPr lang="en-US" sz="2400" kern="1200" dirty="0">
+              <a:latin typeface="+mj-lt"/>
+              <a:ea typeface="+mj-ea"/>
+              <a:cs typeface="+mj-cs"/>
+            </a:endParaRPr>
+          </a:p>
+        </p:txBody>
+      </p:sp>
+      <p:sp>
+        <p:nvSpPr>
+          <p:cNvPr id="6" name="CasellaDiTesto 5">
+            <a:extLst>
+              <a:ext uri="{FF2B5EF4-FFF2-40B4-BE49-F238E27FC236}">
+                <a16:creationId xmlns:a16="http://schemas.microsoft.com/office/drawing/2014/main" id="{FF939633-CA37-EB84-119A-C6F84A6235C4}"/>
+              </a:ext>
+            </a:extLst>
+          </p:cNvPr>
+          <p:cNvSpPr txBox="1"/>
+          <p:nvPr/>
+        </p:nvSpPr>
+        <p:spPr>
+          <a:xfrm>
+            <a:off x="11030165" y="2272268"/>
+            <a:ext cx="1161835" cy="369332"/>
+          </a:xfrm>
+          <a:prstGeom prst="rect">
+            <a:avLst/>
+          </a:prstGeom>
+          <a:noFill/>
+        </p:spPr>
+        <p:txBody>
+          <a:bodyPr wrap="square" rtlCol="0">
+            <a:spAutoFit/>
+          </a:bodyPr>
+          <a:lstStyle/>
+          <a:p>
+            <a:r>
+              <a:rPr lang="it-IT" dirty="0"/>
+              <a:t>6 % </a:t>
+            </a:r>
+          </a:p>
+        </p:txBody>
+      </p:sp>
+      <p:sp>
+        <p:nvSpPr>
+          <p:cNvPr id="7" name="Freccia su 6">
+            <a:extLst>
+              <a:ext uri="{FF2B5EF4-FFF2-40B4-BE49-F238E27FC236}">
+                <a16:creationId xmlns:a16="http://schemas.microsoft.com/office/drawing/2014/main" id="{148C7219-DC3A-AC1E-E6E4-2D43C7B0CBAD}"/>
+              </a:ext>
+            </a:extLst>
+          </p:cNvPr>
+          <p:cNvSpPr/>
+          <p:nvPr/>
+        </p:nvSpPr>
+        <p:spPr>
+          <a:xfrm rot="10800000">
+            <a:off x="10799322" y="2071254"/>
+            <a:ext cx="272750" cy="771360"/>
+          </a:xfrm>
+          <a:prstGeom prst="upArrow">
+            <a:avLst/>
+          </a:prstGeom>
+          <a:solidFill>
+            <a:srgbClr val="00B050"/>
+          </a:solidFill>
+          <a:ln>
+            <a:solidFill>
+              <a:srgbClr val="00B050"/>
+            </a:solidFill>
+          </a:ln>
+        </p:spPr>
+        <p:style>
+          <a:lnRef idx="2">
+            <a:schemeClr val="accent1">
+              <a:shade val="50000"/>
+            </a:schemeClr>
+          </a:lnRef>
+          <a:fillRef idx="1">
+            <a:schemeClr val="accent1"/>
+          </a:fillRef>
+          <a:effectRef idx="0">
+            <a:schemeClr val="accent1"/>
+          </a:effectRef>
+          <a:fontRef idx="minor">
+            <a:schemeClr val="lt1"/>
+          </a:fontRef>
+        </p:style>
+        <p:txBody>
+          <a:bodyPr rtlCol="0" anchor="ctr"/>
+          <a:lstStyle/>
+          <a:p>
+            <a:pPr algn="ctr"/>
+            <a:endParaRPr lang="it-IT" dirty="0"/>
           </a:p>
         </p:txBody>
       </p:sp>
@@ -11185,6 +12698,128 @@
   <p:clrMapOvr>
     <a:masterClrMapping/>
   </p:clrMapOvr>
+  <p:timing>
+    <p:tnLst>
+      <p:par>
+        <p:cTn id="1" dur="indefinite" restart="never" nodeType="tmRoot">
+          <p:childTnLst>
+            <p:seq concurrent="1" nextAc="seek">
+              <p:cTn id="2" dur="indefinite" nodeType="mainSeq">
+                <p:childTnLst>
+                  <p:par>
+                    <p:cTn id="3" fill="hold">
+                      <p:stCondLst>
+                        <p:cond delay="indefinite"/>
+                      </p:stCondLst>
+                      <p:childTnLst>
+                        <p:par>
+                          <p:cTn id="4" fill="hold">
+                            <p:stCondLst>
+                              <p:cond delay="0"/>
+                            </p:stCondLst>
+                            <p:childTnLst>
+                              <p:par>
+                                <p:cTn id="5" presetID="10" presetClass="entr" presetSubtype="0" fill="hold" grpId="0" nodeType="clickEffect">
+                                  <p:stCondLst>
+                                    <p:cond delay="0"/>
+                                  </p:stCondLst>
+                                  <p:childTnLst>
+                                    <p:set>
+                                      <p:cBhvr>
+                                        <p:cTn id="6" dur="1" fill="hold">
+                                          <p:stCondLst>
+                                            <p:cond delay="0"/>
+                                          </p:stCondLst>
+                                        </p:cTn>
+                                        <p:tgtEl>
+                                          <p:spTgt spid="7"/>
+                                        </p:tgtEl>
+                                        <p:attrNameLst>
+                                          <p:attrName>style.visibility</p:attrName>
+                                        </p:attrNameLst>
+                                      </p:cBhvr>
+                                      <p:to>
+                                        <p:strVal val="visible"/>
+                                      </p:to>
+                                    </p:set>
+                                    <p:animEffect transition="in" filter="fade">
+                                      <p:cBhvr>
+                                        <p:cTn id="7" dur="500"/>
+                                        <p:tgtEl>
+                                          <p:spTgt spid="7"/>
+                                        </p:tgtEl>
+                                      </p:cBhvr>
+                                    </p:animEffect>
+                                  </p:childTnLst>
+                                </p:cTn>
+                              </p:par>
+                              <p:par>
+                                <p:cTn id="8" presetID="10" presetClass="entr" presetSubtype="0" fill="hold" grpId="0" nodeType="withEffect">
+                                  <p:stCondLst>
+                                    <p:cond delay="0"/>
+                                  </p:stCondLst>
+                                  <p:childTnLst>
+                                    <p:set>
+                                      <p:cBhvr>
+                                        <p:cTn id="9" dur="1" fill="hold">
+                                          <p:stCondLst>
+                                            <p:cond delay="0"/>
+                                          </p:stCondLst>
+                                        </p:cTn>
+                                        <p:tgtEl>
+                                          <p:spTgt spid="6"/>
+                                        </p:tgtEl>
+                                        <p:attrNameLst>
+                                          <p:attrName>style.visibility</p:attrName>
+                                        </p:attrNameLst>
+                                      </p:cBhvr>
+                                      <p:to>
+                                        <p:strVal val="visible"/>
+                                      </p:to>
+                                    </p:set>
+                                    <p:animEffect transition="in" filter="fade">
+                                      <p:cBhvr>
+                                        <p:cTn id="10" dur="500"/>
+                                        <p:tgtEl>
+                                          <p:spTgt spid="6"/>
+                                        </p:tgtEl>
+                                      </p:cBhvr>
+                                    </p:animEffect>
+                                  </p:childTnLst>
+                                </p:cTn>
+                              </p:par>
+                            </p:childTnLst>
+                          </p:cTn>
+                        </p:par>
+                      </p:childTnLst>
+                    </p:cTn>
+                  </p:par>
+                </p:childTnLst>
+              </p:cTn>
+              <p:prevCondLst>
+                <p:cond evt="onPrev" delay="0">
+                  <p:tgtEl>
+                    <p:sldTgt/>
+                  </p:tgtEl>
+                </p:cond>
+              </p:prevCondLst>
+              <p:nextCondLst>
+                <p:cond evt="onNext" delay="0">
+                  <p:tgtEl>
+                    <p:sldTgt/>
+                  </p:tgtEl>
+                </p:cond>
+              </p:nextCondLst>
+            </p:seq>
+          </p:childTnLst>
+        </p:cTn>
+      </p:par>
+    </p:tnLst>
+    <p:bldLst>
+      <p:bldP spid="6" grpId="0"/>
+      <p:bldP spid="7" grpId="0" animBg="1"/>
+    </p:bldLst>
+  </p:timing>
 </p:sld>
 </file>
 

</xml_diff>

<commit_message>
slides fixed with chi and ind
</commit_message>
<xml_diff>
--- a/Visualization/GlobalCO2Emission.pptx
+++ b/Visualization/GlobalCO2Emission.pptx
@@ -7035,10 +7035,10 @@
       </p:sp>
       <p:pic>
         <p:nvPicPr>
-          <p:cNvPr id="7" name="slide7" descr="India">
-            <a:extLst>
-              <a:ext uri="{FF2B5EF4-FFF2-40B4-BE49-F238E27FC236}">
-                <a16:creationId xmlns:a16="http://schemas.microsoft.com/office/drawing/2014/main" id="{291F7F40-B1E0-93E0-C0CA-5241050ADE68}"/>
+          <p:cNvPr id="3" name="slide3" descr="India">
+            <a:extLst>
+              <a:ext uri="{FF2B5EF4-FFF2-40B4-BE49-F238E27FC236}">
+                <a16:creationId xmlns:a16="http://schemas.microsoft.com/office/drawing/2014/main" id="{648F013E-BD6B-5115-6BAE-F7EDE93F075E}"/>
               </a:ext>
             </a:extLst>
           </p:cNvPr>
@@ -7055,13 +7055,13 @@
               </a:ext>
             </a:extLst>
           </a:blip>
-          <a:srcRect t="5956" b="6807"/>
+          <a:srcRect t="6230" b="5409"/>
           <a:stretch/>
         </p:blipFill>
         <p:spPr>
           <a:xfrm>
-            <a:off x="1032830" y="740418"/>
-            <a:ext cx="10323406" cy="5676418"/>
+            <a:off x="1162050" y="706581"/>
+            <a:ext cx="10317936" cy="5746561"/>
           </a:xfrm>
           <a:prstGeom prst="rect">
             <a:avLst/>
@@ -7082,7 +7082,7 @@
         </p:nvGrpSpPr>
         <p:grpSpPr>
           <a:xfrm>
-            <a:off x="9963558" y="1793340"/>
+            <a:off x="9690879" y="1674659"/>
             <a:ext cx="1392678" cy="771360"/>
             <a:chOff x="9963558" y="1793340"/>
             <a:chExt cx="1392678" cy="771360"/>
@@ -7121,7 +7121,7 @@
                   <a:latin typeface="Kaiti SC" panose="02010600040101010101" pitchFamily="2" charset="-122"/>
                   <a:ea typeface="Kaiti SC" panose="02010600040101010101" pitchFamily="2" charset="-122"/>
                 </a:rPr>
-                <a:t>228 % </a:t>
+                <a:t>10 % </a:t>
               </a:r>
             </a:p>
           </p:txBody>
@@ -7228,7 +7228,7 @@
                                           </p:stCondLst>
                                         </p:cTn>
                                         <p:tgtEl>
-                                          <p:spTgt spid="7"/>
+                                          <p:spTgt spid="3"/>
                                         </p:tgtEl>
                                         <p:attrNameLst>
                                           <p:attrName>style.visibility</p:attrName>
@@ -7242,7 +7242,7 @@
                                       <p:cBhvr>
                                         <p:cTn id="7" dur="500"/>
                                         <p:tgtEl>
-                                          <p:spTgt spid="7"/>
+                                          <p:spTgt spid="3"/>
                                         </p:tgtEl>
                                       </p:cBhvr>
                                     </p:animEffect>
@@ -8681,7 +8681,7 @@
         </p:spPr>
         <p:txBody>
           <a:bodyPr vert="horz" lIns="91440" tIns="45720" rIns="91440" bIns="45720" rtlCol="0" anchor="t">
-            <a:normAutofit lnSpcReduction="10000"/>
+            <a:normAutofit/>
           </a:bodyPr>
           <a:lstStyle/>
           <a:p>
@@ -8703,6 +8703,22 @@
               </a:rPr>
               <a:t>Collective and holistic action plan?</a:t>
             </a:r>
+          </a:p>
+          <a:p>
+            <a:pPr indent="-228600">
+              <a:lnSpc>
+                <a:spcPct val="90000"/>
+              </a:lnSpc>
+              <a:spcAft>
+                <a:spcPts val="600"/>
+              </a:spcAft>
+              <a:buFont typeface="Arial" panose="020B0604020202020204" pitchFamily="34" charset="0"/>
+              <a:buChar char="•"/>
+            </a:pPr>
+            <a:endParaRPr lang="en-US" sz="1700" dirty="0">
+              <a:latin typeface="Kaiti SC" panose="02010600040101010101" pitchFamily="2" charset="-122"/>
+              <a:ea typeface="Kaiti SC" panose="02010600040101010101" pitchFamily="2" charset="-122"/>
+            </a:endParaRPr>
           </a:p>
           <a:p>
             <a:pPr indent="-228600">
@@ -8740,6 +8756,22 @@
               <a:t>Control our consumption?</a:t>
             </a:r>
             <a:endParaRPr lang="en-US" sz="1700" dirty="0">
+              <a:latin typeface="Kaiti SC" panose="02010600040101010101" pitchFamily="2" charset="-122"/>
+              <a:ea typeface="Kaiti SC" panose="02010600040101010101" pitchFamily="2" charset="-122"/>
+            </a:endParaRPr>
+          </a:p>
+          <a:p>
+            <a:pPr indent="-228600">
+              <a:lnSpc>
+                <a:spcPct val="90000"/>
+              </a:lnSpc>
+              <a:spcAft>
+                <a:spcPts val="600"/>
+              </a:spcAft>
+              <a:buFont typeface="Arial" panose="020B0604020202020204" pitchFamily="34" charset="0"/>
+              <a:buChar char="•"/>
+            </a:pPr>
+            <a:endParaRPr lang="en-US" sz="1700">
               <a:latin typeface="Kaiti SC" panose="02010600040101010101" pitchFamily="2" charset="-122"/>
               <a:ea typeface="Kaiti SC" panose="02010600040101010101" pitchFamily="2" charset="-122"/>
             </a:endParaRPr>
@@ -8795,58 +8827,6 @@
               <a:spcAft>
                 <a:spcPts val="600"/>
               </a:spcAft>
-            </a:pPr>
-            <a:endParaRPr lang="en-US" sz="1700" b="0" i="0" dirty="0">
-              <a:effectLst/>
-              <a:latin typeface="Kaiti SC" panose="02010600040101010101" pitchFamily="2" charset="-122"/>
-              <a:ea typeface="Kaiti SC" panose="02010600040101010101" pitchFamily="2" charset="-122"/>
-            </a:endParaRPr>
-          </a:p>
-          <a:p>
-            <a:pPr indent="-228600">
-              <a:lnSpc>
-                <a:spcPct val="90000"/>
-              </a:lnSpc>
-              <a:spcAft>
-                <a:spcPts val="600"/>
-              </a:spcAft>
-              <a:buFont typeface="Arial" panose="020B0604020202020204" pitchFamily="34" charset="0"/>
-              <a:buChar char="•"/>
-            </a:pPr>
-            <a:r>
-              <a:rPr lang="en-US" sz="1700" dirty="0">
-                <a:latin typeface="Kaiti SC" panose="02010600040101010101" pitchFamily="2" charset="-122"/>
-                <a:ea typeface="Kaiti SC" panose="02010600040101010101" pitchFamily="2" charset="-122"/>
-              </a:rPr>
-              <a:t> </a:t>
-            </a:r>
-          </a:p>
-          <a:p>
-            <a:pPr indent="-228600">
-              <a:lnSpc>
-                <a:spcPct val="90000"/>
-              </a:lnSpc>
-              <a:spcAft>
-                <a:spcPts val="600"/>
-              </a:spcAft>
-              <a:buFont typeface="Arial" panose="020B0604020202020204" pitchFamily="34" charset="0"/>
-              <a:buChar char="•"/>
-            </a:pPr>
-            <a:endParaRPr lang="en-US" sz="1700" dirty="0">
-              <a:latin typeface="Kaiti SC" panose="02010600040101010101" pitchFamily="2" charset="-122"/>
-              <a:ea typeface="Kaiti SC" panose="02010600040101010101" pitchFamily="2" charset="-122"/>
-            </a:endParaRPr>
-          </a:p>
-          <a:p>
-            <a:pPr indent="-228600">
-              <a:lnSpc>
-                <a:spcPct val="90000"/>
-              </a:lnSpc>
-              <a:spcAft>
-                <a:spcPts val="600"/>
-              </a:spcAft>
-              <a:buFont typeface="Arial" panose="020B0604020202020204" pitchFamily="34" charset="0"/>
-              <a:buChar char="•"/>
             </a:pPr>
             <a:r>
               <a:rPr lang="en-US" sz="1700" dirty="0">
@@ -14358,10 +14338,10 @@
       </p:sp>
       <p:pic>
         <p:nvPicPr>
-          <p:cNvPr id="8" name="slide6" descr="China">
-            <a:extLst>
-              <a:ext uri="{FF2B5EF4-FFF2-40B4-BE49-F238E27FC236}">
-                <a16:creationId xmlns:a16="http://schemas.microsoft.com/office/drawing/2014/main" id="{DC8EE6F3-41B4-07B4-86A2-32C663C7DD62}"/>
+          <p:cNvPr id="3" name="slide2" descr="China">
+            <a:extLst>
+              <a:ext uri="{FF2B5EF4-FFF2-40B4-BE49-F238E27FC236}">
+                <a16:creationId xmlns:a16="http://schemas.microsoft.com/office/drawing/2014/main" id="{6965CBF8-5148-A200-3D97-7EC59D277600}"/>
               </a:ext>
             </a:extLst>
           </p:cNvPr>
@@ -14378,13 +14358,13 @@
               </a:ext>
             </a:extLst>
           </a:blip>
-          <a:srcRect t="5956" b="6807"/>
+          <a:srcRect t="6008" b="5409"/>
           <a:stretch/>
         </p:blipFill>
         <p:spPr>
           <a:xfrm>
-            <a:off x="1005434" y="776543"/>
-            <a:ext cx="10323739" cy="5676600"/>
+            <a:off x="1233137" y="897386"/>
+            <a:ext cx="10158684" cy="5672129"/>
           </a:xfrm>
           <a:prstGeom prst="rect">
             <a:avLst/>
@@ -14405,7 +14385,7 @@
         </p:nvGrpSpPr>
         <p:grpSpPr>
           <a:xfrm>
-            <a:off x="9743870" y="1793340"/>
+            <a:off x="9592693" y="1732609"/>
             <a:ext cx="1392678" cy="771360"/>
             <a:chOff x="9743870" y="1793340"/>
             <a:chExt cx="1392678" cy="771360"/>
@@ -14444,7 +14424,7 @@
                   <a:latin typeface="Kaiti SC" panose="02010600040101010101" pitchFamily="2" charset="-122"/>
                   <a:ea typeface="Kaiti SC" panose="02010600040101010101" pitchFamily="2" charset="-122"/>
                 </a:rPr>
-                <a:t>267 %</a:t>
+                <a:t>39 %</a:t>
               </a:r>
             </a:p>
           </p:txBody>
@@ -14551,7 +14531,7 @@
                                           </p:stCondLst>
                                         </p:cTn>
                                         <p:tgtEl>
-                                          <p:spTgt spid="8"/>
+                                          <p:spTgt spid="3"/>
                                         </p:tgtEl>
                                         <p:attrNameLst>
                                           <p:attrName>style.visibility</p:attrName>
@@ -14565,7 +14545,7 @@
                                       <p:cBhvr>
                                         <p:cTn id="7" dur="500"/>
                                         <p:tgtEl>
-                                          <p:spTgt spid="8"/>
+                                          <p:spTgt spid="3"/>
                                         </p:tgtEl>
                                       </p:cBhvr>
                                     </p:animEffect>

</xml_diff>